<commit_message>
Changes to PPTs for video recordings
</commit_message>
<xml_diff>
--- a/VideoSessionsMaterials/Introducing.pptx
+++ b/VideoSessionsMaterials/Introducing.pptx
@@ -5,15 +5,19 @@
     <p:sldMasterId id="2147483648" r:id="rId1"/>
   </p:sldMasterIdLst>
   <p:notesMasterIdLst>
-    <p:notesMasterId r:id="rId8"/>
+    <p:notesMasterId r:id="rId12"/>
   </p:notesMasterIdLst>
   <p:sldIdLst>
     <p:sldId id="364" r:id="rId2"/>
-    <p:sldId id="326" r:id="rId3"/>
-    <p:sldId id="367" r:id="rId4"/>
-    <p:sldId id="368" r:id="rId5"/>
-    <p:sldId id="369" r:id="rId6"/>
-    <p:sldId id="322" r:id="rId7"/>
+    <p:sldId id="372" r:id="rId3"/>
+    <p:sldId id="375" r:id="rId4"/>
+    <p:sldId id="367" r:id="rId5"/>
+    <p:sldId id="376" r:id="rId6"/>
+    <p:sldId id="371" r:id="rId7"/>
+    <p:sldId id="370" r:id="rId8"/>
+    <p:sldId id="368" r:id="rId9"/>
+    <p:sldId id="369" r:id="rId10"/>
+    <p:sldId id="322" r:id="rId11"/>
   </p:sldIdLst>
   <p:sldSz cx="17327563" cy="9747250"/>
   <p:notesSz cx="6858000" cy="9144000"/>
@@ -228,7 +232,7 @@
             <a:fld id="{DDC063FE-8627-9A42-970F-0BBEEB02B587}" type="datetimeFigureOut">
               <a:rPr lang="en-US" smtClean="0"/>
               <a:pPr/>
-              <a:t>12/4/13</a:t>
+              <a:t>12/5/13</a:t>
             </a:fld>
             <a:endParaRPr lang="en-US" dirty="0"/>
           </a:p>
@@ -601,65 +605,250 @@
       </p:grpSpPr>
       <p:sp>
         <p:nvSpPr>
-          <p:cNvPr id="2" name="Slide Image Placeholder 1"/>
-          <p:cNvSpPr>
-            <a:spLocks noGrp="1" noRot="1" noChangeAspect="1"/>
-          </p:cNvSpPr>
-          <p:nvPr>
-            <p:ph type="sldImg"/>
-          </p:nvPr>
-        </p:nvSpPr>
-        <p:spPr/>
-      </p:sp>
-      <p:sp>
-        <p:nvSpPr>
-          <p:cNvPr id="3" name="Notes Placeholder 2"/>
-          <p:cNvSpPr>
-            <a:spLocks noGrp="1"/>
-          </p:cNvSpPr>
-          <p:nvPr>
-            <p:ph type="body" idx="1"/>
-          </p:nvPr>
-        </p:nvSpPr>
-        <p:spPr/>
-        <p:txBody>
-          <a:bodyPr/>
-          <a:lstStyle/>
-          <a:p>
-            <a:endParaRPr lang="en-US"/>
-          </a:p>
-        </p:txBody>
-      </p:sp>
-      <p:sp>
-        <p:nvSpPr>
-          <p:cNvPr id="4" name="Slide Number Placeholder 3"/>
-          <p:cNvSpPr>
-            <a:spLocks noGrp="1"/>
-          </p:cNvSpPr>
-          <p:nvPr>
-            <p:ph type="sldNum" sz="quarter" idx="10"/>
-          </p:nvPr>
-        </p:nvSpPr>
-        <p:spPr/>
-        <p:txBody>
-          <a:bodyPr/>
-          <a:lstStyle/>
-          <a:p>
-            <a:fld id="{3560C2FB-C494-1A46-A471-884A4E75440F}" type="slidenum">
-              <a:rPr lang="en-US" smtClean="0"/>
-              <a:pPr/>
+          <p:cNvPr id="16385" name="Rectangle 7"/>
+          <p:cNvSpPr txBox="1">
+            <a:spLocks noGrp="1" noChangeArrowheads="1"/>
+          </p:cNvSpPr>
+          <p:nvPr/>
+        </p:nvSpPr>
+        <p:spPr bwMode="auto">
+          <a:xfrm>
+            <a:off x="3886200" y="8686800"/>
+            <a:ext cx="2971800" cy="457200"/>
+          </a:xfrm>
+          <a:prstGeom prst="rect">
+            <a:avLst/>
+          </a:prstGeom>
+          <a:noFill/>
+          <a:ln>
+            <a:noFill/>
+          </a:ln>
+          <a:extLst>
+            <a:ext uri="{909E8E84-426E-40dd-AFC4-6F175D3DCCD1}">
+              <a14:hiddenFill xmlns:a14="http://schemas.microsoft.com/office/drawing/2010/main">
+                <a:solidFill>
+                  <a:srgbClr val="FFFFFF"/>
+                </a:solidFill>
+              </a14:hiddenFill>
+            </a:ext>
+            <a:ext uri="{91240B29-F687-4f45-9708-019B960494DF}">
+              <a14:hiddenLine xmlns:a14="http://schemas.microsoft.com/office/drawing/2010/main" w="9525">
+                <a:solidFill>
+                  <a:srgbClr val="000000"/>
+                </a:solidFill>
+                <a:miter lim="800000"/>
+                <a:headEnd/>
+                <a:tailEnd/>
+              </a14:hiddenLine>
+            </a:ext>
+          </a:extLst>
+        </p:spPr>
+        <p:txBody>
+          <a:bodyPr anchor="b"/>
+          <a:lstStyle>
+            <a:lvl1pPr eaLnBrk="0" hangingPunct="0">
+              <a:defRPr sz="3000">
+                <a:solidFill>
+                  <a:schemeClr val="tx1"/>
+                </a:solidFill>
+                <a:latin typeface="Arial" charset="0"/>
+                <a:ea typeface="ＭＳ Ｐゴシック" charset="0"/>
+                <a:cs typeface="ＭＳ Ｐゴシック" charset="0"/>
+              </a:defRPr>
+            </a:lvl1pPr>
+            <a:lvl2pPr marL="742950" indent="-285750" eaLnBrk="0" hangingPunct="0">
+              <a:defRPr sz="3000">
+                <a:solidFill>
+                  <a:schemeClr val="tx1"/>
+                </a:solidFill>
+                <a:latin typeface="Arial" charset="0"/>
+                <a:ea typeface="ＭＳ Ｐゴシック" charset="0"/>
+              </a:defRPr>
+            </a:lvl2pPr>
+            <a:lvl3pPr marL="1143000" indent="-228600" eaLnBrk="0" hangingPunct="0">
+              <a:defRPr sz="3000">
+                <a:solidFill>
+                  <a:schemeClr val="tx1"/>
+                </a:solidFill>
+                <a:latin typeface="Arial" charset="0"/>
+                <a:ea typeface="ＭＳ Ｐゴシック" charset="0"/>
+              </a:defRPr>
+            </a:lvl3pPr>
+            <a:lvl4pPr marL="1600200" indent="-228600" eaLnBrk="0" hangingPunct="0">
+              <a:defRPr sz="3000">
+                <a:solidFill>
+                  <a:schemeClr val="tx1"/>
+                </a:solidFill>
+                <a:latin typeface="Arial" charset="0"/>
+                <a:ea typeface="ＭＳ Ｐゴシック" charset="0"/>
+              </a:defRPr>
+            </a:lvl4pPr>
+            <a:lvl5pPr marL="2057400" indent="-228600" eaLnBrk="0" hangingPunct="0">
+              <a:defRPr sz="3000">
+                <a:solidFill>
+                  <a:schemeClr val="tx1"/>
+                </a:solidFill>
+                <a:latin typeface="Arial" charset="0"/>
+                <a:ea typeface="ＭＳ Ｐゴシック" charset="0"/>
+              </a:defRPr>
+            </a:lvl5pPr>
+            <a:lvl6pPr marL="2514600" indent="-228600" defTabSz="773113" eaLnBrk="0" fontAlgn="base" hangingPunct="0">
+              <a:spcBef>
+                <a:spcPct val="0"/>
+              </a:spcBef>
+              <a:spcAft>
+                <a:spcPct val="0"/>
+              </a:spcAft>
+              <a:defRPr sz="3000">
+                <a:solidFill>
+                  <a:schemeClr val="tx1"/>
+                </a:solidFill>
+                <a:latin typeface="Arial" charset="0"/>
+                <a:ea typeface="ＭＳ Ｐゴシック" charset="0"/>
+              </a:defRPr>
+            </a:lvl6pPr>
+            <a:lvl7pPr marL="2971800" indent="-228600" defTabSz="773113" eaLnBrk="0" fontAlgn="base" hangingPunct="0">
+              <a:spcBef>
+                <a:spcPct val="0"/>
+              </a:spcBef>
+              <a:spcAft>
+                <a:spcPct val="0"/>
+              </a:spcAft>
+              <a:defRPr sz="3000">
+                <a:solidFill>
+                  <a:schemeClr val="tx1"/>
+                </a:solidFill>
+                <a:latin typeface="Arial" charset="0"/>
+                <a:ea typeface="ＭＳ Ｐゴシック" charset="0"/>
+              </a:defRPr>
+            </a:lvl7pPr>
+            <a:lvl8pPr marL="3429000" indent="-228600" defTabSz="773113" eaLnBrk="0" fontAlgn="base" hangingPunct="0">
+              <a:spcBef>
+                <a:spcPct val="0"/>
+              </a:spcBef>
+              <a:spcAft>
+                <a:spcPct val="0"/>
+              </a:spcAft>
+              <a:defRPr sz="3000">
+                <a:solidFill>
+                  <a:schemeClr val="tx1"/>
+                </a:solidFill>
+                <a:latin typeface="Arial" charset="0"/>
+                <a:ea typeface="ＭＳ Ｐゴシック" charset="0"/>
+              </a:defRPr>
+            </a:lvl8pPr>
+            <a:lvl9pPr marL="3886200" indent="-228600" defTabSz="773113" eaLnBrk="0" fontAlgn="base" hangingPunct="0">
+              <a:spcBef>
+                <a:spcPct val="0"/>
+              </a:spcBef>
+              <a:spcAft>
+                <a:spcPct val="0"/>
+              </a:spcAft>
+              <a:defRPr sz="3000">
+                <a:solidFill>
+                  <a:schemeClr val="tx1"/>
+                </a:solidFill>
+                <a:latin typeface="Arial" charset="0"/>
+                <a:ea typeface="ＭＳ Ｐゴシック" charset="0"/>
+              </a:defRPr>
+            </a:lvl9pPr>
+          </a:lstStyle>
+          <a:p>
+            <a:pPr algn="r"/>
+            <a:fld id="{A62E8883-B2A8-7548-B813-4C5E55B686B7}" type="slidenum">
+              <a:rPr lang="en-US" sz="1200"/>
+              <a:pPr algn="r"/>
               <a:t>2</a:t>
             </a:fld>
-            <a:endParaRPr lang="en-US" dirty="0"/>
+            <a:endParaRPr lang="en-US" sz="1200"/>
+          </a:p>
+        </p:txBody>
+      </p:sp>
+      <p:sp>
+        <p:nvSpPr>
+          <p:cNvPr id="16386" name="Rectangle 2"/>
+          <p:cNvSpPr>
+            <a:spLocks noGrp="1" noRot="1" noChangeAspect="1" noChangeArrowheads="1" noTextEdit="1"/>
+          </p:cNvSpPr>
+          <p:nvPr>
+            <p:ph type="sldImg"/>
+          </p:nvPr>
+        </p:nvSpPr>
+        <p:spPr bwMode="auto">
+          <a:noFill/>
+          <a:ln>
+            <a:solidFill>
+              <a:srgbClr val="000000"/>
+            </a:solidFill>
+            <a:miter lim="800000"/>
+            <a:headEnd/>
+            <a:tailEnd/>
+          </a:ln>
+          <a:extLst>
+            <a:ext uri="{909E8E84-426E-40dd-AFC4-6F175D3DCCD1}">
+              <a14:hiddenFill xmlns:a14="http://schemas.microsoft.com/office/drawing/2010/main">
+                <a:solidFill>
+                  <a:srgbClr val="FFFFFF"/>
+                </a:solidFill>
+              </a14:hiddenFill>
+            </a:ext>
+            <a:ext uri="{FAA26D3D-D897-4be2-8F04-BA451C77F1D7}">
+              <ma14:placeholderFlag xmlns:ma14="http://schemas.microsoft.com/office/mac/drawingml/2011/main" val="1"/>
+            </a:ext>
+          </a:extLst>
+        </p:spPr>
+      </p:sp>
+      <p:sp>
+        <p:nvSpPr>
+          <p:cNvPr id="16387" name="Rectangle 3"/>
+          <p:cNvSpPr>
+            <a:spLocks noGrp="1" noChangeArrowheads="1"/>
+          </p:cNvSpPr>
+          <p:nvPr>
+            <p:ph type="body" idx="1"/>
+          </p:nvPr>
+        </p:nvSpPr>
+        <p:spPr bwMode="auto">
+          <a:noFill/>
+          <a:extLst>
+            <a:ext uri="{909E8E84-426E-40dd-AFC4-6F175D3DCCD1}">
+              <a14:hiddenFill xmlns:a14="http://schemas.microsoft.com/office/drawing/2010/main">
+                <a:solidFill>
+                  <a:srgbClr val="FFFFFF"/>
+                </a:solidFill>
+              </a14:hiddenFill>
+            </a:ext>
+            <a:ext uri="{91240B29-F687-4f45-9708-019B960494DF}">
+              <a14:hiddenLine xmlns:a14="http://schemas.microsoft.com/office/drawing/2010/main" w="9525">
+                <a:solidFill>
+                  <a:srgbClr val="000000"/>
+                </a:solidFill>
+                <a:miter lim="800000"/>
+                <a:headEnd/>
+                <a:tailEnd/>
+              </a14:hiddenLine>
+            </a:ext>
+          </a:extLst>
+        </p:spPr>
+        <p:txBody>
+          <a:bodyPr wrap="square" numCol="1" anchor="t" anchorCtr="0" compatLnSpc="1">
+            <a:prstTxWarp prst="textNoShape">
+              <a:avLst/>
+            </a:prstTxWarp>
+          </a:bodyPr>
+          <a:lstStyle/>
+          <a:p>
+            <a:pPr eaLnBrk="1" hangingPunct="1"/>
+            <a:r>
+              <a:rPr lang="en-US">
+                <a:latin typeface="Calibri" charset="0"/>
+              </a:rPr>
+              <a:t>Started at 3:04 </a:t>
+            </a:r>
           </a:p>
         </p:txBody>
       </p:sp>
     </p:spTree>
-    <p:extLst>
-      <p:ext uri="{BB962C8B-B14F-4D97-AF65-F5344CB8AC3E}">
-        <p14:creationId xmlns:p14="http://schemas.microsoft.com/office/powerpoint/2010/main" val="963676054"/>
-      </p:ext>
-    </p:extLst>
   </p:cSld>
   <p:clrMapOvr>
     <a:masterClrMapping/>
@@ -686,65 +875,250 @@
       </p:grpSpPr>
       <p:sp>
         <p:nvSpPr>
-          <p:cNvPr id="2" name="Slide Image Placeholder 1"/>
-          <p:cNvSpPr>
-            <a:spLocks noGrp="1" noRot="1" noChangeAspect="1"/>
-          </p:cNvSpPr>
-          <p:nvPr>
-            <p:ph type="sldImg"/>
-          </p:nvPr>
-        </p:nvSpPr>
-        <p:spPr/>
-      </p:sp>
-      <p:sp>
-        <p:nvSpPr>
-          <p:cNvPr id="3" name="Notes Placeholder 2"/>
-          <p:cNvSpPr>
-            <a:spLocks noGrp="1"/>
-          </p:cNvSpPr>
-          <p:nvPr>
-            <p:ph type="body" idx="1"/>
-          </p:nvPr>
-        </p:nvSpPr>
-        <p:spPr/>
-        <p:txBody>
-          <a:bodyPr/>
-          <a:lstStyle/>
-          <a:p>
-            <a:endParaRPr lang="en-US"/>
-          </a:p>
-        </p:txBody>
-      </p:sp>
-      <p:sp>
-        <p:nvSpPr>
-          <p:cNvPr id="4" name="Slide Number Placeholder 3"/>
-          <p:cNvSpPr>
-            <a:spLocks noGrp="1"/>
-          </p:cNvSpPr>
-          <p:nvPr>
-            <p:ph type="sldNum" sz="quarter" idx="10"/>
-          </p:nvPr>
-        </p:nvSpPr>
-        <p:spPr/>
-        <p:txBody>
-          <a:bodyPr/>
-          <a:lstStyle/>
-          <a:p>
-            <a:fld id="{3560C2FB-C494-1A46-A471-884A4E75440F}" type="slidenum">
-              <a:rPr lang="en-US" smtClean="0"/>
-              <a:pPr/>
+          <p:cNvPr id="16385" name="Rectangle 7"/>
+          <p:cNvSpPr txBox="1">
+            <a:spLocks noGrp="1" noChangeArrowheads="1"/>
+          </p:cNvSpPr>
+          <p:nvPr/>
+        </p:nvSpPr>
+        <p:spPr bwMode="auto">
+          <a:xfrm>
+            <a:off x="3886200" y="8686800"/>
+            <a:ext cx="2971800" cy="457200"/>
+          </a:xfrm>
+          <a:prstGeom prst="rect">
+            <a:avLst/>
+          </a:prstGeom>
+          <a:noFill/>
+          <a:ln>
+            <a:noFill/>
+          </a:ln>
+          <a:extLst>
+            <a:ext uri="{909E8E84-426E-40dd-AFC4-6F175D3DCCD1}">
+              <a14:hiddenFill xmlns:a14="http://schemas.microsoft.com/office/drawing/2010/main">
+                <a:solidFill>
+                  <a:srgbClr val="FFFFFF"/>
+                </a:solidFill>
+              </a14:hiddenFill>
+            </a:ext>
+            <a:ext uri="{91240B29-F687-4f45-9708-019B960494DF}">
+              <a14:hiddenLine xmlns:a14="http://schemas.microsoft.com/office/drawing/2010/main" w="9525">
+                <a:solidFill>
+                  <a:srgbClr val="000000"/>
+                </a:solidFill>
+                <a:miter lim="800000"/>
+                <a:headEnd/>
+                <a:tailEnd/>
+              </a14:hiddenLine>
+            </a:ext>
+          </a:extLst>
+        </p:spPr>
+        <p:txBody>
+          <a:bodyPr anchor="b"/>
+          <a:lstStyle>
+            <a:lvl1pPr eaLnBrk="0" hangingPunct="0">
+              <a:defRPr sz="3000">
+                <a:solidFill>
+                  <a:schemeClr val="tx1"/>
+                </a:solidFill>
+                <a:latin typeface="Arial" charset="0"/>
+                <a:ea typeface="ＭＳ Ｐゴシック" charset="0"/>
+                <a:cs typeface="ＭＳ Ｐゴシック" charset="0"/>
+              </a:defRPr>
+            </a:lvl1pPr>
+            <a:lvl2pPr marL="742950" indent="-285750" eaLnBrk="0" hangingPunct="0">
+              <a:defRPr sz="3000">
+                <a:solidFill>
+                  <a:schemeClr val="tx1"/>
+                </a:solidFill>
+                <a:latin typeface="Arial" charset="0"/>
+                <a:ea typeface="ＭＳ Ｐゴシック" charset="0"/>
+              </a:defRPr>
+            </a:lvl2pPr>
+            <a:lvl3pPr marL="1143000" indent="-228600" eaLnBrk="0" hangingPunct="0">
+              <a:defRPr sz="3000">
+                <a:solidFill>
+                  <a:schemeClr val="tx1"/>
+                </a:solidFill>
+                <a:latin typeface="Arial" charset="0"/>
+                <a:ea typeface="ＭＳ Ｐゴシック" charset="0"/>
+              </a:defRPr>
+            </a:lvl3pPr>
+            <a:lvl4pPr marL="1600200" indent="-228600" eaLnBrk="0" hangingPunct="0">
+              <a:defRPr sz="3000">
+                <a:solidFill>
+                  <a:schemeClr val="tx1"/>
+                </a:solidFill>
+                <a:latin typeface="Arial" charset="0"/>
+                <a:ea typeface="ＭＳ Ｐゴシック" charset="0"/>
+              </a:defRPr>
+            </a:lvl4pPr>
+            <a:lvl5pPr marL="2057400" indent="-228600" eaLnBrk="0" hangingPunct="0">
+              <a:defRPr sz="3000">
+                <a:solidFill>
+                  <a:schemeClr val="tx1"/>
+                </a:solidFill>
+                <a:latin typeface="Arial" charset="0"/>
+                <a:ea typeface="ＭＳ Ｐゴシック" charset="0"/>
+              </a:defRPr>
+            </a:lvl5pPr>
+            <a:lvl6pPr marL="2514600" indent="-228600" defTabSz="773113" eaLnBrk="0" fontAlgn="base" hangingPunct="0">
+              <a:spcBef>
+                <a:spcPct val="0"/>
+              </a:spcBef>
+              <a:spcAft>
+                <a:spcPct val="0"/>
+              </a:spcAft>
+              <a:defRPr sz="3000">
+                <a:solidFill>
+                  <a:schemeClr val="tx1"/>
+                </a:solidFill>
+                <a:latin typeface="Arial" charset="0"/>
+                <a:ea typeface="ＭＳ Ｐゴシック" charset="0"/>
+              </a:defRPr>
+            </a:lvl6pPr>
+            <a:lvl7pPr marL="2971800" indent="-228600" defTabSz="773113" eaLnBrk="0" fontAlgn="base" hangingPunct="0">
+              <a:spcBef>
+                <a:spcPct val="0"/>
+              </a:spcBef>
+              <a:spcAft>
+                <a:spcPct val="0"/>
+              </a:spcAft>
+              <a:defRPr sz="3000">
+                <a:solidFill>
+                  <a:schemeClr val="tx1"/>
+                </a:solidFill>
+                <a:latin typeface="Arial" charset="0"/>
+                <a:ea typeface="ＭＳ Ｐゴシック" charset="0"/>
+              </a:defRPr>
+            </a:lvl7pPr>
+            <a:lvl8pPr marL="3429000" indent="-228600" defTabSz="773113" eaLnBrk="0" fontAlgn="base" hangingPunct="0">
+              <a:spcBef>
+                <a:spcPct val="0"/>
+              </a:spcBef>
+              <a:spcAft>
+                <a:spcPct val="0"/>
+              </a:spcAft>
+              <a:defRPr sz="3000">
+                <a:solidFill>
+                  <a:schemeClr val="tx1"/>
+                </a:solidFill>
+                <a:latin typeface="Arial" charset="0"/>
+                <a:ea typeface="ＭＳ Ｐゴシック" charset="0"/>
+              </a:defRPr>
+            </a:lvl8pPr>
+            <a:lvl9pPr marL="3886200" indent="-228600" defTabSz="773113" eaLnBrk="0" fontAlgn="base" hangingPunct="0">
+              <a:spcBef>
+                <a:spcPct val="0"/>
+              </a:spcBef>
+              <a:spcAft>
+                <a:spcPct val="0"/>
+              </a:spcAft>
+              <a:defRPr sz="3000">
+                <a:solidFill>
+                  <a:schemeClr val="tx1"/>
+                </a:solidFill>
+                <a:latin typeface="Arial" charset="0"/>
+                <a:ea typeface="ＭＳ Ｐゴシック" charset="0"/>
+              </a:defRPr>
+            </a:lvl9pPr>
+          </a:lstStyle>
+          <a:p>
+            <a:pPr algn="r"/>
+            <a:fld id="{A62E8883-B2A8-7548-B813-4C5E55B686B7}" type="slidenum">
+              <a:rPr lang="en-US" sz="1200"/>
+              <a:pPr algn="r"/>
               <a:t>3</a:t>
             </a:fld>
-            <a:endParaRPr lang="en-US" dirty="0"/>
+            <a:endParaRPr lang="en-US" sz="1200"/>
+          </a:p>
+        </p:txBody>
+      </p:sp>
+      <p:sp>
+        <p:nvSpPr>
+          <p:cNvPr id="16386" name="Rectangle 2"/>
+          <p:cNvSpPr>
+            <a:spLocks noGrp="1" noRot="1" noChangeAspect="1" noChangeArrowheads="1" noTextEdit="1"/>
+          </p:cNvSpPr>
+          <p:nvPr>
+            <p:ph type="sldImg"/>
+          </p:nvPr>
+        </p:nvSpPr>
+        <p:spPr bwMode="auto">
+          <a:noFill/>
+          <a:ln>
+            <a:solidFill>
+              <a:srgbClr val="000000"/>
+            </a:solidFill>
+            <a:miter lim="800000"/>
+            <a:headEnd/>
+            <a:tailEnd/>
+          </a:ln>
+          <a:extLst>
+            <a:ext uri="{909E8E84-426E-40dd-AFC4-6F175D3DCCD1}">
+              <a14:hiddenFill xmlns:a14="http://schemas.microsoft.com/office/drawing/2010/main">
+                <a:solidFill>
+                  <a:srgbClr val="FFFFFF"/>
+                </a:solidFill>
+              </a14:hiddenFill>
+            </a:ext>
+            <a:ext uri="{FAA26D3D-D897-4be2-8F04-BA451C77F1D7}">
+              <ma14:placeholderFlag xmlns:ma14="http://schemas.microsoft.com/office/mac/drawingml/2011/main" val="1"/>
+            </a:ext>
+          </a:extLst>
+        </p:spPr>
+      </p:sp>
+      <p:sp>
+        <p:nvSpPr>
+          <p:cNvPr id="16387" name="Rectangle 3"/>
+          <p:cNvSpPr>
+            <a:spLocks noGrp="1" noChangeArrowheads="1"/>
+          </p:cNvSpPr>
+          <p:nvPr>
+            <p:ph type="body" idx="1"/>
+          </p:nvPr>
+        </p:nvSpPr>
+        <p:spPr bwMode="auto">
+          <a:noFill/>
+          <a:extLst>
+            <a:ext uri="{909E8E84-426E-40dd-AFC4-6F175D3DCCD1}">
+              <a14:hiddenFill xmlns:a14="http://schemas.microsoft.com/office/drawing/2010/main">
+                <a:solidFill>
+                  <a:srgbClr val="FFFFFF"/>
+                </a:solidFill>
+              </a14:hiddenFill>
+            </a:ext>
+            <a:ext uri="{91240B29-F687-4f45-9708-019B960494DF}">
+              <a14:hiddenLine xmlns:a14="http://schemas.microsoft.com/office/drawing/2010/main" w="9525">
+                <a:solidFill>
+                  <a:srgbClr val="000000"/>
+                </a:solidFill>
+                <a:miter lim="800000"/>
+                <a:headEnd/>
+                <a:tailEnd/>
+              </a14:hiddenLine>
+            </a:ext>
+          </a:extLst>
+        </p:spPr>
+        <p:txBody>
+          <a:bodyPr wrap="square" numCol="1" anchor="t" anchorCtr="0" compatLnSpc="1">
+            <a:prstTxWarp prst="textNoShape">
+              <a:avLst/>
+            </a:prstTxWarp>
+          </a:bodyPr>
+          <a:lstStyle/>
+          <a:p>
+            <a:pPr eaLnBrk="1" hangingPunct="1"/>
+            <a:r>
+              <a:rPr lang="en-US">
+                <a:latin typeface="Calibri" charset="0"/>
+              </a:rPr>
+              <a:t>Started at 3:04 </a:t>
+            </a:r>
           </a:p>
         </p:txBody>
       </p:sp>
     </p:spTree>
-    <p:extLst>
-      <p:ext uri="{BB962C8B-B14F-4D97-AF65-F5344CB8AC3E}">
-        <p14:creationId xmlns:p14="http://schemas.microsoft.com/office/powerpoint/2010/main" val="963676054"/>
-      </p:ext>
-    </p:extLst>
   </p:cSld>
   <p:clrMapOvr>
     <a:masterClrMapping/>
@@ -903,7 +1277,7 @@
             <a:fld id="{3560C2FB-C494-1A46-A471-884A4E75440F}" type="slidenum">
               <a:rPr lang="en-US" smtClean="0"/>
               <a:pPr/>
-              <a:t>5</a:t>
+              <a:t>8</a:t>
             </a:fld>
             <a:endParaRPr lang="en-US" dirty="0"/>
           </a:p>
@@ -988,7 +1362,92 @@
             <a:fld id="{3560C2FB-C494-1A46-A471-884A4E75440F}" type="slidenum">
               <a:rPr lang="en-US" smtClean="0"/>
               <a:pPr/>
-              <a:t>6</a:t>
+              <a:t>9</a:t>
+            </a:fld>
+            <a:endParaRPr lang="en-US" dirty="0"/>
+          </a:p>
+        </p:txBody>
+      </p:sp>
+    </p:spTree>
+    <p:extLst>
+      <p:ext uri="{BB962C8B-B14F-4D97-AF65-F5344CB8AC3E}">
+        <p14:creationId xmlns:p14="http://schemas.microsoft.com/office/powerpoint/2010/main" val="963676054"/>
+      </p:ext>
+    </p:extLst>
+  </p:cSld>
+  <p:clrMapOvr>
+    <a:masterClrMapping/>
+  </p:clrMapOvr>
+</p:notes>
+</file>
+
+<file path=ppt/notesSlides/notesSlide7.xml><?xml version="1.0" encoding="utf-8"?>
+<p:notes xmlns:a="http://schemas.openxmlformats.org/drawingml/2006/main" xmlns:r="http://schemas.openxmlformats.org/officeDocument/2006/relationships" xmlns:p="http://schemas.openxmlformats.org/presentationml/2006/main">
+  <p:cSld>
+    <p:spTree>
+      <p:nvGrpSpPr>
+        <p:cNvPr id="1" name=""/>
+        <p:cNvGrpSpPr/>
+        <p:nvPr/>
+      </p:nvGrpSpPr>
+      <p:grpSpPr>
+        <a:xfrm>
+          <a:off x="0" y="0"/>
+          <a:ext cx="0" cy="0"/>
+          <a:chOff x="0" y="0"/>
+          <a:chExt cx="0" cy="0"/>
+        </a:xfrm>
+      </p:grpSpPr>
+      <p:sp>
+        <p:nvSpPr>
+          <p:cNvPr id="2" name="Slide Image Placeholder 1"/>
+          <p:cNvSpPr>
+            <a:spLocks noGrp="1" noRot="1" noChangeAspect="1"/>
+          </p:cNvSpPr>
+          <p:nvPr>
+            <p:ph type="sldImg"/>
+          </p:nvPr>
+        </p:nvSpPr>
+        <p:spPr/>
+      </p:sp>
+      <p:sp>
+        <p:nvSpPr>
+          <p:cNvPr id="3" name="Notes Placeholder 2"/>
+          <p:cNvSpPr>
+            <a:spLocks noGrp="1"/>
+          </p:cNvSpPr>
+          <p:nvPr>
+            <p:ph type="body" idx="1"/>
+          </p:nvPr>
+        </p:nvSpPr>
+        <p:spPr/>
+        <p:txBody>
+          <a:bodyPr/>
+          <a:lstStyle/>
+          <a:p>
+            <a:endParaRPr lang="en-US"/>
+          </a:p>
+        </p:txBody>
+      </p:sp>
+      <p:sp>
+        <p:nvSpPr>
+          <p:cNvPr id="4" name="Slide Number Placeholder 3"/>
+          <p:cNvSpPr>
+            <a:spLocks noGrp="1"/>
+          </p:cNvSpPr>
+          <p:nvPr>
+            <p:ph type="sldNum" sz="quarter" idx="10"/>
+          </p:nvPr>
+        </p:nvSpPr>
+        <p:spPr/>
+        <p:txBody>
+          <a:bodyPr/>
+          <a:lstStyle/>
+          <a:p>
+            <a:fld id="{3560C2FB-C494-1A46-A471-884A4E75440F}" type="slidenum">
+              <a:rPr lang="en-US" smtClean="0"/>
+              <a:pPr/>
+              <a:t>10</a:t>
             </a:fld>
             <a:endParaRPr lang="en-US" dirty="0"/>
           </a:p>
@@ -5326,6 +5785,128 @@
 </p:sld>
 </file>
 
+<file path=ppt/slides/slide10.xml><?xml version="1.0" encoding="utf-8"?>
+<p:sld xmlns:a="http://schemas.openxmlformats.org/drawingml/2006/main" xmlns:r="http://schemas.openxmlformats.org/officeDocument/2006/relationships" xmlns:p="http://schemas.openxmlformats.org/presentationml/2006/main">
+  <p:cSld>
+    <p:spTree>
+      <p:nvGrpSpPr>
+        <p:cNvPr id="1" name=""/>
+        <p:cNvGrpSpPr/>
+        <p:nvPr/>
+      </p:nvGrpSpPr>
+      <p:grpSpPr>
+        <a:xfrm>
+          <a:off x="0" y="0"/>
+          <a:ext cx="0" cy="0"/>
+          <a:chOff x="0" y="0"/>
+          <a:chExt cx="0" cy="0"/>
+        </a:xfrm>
+      </p:grpSpPr>
+      <p:sp>
+        <p:nvSpPr>
+          <p:cNvPr id="3" name="Text Placeholder 2"/>
+          <p:cNvSpPr>
+            <a:spLocks noGrp="1"/>
+          </p:cNvSpPr>
+          <p:nvPr>
+            <p:ph type="body" sz="quarter" idx="11"/>
+          </p:nvPr>
+        </p:nvSpPr>
+        <p:spPr/>
+        <p:txBody>
+          <a:bodyPr/>
+          <a:lstStyle/>
+          <a:p>
+            <a:r>
+              <a:rPr lang="en-US" sz="4700" dirty="0"/>
+              <a:t>Thank you</a:t>
+            </a:r>
+          </a:p>
+        </p:txBody>
+      </p:sp>
+      <p:sp>
+        <p:nvSpPr>
+          <p:cNvPr id="5" name="Text Placeholder 4"/>
+          <p:cNvSpPr>
+            <a:spLocks noGrp="1"/>
+          </p:cNvSpPr>
+          <p:nvPr>
+            <p:ph type="body" sz="quarter" idx="12"/>
+          </p:nvPr>
+        </p:nvSpPr>
+        <p:spPr/>
+        <p:txBody>
+          <a:bodyPr/>
+          <a:lstStyle/>
+          <a:p>
+            <a:r>
+              <a:rPr lang="en-US" dirty="0" smtClean="0"/>
+              <a:t>Brightcove Learning</a:t>
+            </a:r>
+            <a:endParaRPr lang="en-US" dirty="0"/>
+          </a:p>
+        </p:txBody>
+      </p:sp>
+      <p:sp>
+        <p:nvSpPr>
+          <p:cNvPr id="4" name="Slide Number Placeholder 3"/>
+          <p:cNvSpPr>
+            <a:spLocks noGrp="1"/>
+          </p:cNvSpPr>
+          <p:nvPr>
+            <p:ph type="sldNum" sz="quarter" idx="4294967295"/>
+          </p:nvPr>
+        </p:nvSpPr>
+        <p:spPr>
+          <a:xfrm>
+            <a:off x="1" y="9253119"/>
+            <a:ext cx="812230" cy="403878"/>
+          </a:xfrm>
+          <a:prstGeom prst="rect">
+            <a:avLst/>
+          </a:prstGeom>
+        </p:spPr>
+        <p:txBody>
+          <a:bodyPr/>
+          <a:lstStyle/>
+          <a:p>
+            <a:pPr>
+              <a:defRPr/>
+            </a:pPr>
+            <a:fld id="{E089BD15-BC77-46D6-86B9-64976AF1A8F1}" type="slidenum">
+              <a:rPr lang="en-US" smtClean="0"/>
+              <a:pPr>
+                <a:defRPr/>
+              </a:pPr>
+              <a:t>10</a:t>
+            </a:fld>
+            <a:endParaRPr lang="en-US" dirty="0"/>
+          </a:p>
+        </p:txBody>
+      </p:sp>
+    </p:spTree>
+    <p:extLst>
+      <p:ext uri="{BB962C8B-B14F-4D97-AF65-F5344CB8AC3E}">
+        <p14:creationId xmlns:p14="http://schemas.microsoft.com/office/powerpoint/2010/main" val="3700295984"/>
+      </p:ext>
+    </p:extLst>
+  </p:cSld>
+  <p:clrMapOvr>
+    <a:masterClrMapping/>
+  </p:clrMapOvr>
+  <p:transition xmlns:p14="http://schemas.microsoft.com/office/powerpoint/2010/main" spd="med">
+    <p:fade/>
+  </p:transition>
+  <p:timing>
+    <p:tnLst>
+      <p:par>
+        <p:cTn xmlns:p14="http://schemas.microsoft.com/office/powerpoint/2010/main" id="1" dur="indefinite" restart="never" nodeType="tmRoot"/>
+      </p:par>
+    </p:tnLst>
+  </p:timing>
+</p:sld>
+</file>
+
 <file path=ppt/slides/slide2.xml><?xml version="1.0" encoding="utf-8"?>
 <p:sld xmlns:a="http://schemas.openxmlformats.org/drawingml/2006/main" xmlns:r="http://schemas.openxmlformats.org/officeDocument/2006/relationships" xmlns:p="http://schemas.openxmlformats.org/presentationml/2006/main">
   <p:cSld>
@@ -5345,30 +5926,206 @@
       </p:grpSpPr>
       <p:sp>
         <p:nvSpPr>
-          <p:cNvPr id="3" name="Title 2"/>
-          <p:cNvSpPr>
+          <p:cNvPr id="15361" name="Slide Number Placeholder 4"/>
+          <p:cNvSpPr txBox="1">
             <a:spLocks noGrp="1"/>
           </p:cNvSpPr>
+          <p:nvPr/>
+        </p:nvSpPr>
+        <p:spPr bwMode="auto">
+          <a:xfrm>
+            <a:off x="315913" y="9190038"/>
+            <a:ext cx="866775" cy="541337"/>
+          </a:xfrm>
+          <a:prstGeom prst="rect">
+            <a:avLst/>
+          </a:prstGeom>
+          <a:noFill/>
+          <a:ln>
+            <a:noFill/>
+          </a:ln>
+          <a:extLst>
+            <a:ext uri="{909E8E84-426E-40dd-AFC4-6F175D3DCCD1}">
+              <a14:hiddenFill xmlns:a14="http://schemas.microsoft.com/office/drawing/2010/main">
+                <a:solidFill>
+                  <a:srgbClr val="FFFFFF"/>
+                </a:solidFill>
+              </a14:hiddenFill>
+            </a:ext>
+            <a:ext uri="{91240B29-F687-4f45-9708-019B960494DF}">
+              <a14:hiddenLine xmlns:a14="http://schemas.microsoft.com/office/drawing/2010/main" w="9525">
+                <a:solidFill>
+                  <a:srgbClr val="000000"/>
+                </a:solidFill>
+                <a:miter lim="800000"/>
+                <a:headEnd/>
+                <a:tailEnd/>
+              </a14:hiddenLine>
+            </a:ext>
+          </a:extLst>
+        </p:spPr>
+        <p:txBody>
+          <a:bodyPr lIns="154707" tIns="77354" rIns="154707" bIns="77354"/>
+          <a:lstStyle>
+            <a:lvl1pPr eaLnBrk="0" hangingPunct="0">
+              <a:defRPr sz="3000">
+                <a:solidFill>
+                  <a:schemeClr val="tx1"/>
+                </a:solidFill>
+                <a:latin typeface="Arial" charset="0"/>
+                <a:ea typeface="ＭＳ Ｐゴシック" charset="0"/>
+                <a:cs typeface="ＭＳ Ｐゴシック" charset="0"/>
+              </a:defRPr>
+            </a:lvl1pPr>
+            <a:lvl2pPr marL="742950" indent="-285750" eaLnBrk="0" hangingPunct="0">
+              <a:defRPr sz="3000">
+                <a:solidFill>
+                  <a:schemeClr val="tx1"/>
+                </a:solidFill>
+                <a:latin typeface="Arial" charset="0"/>
+                <a:ea typeface="ＭＳ Ｐゴシック" charset="0"/>
+              </a:defRPr>
+            </a:lvl2pPr>
+            <a:lvl3pPr marL="1143000" indent="-228600" eaLnBrk="0" hangingPunct="0">
+              <a:defRPr sz="3000">
+                <a:solidFill>
+                  <a:schemeClr val="tx1"/>
+                </a:solidFill>
+                <a:latin typeface="Arial" charset="0"/>
+                <a:ea typeface="ＭＳ Ｐゴシック" charset="0"/>
+              </a:defRPr>
+            </a:lvl3pPr>
+            <a:lvl4pPr marL="1600200" indent="-228600" eaLnBrk="0" hangingPunct="0">
+              <a:defRPr sz="3000">
+                <a:solidFill>
+                  <a:schemeClr val="tx1"/>
+                </a:solidFill>
+                <a:latin typeface="Arial" charset="0"/>
+                <a:ea typeface="ＭＳ Ｐゴシック" charset="0"/>
+              </a:defRPr>
+            </a:lvl4pPr>
+            <a:lvl5pPr marL="2057400" indent="-228600" eaLnBrk="0" hangingPunct="0">
+              <a:defRPr sz="3000">
+                <a:solidFill>
+                  <a:schemeClr val="tx1"/>
+                </a:solidFill>
+                <a:latin typeface="Arial" charset="0"/>
+                <a:ea typeface="ＭＳ Ｐゴシック" charset="0"/>
+              </a:defRPr>
+            </a:lvl5pPr>
+            <a:lvl6pPr marL="2514600" indent="-228600" defTabSz="773113" eaLnBrk="0" fontAlgn="base" hangingPunct="0">
+              <a:spcBef>
+                <a:spcPct val="0"/>
+              </a:spcBef>
+              <a:spcAft>
+                <a:spcPct val="0"/>
+              </a:spcAft>
+              <a:defRPr sz="3000">
+                <a:solidFill>
+                  <a:schemeClr val="tx1"/>
+                </a:solidFill>
+                <a:latin typeface="Arial" charset="0"/>
+                <a:ea typeface="ＭＳ Ｐゴシック" charset="0"/>
+              </a:defRPr>
+            </a:lvl6pPr>
+            <a:lvl7pPr marL="2971800" indent="-228600" defTabSz="773113" eaLnBrk="0" fontAlgn="base" hangingPunct="0">
+              <a:spcBef>
+                <a:spcPct val="0"/>
+              </a:spcBef>
+              <a:spcAft>
+                <a:spcPct val="0"/>
+              </a:spcAft>
+              <a:defRPr sz="3000">
+                <a:solidFill>
+                  <a:schemeClr val="tx1"/>
+                </a:solidFill>
+                <a:latin typeface="Arial" charset="0"/>
+                <a:ea typeface="ＭＳ Ｐゴシック" charset="0"/>
+              </a:defRPr>
+            </a:lvl7pPr>
+            <a:lvl8pPr marL="3429000" indent="-228600" defTabSz="773113" eaLnBrk="0" fontAlgn="base" hangingPunct="0">
+              <a:spcBef>
+                <a:spcPct val="0"/>
+              </a:spcBef>
+              <a:spcAft>
+                <a:spcPct val="0"/>
+              </a:spcAft>
+              <a:defRPr sz="3000">
+                <a:solidFill>
+                  <a:schemeClr val="tx1"/>
+                </a:solidFill>
+                <a:latin typeface="Arial" charset="0"/>
+                <a:ea typeface="ＭＳ Ｐゴシック" charset="0"/>
+              </a:defRPr>
+            </a:lvl8pPr>
+            <a:lvl9pPr marL="3886200" indent="-228600" defTabSz="773113" eaLnBrk="0" fontAlgn="base" hangingPunct="0">
+              <a:spcBef>
+                <a:spcPct val="0"/>
+              </a:spcBef>
+              <a:spcAft>
+                <a:spcPct val="0"/>
+              </a:spcAft>
+              <a:defRPr sz="3000">
+                <a:solidFill>
+                  <a:schemeClr val="tx1"/>
+                </a:solidFill>
+                <a:latin typeface="Arial" charset="0"/>
+                <a:ea typeface="ＭＳ Ｐゴシック" charset="0"/>
+              </a:defRPr>
+            </a:lvl9pPr>
+          </a:lstStyle>
+          <a:p>
+            <a:fld id="{6503B87E-2812-EF44-8908-AEC923A4DD58}" type="slidenum">
+              <a:rPr lang="en-US" sz="1500" b="1">
+                <a:solidFill>
+                  <a:srgbClr val="7B7B7B"/>
+                </a:solidFill>
+              </a:rPr>
+              <a:pPr/>
+              <a:t>2</a:t>
+            </a:fld>
+            <a:endParaRPr lang="en-US" sz="1500" b="1">
+              <a:solidFill>
+                <a:srgbClr val="7B7B7B"/>
+              </a:solidFill>
+            </a:endParaRPr>
+          </a:p>
+        </p:txBody>
+      </p:sp>
+      <p:sp>
+        <p:nvSpPr>
+          <p:cNvPr id="15362" name="Rectangle 2"/>
+          <p:cNvSpPr>
+            <a:spLocks noGrp="1" noChangeArrowheads="1"/>
+          </p:cNvSpPr>
           <p:nvPr>
             <p:ph type="title"/>
           </p:nvPr>
         </p:nvSpPr>
-        <p:spPr/>
+        <p:spPr>
+          <a:xfrm>
+            <a:off x="541338" y="300038"/>
+            <a:ext cx="14724062" cy="1449387"/>
+          </a:xfrm>
+        </p:spPr>
         <p:txBody>
           <a:bodyPr/>
           <a:lstStyle/>
           <a:p>
-            <a:r>
-              <a:rPr lang="en-US" dirty="0" smtClean="0"/>
-              <a:t>Title</a:t>
-            </a:r>
-            <a:endParaRPr lang="en-US" dirty="0"/>
-          </a:p>
-        </p:txBody>
-      </p:sp>
-      <p:sp>
-        <p:nvSpPr>
-          <p:cNvPr id="4" name="Content Placeholder 3"/>
+            <a:pPr eaLnBrk="1" hangingPunct="1"/>
+            <a:r>
+              <a:rPr lang="en-US">
+                <a:latin typeface="Arial" charset="0"/>
+                <a:ea typeface="ＭＳ Ｐゴシック" charset="0"/>
+              </a:rPr>
+              <a:t>What is the Media API?</a:t>
+            </a:r>
+          </a:p>
+        </p:txBody>
+      </p:sp>
+      <p:sp>
+        <p:nvSpPr>
+          <p:cNvPr id="15363" name="Content Placeholder 4"/>
           <p:cNvSpPr>
             <a:spLocks noGrp="1"/>
           </p:cNvSpPr>
@@ -5376,34 +6133,369 @@
             <p:ph idx="1"/>
           </p:nvPr>
         </p:nvSpPr>
-        <p:spPr/>
-        <p:txBody>
-          <a:bodyPr>
-            <a:normAutofit/>
-          </a:bodyPr>
+        <p:spPr>
+          <a:xfrm>
+            <a:off x="541338" y="1911350"/>
+            <a:ext cx="15878175" cy="6202363"/>
+          </a:xfrm>
+        </p:spPr>
+        <p:txBody>
+          <a:bodyPr/>
           <a:lstStyle/>
           <a:p>
-            <a:r>
-              <a:rPr lang="en-US" sz="3200" dirty="0" smtClean="0"/>
-              <a:t>Content</a:t>
-            </a:r>
-            <a:endParaRPr lang="en-US" sz="3200" dirty="0" smtClean="0"/>
-          </a:p>
-          <a:p>
-            <a:endParaRPr lang="en-US" sz="3200" dirty="0"/>
+            <a:pPr indent="9525">
+              <a:lnSpc>
+                <a:spcPct val="90000"/>
+              </a:lnSpc>
+            </a:pPr>
+            <a:r>
+              <a:rPr lang="en-US" sz="3200" dirty="0" smtClean="0">
+                <a:solidFill>
+                  <a:srgbClr val="23383A"/>
+                </a:solidFill>
+                <a:latin typeface="Arial" charset="0"/>
+                <a:ea typeface="ＭＳ Ｐゴシック" charset="0"/>
+              </a:rPr>
+              <a:t>An API for accessing the content and metadata in your Brightcove account</a:t>
+            </a:r>
+            <a:endParaRPr lang="en-US" sz="3200" dirty="0" smtClean="0">
+              <a:solidFill>
+                <a:srgbClr val="23383A"/>
+              </a:solidFill>
+              <a:latin typeface="Arial" charset="0"/>
+              <a:ea typeface="ＭＳ Ｐゴシック" charset="0"/>
+            </a:endParaRPr>
+          </a:p>
+          <a:p>
+            <a:pPr indent="9525">
+              <a:lnSpc>
+                <a:spcPct val="90000"/>
+              </a:lnSpc>
+            </a:pPr>
+            <a:r>
+              <a:rPr lang="en-US" sz="3200" dirty="0" smtClean="0">
+                <a:solidFill>
+                  <a:srgbClr val="23383A"/>
+                </a:solidFill>
+                <a:latin typeface="Arial" charset="0"/>
+                <a:ea typeface="ＭＳ Ｐゴシック" charset="0"/>
+              </a:rPr>
+              <a:t>R</a:t>
+            </a:r>
+            <a:r>
+              <a:rPr lang="en-US" sz="3200" dirty="0" smtClean="0">
+                <a:solidFill>
+                  <a:srgbClr val="23383A"/>
+                </a:solidFill>
+                <a:latin typeface="Arial" charset="0"/>
+                <a:ea typeface="ＭＳ Ｐゴシック" charset="0"/>
+              </a:rPr>
+              <a:t>ead </a:t>
+            </a:r>
+            <a:r>
+              <a:rPr lang="en-US" sz="3200" dirty="0" smtClean="0">
+                <a:solidFill>
+                  <a:srgbClr val="23383A"/>
+                </a:solidFill>
+                <a:latin typeface="Arial" charset="0"/>
+                <a:ea typeface="ＭＳ Ｐゴシック" charset="0"/>
+              </a:rPr>
+              <a:t>requests are REST based</a:t>
+            </a:r>
+          </a:p>
+          <a:p>
+            <a:pPr lvl="1" indent="9525">
+              <a:lnSpc>
+                <a:spcPct val="90000"/>
+              </a:lnSpc>
+            </a:pPr>
+            <a:r>
+              <a:rPr lang="en-US" sz="2800" dirty="0" smtClean="0">
+                <a:solidFill>
+                  <a:srgbClr val="23383A"/>
+                </a:solidFill>
+                <a:latin typeface="Arial" charset="0"/>
+                <a:ea typeface="ＭＳ Ｐゴシック" charset="0"/>
+              </a:rPr>
+              <a:t>REST (</a:t>
+            </a:r>
+            <a:r>
+              <a:rPr lang="en-US" sz="2800" dirty="0" smtClean="0">
+                <a:solidFill>
+                  <a:schemeClr val="tx1"/>
+                </a:solidFill>
+                <a:latin typeface="Arial" charset="0"/>
+                <a:ea typeface="ＭＳ Ｐゴシック" charset="0"/>
+                <a:cs typeface="ＭＳ Ｐゴシック" charset="0"/>
+              </a:rPr>
+              <a:t>Representational </a:t>
+            </a:r>
+            <a:r>
+              <a:rPr lang="en-US" sz="2800" dirty="0">
+                <a:solidFill>
+                  <a:schemeClr val="tx1"/>
+                </a:solidFill>
+                <a:latin typeface="Arial" charset="0"/>
+                <a:ea typeface="ＭＳ Ｐゴシック" charset="0"/>
+                <a:cs typeface="ＭＳ Ｐゴシック" charset="0"/>
+              </a:rPr>
+              <a:t>State Transfer</a:t>
+            </a:r>
+            <a:r>
+              <a:rPr lang="en-US" sz="2800" dirty="0" smtClean="0">
+                <a:solidFill>
+                  <a:schemeClr val="tx1"/>
+                </a:solidFill>
+                <a:latin typeface="Arial" charset="0"/>
+                <a:ea typeface="ＭＳ Ｐゴシック" charset="0"/>
+                <a:cs typeface="ＭＳ Ｐゴシック" charset="0"/>
+              </a:rPr>
+              <a:t>)</a:t>
+            </a:r>
+            <a:endParaRPr lang="en-US" sz="2800" dirty="0" smtClean="0">
+              <a:solidFill>
+                <a:srgbClr val="23383A"/>
+              </a:solidFill>
+              <a:latin typeface="Arial" charset="0"/>
+              <a:ea typeface="ＭＳ Ｐゴシック" charset="0"/>
+            </a:endParaRPr>
+          </a:p>
+          <a:p>
+            <a:pPr marL="1169988" lvl="1" indent="-396875">
+              <a:spcBef>
+                <a:spcPct val="15000"/>
+              </a:spcBef>
+              <a:spcAft>
+                <a:spcPct val="5000"/>
+              </a:spcAft>
+              <a:buFontTx/>
+              <a:buBlip>
+                <a:blip r:embed="rId3"/>
+              </a:buBlip>
+            </a:pPr>
+            <a:r>
+              <a:rPr lang="en-US" sz="2800" dirty="0" smtClean="0">
+                <a:solidFill>
+                  <a:schemeClr val="tx1"/>
+                </a:solidFill>
+                <a:latin typeface="Arial" charset="0"/>
+                <a:ea typeface="ＭＳ Ｐゴシック" charset="0"/>
+                <a:cs typeface="ＭＳ Ｐゴシック" charset="0"/>
+              </a:rPr>
+              <a:t>A standard way of accessing data stored remotely over HTTP</a:t>
+            </a:r>
+          </a:p>
+          <a:p>
+            <a:pPr marL="1169988" lvl="1" indent="-396875">
+              <a:spcBef>
+                <a:spcPct val="15000"/>
+              </a:spcBef>
+              <a:spcAft>
+                <a:spcPct val="5000"/>
+              </a:spcAft>
+              <a:buFontTx/>
+              <a:buBlip>
+                <a:blip r:embed="rId3"/>
+              </a:buBlip>
+            </a:pPr>
+            <a:r>
+              <a:rPr lang="en-US" sz="2800" dirty="0" smtClean="0">
+                <a:solidFill>
+                  <a:schemeClr val="tx1"/>
+                </a:solidFill>
+                <a:latin typeface="Arial" charset="0"/>
+                <a:ea typeface="ＭＳ Ｐゴシック" charset="0"/>
+                <a:cs typeface="ＭＳ Ｐゴシック" charset="0"/>
+              </a:rPr>
+              <a:t>A cousin of SOAP = technology that powers </a:t>
+            </a:r>
+            <a:r>
+              <a:rPr lang="ja-JP" altLang="en-US" sz="2800" dirty="0" smtClean="0">
+                <a:solidFill>
+                  <a:schemeClr val="tx1"/>
+                </a:solidFill>
+                <a:latin typeface="Arial" charset="0"/>
+                <a:ea typeface="ＭＳ Ｐゴシック" charset="0"/>
+                <a:cs typeface="ＭＳ Ｐゴシック" charset="0"/>
+              </a:rPr>
+              <a:t>“</a:t>
+            </a:r>
+            <a:r>
+              <a:rPr lang="en-US" altLang="ja-JP" sz="2800" dirty="0" smtClean="0">
+                <a:solidFill>
+                  <a:schemeClr val="tx1"/>
+                </a:solidFill>
+                <a:latin typeface="Arial" charset="0"/>
+                <a:ea typeface="ＭＳ Ｐゴシック" charset="0"/>
+                <a:cs typeface="ＭＳ Ｐゴシック" charset="0"/>
+              </a:rPr>
+              <a:t>web services.</a:t>
+            </a:r>
+            <a:r>
+              <a:rPr lang="ja-JP" altLang="en-US" sz="2800" dirty="0" smtClean="0">
+                <a:solidFill>
+                  <a:schemeClr val="tx1"/>
+                </a:solidFill>
+                <a:latin typeface="Arial" charset="0"/>
+                <a:ea typeface="ＭＳ Ｐゴシック" charset="0"/>
+                <a:cs typeface="ＭＳ Ｐゴシック" charset="0"/>
+              </a:rPr>
+              <a:t>”</a:t>
+            </a:r>
+            <a:endParaRPr lang="en-US" altLang="ja-JP" sz="2800" dirty="0" smtClean="0">
+              <a:solidFill>
+                <a:schemeClr val="tx1"/>
+              </a:solidFill>
+              <a:latin typeface="Arial" charset="0"/>
+              <a:ea typeface="ＭＳ Ｐゴシック" charset="0"/>
+              <a:cs typeface="ＭＳ Ｐゴシック" charset="0"/>
+            </a:endParaRPr>
+          </a:p>
+          <a:p>
+            <a:pPr marL="1169988" lvl="1" indent="-396875">
+              <a:spcBef>
+                <a:spcPct val="15000"/>
+              </a:spcBef>
+              <a:spcAft>
+                <a:spcPct val="5000"/>
+              </a:spcAft>
+              <a:buFontTx/>
+              <a:buBlip>
+                <a:blip r:embed="rId3"/>
+              </a:buBlip>
+            </a:pPr>
+            <a:r>
+              <a:rPr lang="en-US" sz="2800" dirty="0" smtClean="0">
+                <a:solidFill>
+                  <a:schemeClr val="tx1"/>
+                </a:solidFill>
+                <a:latin typeface="Arial" charset="0"/>
+                <a:ea typeface="ＭＳ Ｐゴシック" charset="0"/>
+                <a:cs typeface="ＭＳ Ｐゴシック" charset="0"/>
+              </a:rPr>
+              <a:t>Abstracts the workings of the remote system </a:t>
+            </a:r>
+          </a:p>
+          <a:p>
+            <a:pPr marL="1169988" lvl="1" indent="-396875">
+              <a:spcBef>
+                <a:spcPct val="15000"/>
+              </a:spcBef>
+              <a:spcAft>
+                <a:spcPct val="5000"/>
+              </a:spcAft>
+              <a:buFontTx/>
+              <a:buBlip>
+                <a:blip r:embed="rId3"/>
+              </a:buBlip>
+            </a:pPr>
+            <a:r>
+              <a:rPr lang="en-US" sz="2800" dirty="0" smtClean="0">
+                <a:solidFill>
+                  <a:schemeClr val="tx1"/>
+                </a:solidFill>
+                <a:latin typeface="Arial" charset="0"/>
+                <a:ea typeface="ＭＳ Ｐゴシック" charset="0"/>
+                <a:cs typeface="ＭＳ Ｐゴシック" charset="0"/>
+              </a:rPr>
+              <a:t>All your code needs to understand is the format of the returned data</a:t>
+            </a:r>
+          </a:p>
+          <a:p>
+            <a:pPr indent="9525">
+              <a:spcBef>
+                <a:spcPct val="50000"/>
+              </a:spcBef>
+              <a:buFontTx/>
+              <a:buBlip>
+                <a:blip r:embed="rId4"/>
+              </a:buBlip>
+            </a:pPr>
+            <a:r>
+              <a:rPr lang="en-US" sz="3200" dirty="0" smtClean="0">
+                <a:solidFill>
+                  <a:schemeClr val="tx1"/>
+                </a:solidFill>
+                <a:latin typeface="Arial" charset="0"/>
+                <a:ea typeface="ＭＳ Ｐゴシック" charset="0"/>
+                <a:cs typeface="ＭＳ Ｐゴシック" charset="0"/>
+              </a:rPr>
+              <a:t>Example Call</a:t>
+            </a:r>
+            <a:endParaRPr lang="en-US" sz="3200" dirty="0">
+              <a:solidFill>
+                <a:schemeClr val="tx1"/>
+              </a:solidFill>
+              <a:latin typeface="Arial" charset="0"/>
+              <a:ea typeface="ＭＳ Ｐゴシック" charset="0"/>
+              <a:cs typeface="ＭＳ Ｐゴシック" charset="0"/>
+            </a:endParaRPr>
+          </a:p>
+          <a:p>
+            <a:pPr marL="1169988" lvl="1" indent="-396875">
+              <a:spcBef>
+                <a:spcPct val="15000"/>
+              </a:spcBef>
+              <a:spcAft>
+                <a:spcPct val="5000"/>
+              </a:spcAft>
+              <a:buFontTx/>
+              <a:buBlip>
+                <a:blip r:embed="rId3"/>
+              </a:buBlip>
+            </a:pPr>
+            <a:r>
+              <a:rPr lang="en-US" sz="2800" dirty="0">
+                <a:solidFill>
+                  <a:schemeClr val="accent2"/>
+                </a:solidFill>
+                <a:latin typeface="Source Code Pro"/>
+                <a:ea typeface="ＭＳ Ｐゴシック" charset="0"/>
+                <a:cs typeface="Source Code Pro"/>
+                <a:hlinkClick r:id="rId5"/>
+              </a:rPr>
+              <a:t>http://api.brightcove.com/services/library?command=search_videos&amp;token=</a:t>
+            </a:r>
+            <a:r>
+              <a:rPr lang="en-US" sz="2800" dirty="0">
+                <a:latin typeface="Source Code Pro"/>
+                <a:ea typeface="ＭＳ Ｐゴシック" charset="0"/>
+                <a:cs typeface="Source Code Pro"/>
+                <a:hlinkClick r:id="rId5"/>
+              </a:rPr>
+              <a:t>WDGO_XdKqXUpy8fzD41MKA8kAhQRAmdux8cu8LNhRzAywCnuBpgV_A..</a:t>
+            </a:r>
+            <a:endParaRPr lang="en-US" sz="2800" dirty="0">
+              <a:solidFill>
+                <a:schemeClr val="accent2"/>
+              </a:solidFill>
+              <a:latin typeface="Source Code Pro"/>
+              <a:ea typeface="ＭＳ Ｐゴシック" charset="0"/>
+              <a:cs typeface="Source Code Pro"/>
+            </a:endParaRPr>
+          </a:p>
+          <a:p>
+            <a:pPr indent="9525"/>
+            <a:endParaRPr lang="en-US" dirty="0">
+              <a:latin typeface="Arial" charset="0"/>
+              <a:ea typeface="ＭＳ Ｐゴシック" charset="0"/>
+            </a:endParaRPr>
           </a:p>
         </p:txBody>
       </p:sp>
     </p:spTree>
     <p:extLst>
       <p:ext uri="{BB962C8B-B14F-4D97-AF65-F5344CB8AC3E}">
-        <p14:creationId xmlns:p14="http://schemas.microsoft.com/office/powerpoint/2010/main" val="1723545958"/>
+        <p14:creationId xmlns:p14="http://schemas.microsoft.com/office/powerpoint/2010/main" val="1087471781"/>
       </p:ext>
     </p:extLst>
   </p:cSld>
   <p:clrMapOvr>
     <a:masterClrMapping/>
   </p:clrMapOvr>
+  <p:transition xmlns:p14="http://schemas.microsoft.com/office/powerpoint/2010/main">
+    <p:fade/>
+  </p:transition>
   <p:timing>
     <p:tnLst>
       <p:par>
@@ -5433,30 +6525,231 @@
       </p:grpSpPr>
       <p:sp>
         <p:nvSpPr>
-          <p:cNvPr id="3" name="Title 2"/>
-          <p:cNvSpPr>
+          <p:cNvPr id="15361" name="Slide Number Placeholder 4"/>
+          <p:cNvSpPr txBox="1">
             <a:spLocks noGrp="1"/>
           </p:cNvSpPr>
+          <p:nvPr/>
+        </p:nvSpPr>
+        <p:spPr bwMode="auto">
+          <a:xfrm>
+            <a:off x="315913" y="9190038"/>
+            <a:ext cx="866775" cy="541337"/>
+          </a:xfrm>
+          <a:prstGeom prst="rect">
+            <a:avLst/>
+          </a:prstGeom>
+          <a:noFill/>
+          <a:ln>
+            <a:noFill/>
+          </a:ln>
+          <a:extLst>
+            <a:ext uri="{909E8E84-426E-40dd-AFC4-6F175D3DCCD1}">
+              <a14:hiddenFill xmlns:a14="http://schemas.microsoft.com/office/drawing/2010/main">
+                <a:solidFill>
+                  <a:srgbClr val="FFFFFF"/>
+                </a:solidFill>
+              </a14:hiddenFill>
+            </a:ext>
+            <a:ext uri="{91240B29-F687-4f45-9708-019B960494DF}">
+              <a14:hiddenLine xmlns:a14="http://schemas.microsoft.com/office/drawing/2010/main" w="9525">
+                <a:solidFill>
+                  <a:srgbClr val="000000"/>
+                </a:solidFill>
+                <a:miter lim="800000"/>
+                <a:headEnd/>
+                <a:tailEnd/>
+              </a14:hiddenLine>
+            </a:ext>
+          </a:extLst>
+        </p:spPr>
+        <p:txBody>
+          <a:bodyPr lIns="154707" tIns="77354" rIns="154707" bIns="77354"/>
+          <a:lstStyle>
+            <a:lvl1pPr eaLnBrk="0" hangingPunct="0">
+              <a:defRPr sz="3000">
+                <a:solidFill>
+                  <a:schemeClr val="tx1"/>
+                </a:solidFill>
+                <a:latin typeface="Arial" charset="0"/>
+                <a:ea typeface="ＭＳ Ｐゴシック" charset="0"/>
+                <a:cs typeface="ＭＳ Ｐゴシック" charset="0"/>
+              </a:defRPr>
+            </a:lvl1pPr>
+            <a:lvl2pPr marL="742950" indent="-285750" eaLnBrk="0" hangingPunct="0">
+              <a:defRPr sz="3000">
+                <a:solidFill>
+                  <a:schemeClr val="tx1"/>
+                </a:solidFill>
+                <a:latin typeface="Arial" charset="0"/>
+                <a:ea typeface="ＭＳ Ｐゴシック" charset="0"/>
+              </a:defRPr>
+            </a:lvl2pPr>
+            <a:lvl3pPr marL="1143000" indent="-228600" eaLnBrk="0" hangingPunct="0">
+              <a:defRPr sz="3000">
+                <a:solidFill>
+                  <a:schemeClr val="tx1"/>
+                </a:solidFill>
+                <a:latin typeface="Arial" charset="0"/>
+                <a:ea typeface="ＭＳ Ｐゴシック" charset="0"/>
+              </a:defRPr>
+            </a:lvl3pPr>
+            <a:lvl4pPr marL="1600200" indent="-228600" eaLnBrk="0" hangingPunct="0">
+              <a:defRPr sz="3000">
+                <a:solidFill>
+                  <a:schemeClr val="tx1"/>
+                </a:solidFill>
+                <a:latin typeface="Arial" charset="0"/>
+                <a:ea typeface="ＭＳ Ｐゴシック" charset="0"/>
+              </a:defRPr>
+            </a:lvl4pPr>
+            <a:lvl5pPr marL="2057400" indent="-228600" eaLnBrk="0" hangingPunct="0">
+              <a:defRPr sz="3000">
+                <a:solidFill>
+                  <a:schemeClr val="tx1"/>
+                </a:solidFill>
+                <a:latin typeface="Arial" charset="0"/>
+                <a:ea typeface="ＭＳ Ｐゴシック" charset="0"/>
+              </a:defRPr>
+            </a:lvl5pPr>
+            <a:lvl6pPr marL="2514600" indent="-228600" defTabSz="773113" eaLnBrk="0" fontAlgn="base" hangingPunct="0">
+              <a:spcBef>
+                <a:spcPct val="0"/>
+              </a:spcBef>
+              <a:spcAft>
+                <a:spcPct val="0"/>
+              </a:spcAft>
+              <a:defRPr sz="3000">
+                <a:solidFill>
+                  <a:schemeClr val="tx1"/>
+                </a:solidFill>
+                <a:latin typeface="Arial" charset="0"/>
+                <a:ea typeface="ＭＳ Ｐゴシック" charset="0"/>
+              </a:defRPr>
+            </a:lvl6pPr>
+            <a:lvl7pPr marL="2971800" indent="-228600" defTabSz="773113" eaLnBrk="0" fontAlgn="base" hangingPunct="0">
+              <a:spcBef>
+                <a:spcPct val="0"/>
+              </a:spcBef>
+              <a:spcAft>
+                <a:spcPct val="0"/>
+              </a:spcAft>
+              <a:defRPr sz="3000">
+                <a:solidFill>
+                  <a:schemeClr val="tx1"/>
+                </a:solidFill>
+                <a:latin typeface="Arial" charset="0"/>
+                <a:ea typeface="ＭＳ Ｐゴシック" charset="0"/>
+              </a:defRPr>
+            </a:lvl7pPr>
+            <a:lvl8pPr marL="3429000" indent="-228600" defTabSz="773113" eaLnBrk="0" fontAlgn="base" hangingPunct="0">
+              <a:spcBef>
+                <a:spcPct val="0"/>
+              </a:spcBef>
+              <a:spcAft>
+                <a:spcPct val="0"/>
+              </a:spcAft>
+              <a:defRPr sz="3000">
+                <a:solidFill>
+                  <a:schemeClr val="tx1"/>
+                </a:solidFill>
+                <a:latin typeface="Arial" charset="0"/>
+                <a:ea typeface="ＭＳ Ｐゴシック" charset="0"/>
+              </a:defRPr>
+            </a:lvl8pPr>
+            <a:lvl9pPr marL="3886200" indent="-228600" defTabSz="773113" eaLnBrk="0" fontAlgn="base" hangingPunct="0">
+              <a:spcBef>
+                <a:spcPct val="0"/>
+              </a:spcBef>
+              <a:spcAft>
+                <a:spcPct val="0"/>
+              </a:spcAft>
+              <a:defRPr sz="3000">
+                <a:solidFill>
+                  <a:schemeClr val="tx1"/>
+                </a:solidFill>
+                <a:latin typeface="Arial" charset="0"/>
+                <a:ea typeface="ＭＳ Ｐゴシック" charset="0"/>
+              </a:defRPr>
+            </a:lvl9pPr>
+          </a:lstStyle>
+          <a:p>
+            <a:fld id="{6503B87E-2812-EF44-8908-AEC923A4DD58}" type="slidenum">
+              <a:rPr lang="en-US" sz="1500" b="1">
+                <a:solidFill>
+                  <a:srgbClr val="7B7B7B"/>
+                </a:solidFill>
+              </a:rPr>
+              <a:pPr/>
+              <a:t>3</a:t>
+            </a:fld>
+            <a:endParaRPr lang="en-US" sz="1500" b="1">
+              <a:solidFill>
+                <a:srgbClr val="7B7B7B"/>
+              </a:solidFill>
+            </a:endParaRPr>
+          </a:p>
+        </p:txBody>
+      </p:sp>
+      <p:sp>
+        <p:nvSpPr>
+          <p:cNvPr id="15362" name="Rectangle 2"/>
+          <p:cNvSpPr>
+            <a:spLocks noGrp="1" noChangeArrowheads="1"/>
+          </p:cNvSpPr>
           <p:nvPr>
             <p:ph type="title"/>
           </p:nvPr>
         </p:nvSpPr>
-        <p:spPr/>
+        <p:spPr>
+          <a:xfrm>
+            <a:off x="541338" y="300038"/>
+            <a:ext cx="14724062" cy="1449387"/>
+          </a:xfrm>
+        </p:spPr>
         <p:txBody>
           <a:bodyPr/>
           <a:lstStyle/>
           <a:p>
-            <a:r>
-              <a:rPr lang="en-US" dirty="0" smtClean="0"/>
-              <a:t>Title</a:t>
-            </a:r>
-            <a:endParaRPr lang="en-US" dirty="0"/>
-          </a:p>
-        </p:txBody>
-      </p:sp>
-      <p:sp>
-        <p:nvSpPr>
-          <p:cNvPr id="4" name="Content Placeholder 3"/>
+            <a:pPr eaLnBrk="1" hangingPunct="1"/>
+            <a:r>
+              <a:rPr lang="en-US" dirty="0">
+                <a:latin typeface="Arial" charset="0"/>
+                <a:ea typeface="ＭＳ Ｐゴシック" charset="0"/>
+              </a:rPr>
+              <a:t>What is the Media API</a:t>
+            </a:r>
+            <a:r>
+              <a:rPr lang="en-US" dirty="0" smtClean="0">
+                <a:latin typeface="Arial" charset="0"/>
+                <a:ea typeface="ＭＳ Ｐゴシック" charset="0"/>
+              </a:rPr>
+              <a:t>? (</a:t>
+            </a:r>
+            <a:r>
+              <a:rPr lang="en-US" dirty="0" err="1" smtClean="0">
+                <a:latin typeface="Arial" charset="0"/>
+                <a:ea typeface="ＭＳ Ｐゴシック" charset="0"/>
+              </a:rPr>
+              <a:t>cont</a:t>
+            </a:r>
+            <a:r>
+              <a:rPr lang="en-US" dirty="0" smtClean="0">
+                <a:latin typeface="Arial" charset="0"/>
+                <a:ea typeface="ＭＳ Ｐゴシック" charset="0"/>
+              </a:rPr>
+              <a:t>)</a:t>
+            </a:r>
+            <a:endParaRPr lang="en-US" dirty="0">
+              <a:latin typeface="Arial" charset="0"/>
+              <a:ea typeface="ＭＳ Ｐゴシック" charset="0"/>
+            </a:endParaRPr>
+          </a:p>
+        </p:txBody>
+      </p:sp>
+      <p:sp>
+        <p:nvSpPr>
+          <p:cNvPr id="15363" name="Content Placeholder 4"/>
           <p:cNvSpPr>
             <a:spLocks noGrp="1"/>
           </p:cNvSpPr>
@@ -5464,34 +6757,346 @@
             <p:ph idx="1"/>
           </p:nvPr>
         </p:nvSpPr>
-        <p:spPr/>
-        <p:txBody>
-          <a:bodyPr>
-            <a:normAutofit/>
-          </a:bodyPr>
+        <p:spPr>
+          <a:xfrm>
+            <a:off x="541338" y="1911350"/>
+            <a:ext cx="15878175" cy="6202363"/>
+          </a:xfrm>
+        </p:spPr>
+        <p:txBody>
+          <a:bodyPr/>
           <a:lstStyle/>
           <a:p>
-            <a:r>
-              <a:rPr lang="en-US" sz="3200" dirty="0" smtClean="0"/>
-              <a:t>Content</a:t>
-            </a:r>
-            <a:endParaRPr lang="en-US" sz="3200" dirty="0" smtClean="0"/>
-          </a:p>
-          <a:p>
-            <a:endParaRPr lang="en-US" sz="3200" dirty="0"/>
+            <a:pPr indent="9525">
+              <a:lnSpc>
+                <a:spcPct val="90000"/>
+              </a:lnSpc>
+            </a:pPr>
+            <a:r>
+              <a:rPr lang="en-US" sz="3200" dirty="0" smtClean="0">
+                <a:solidFill>
+                  <a:srgbClr val="23383A"/>
+                </a:solidFill>
+                <a:latin typeface="Arial" charset="0"/>
+                <a:ea typeface="ＭＳ Ｐゴシック" charset="0"/>
+              </a:rPr>
+              <a:t>Write requests are JSON RPC</a:t>
+            </a:r>
+          </a:p>
+          <a:p>
+            <a:pPr lvl="1" indent="9525">
+              <a:lnSpc>
+                <a:spcPct val="90000"/>
+              </a:lnSpc>
+            </a:pPr>
+            <a:r>
+              <a:rPr lang="en-US" sz="2800" dirty="0">
+                <a:solidFill>
+                  <a:srgbClr val="23383A"/>
+                </a:solidFill>
+                <a:latin typeface="Arial" charset="0"/>
+                <a:ea typeface="ＭＳ Ｐゴシック" charset="0"/>
+              </a:rPr>
+              <a:t>JSON (</a:t>
+            </a:r>
+            <a:r>
+              <a:rPr lang="en-US" sz="2800" dirty="0">
+                <a:solidFill>
+                  <a:schemeClr val="tx1"/>
+                </a:solidFill>
+                <a:latin typeface="Arial" charset="0"/>
+                <a:ea typeface="ＭＳ Ｐゴシック" charset="0"/>
+                <a:cs typeface="ＭＳ Ｐゴシック" charset="0"/>
+              </a:rPr>
+              <a:t>JavaScript Object Notation)</a:t>
+            </a:r>
+            <a:endParaRPr lang="en-US" sz="2800" dirty="0">
+              <a:solidFill>
+                <a:srgbClr val="23383A"/>
+              </a:solidFill>
+              <a:latin typeface="Arial" charset="0"/>
+              <a:ea typeface="ＭＳ Ｐゴシック" charset="0"/>
+            </a:endParaRPr>
+          </a:p>
+          <a:p>
+            <a:pPr marL="1169988" lvl="1" indent="-396875">
+              <a:spcBef>
+                <a:spcPct val="15000"/>
+              </a:spcBef>
+              <a:spcAft>
+                <a:spcPct val="5000"/>
+              </a:spcAft>
+              <a:buFontTx/>
+              <a:buBlip>
+                <a:blip r:embed="rId3"/>
+              </a:buBlip>
+            </a:pPr>
+            <a:r>
+              <a:rPr lang="en-US" sz="2800" dirty="0"/>
+              <a:t>An open standard format that uses human-readable text to transmit data objects consisting of attribute–value pairs</a:t>
+            </a:r>
+          </a:p>
+          <a:p>
+            <a:pPr marL="1169988" lvl="1" indent="-396875">
+              <a:spcBef>
+                <a:spcPct val="15000"/>
+              </a:spcBef>
+              <a:spcAft>
+                <a:spcPct val="5000"/>
+              </a:spcAft>
+              <a:buFontTx/>
+              <a:buBlip>
+                <a:blip r:embed="rId3"/>
+              </a:buBlip>
+            </a:pPr>
+            <a:r>
+              <a:rPr lang="en-US" sz="2800" dirty="0"/>
+              <a:t>Used primarily to transmit data between a server and web application</a:t>
+            </a:r>
+          </a:p>
+          <a:p>
+            <a:pPr marL="1169988" lvl="1" indent="-396875">
+              <a:spcBef>
+                <a:spcPct val="15000"/>
+              </a:spcBef>
+              <a:spcAft>
+                <a:spcPct val="5000"/>
+              </a:spcAft>
+              <a:buFontTx/>
+              <a:buBlip>
+                <a:blip r:embed="rId3"/>
+              </a:buBlip>
+            </a:pPr>
+            <a:r>
+              <a:rPr lang="en-US" sz="2800" dirty="0"/>
+              <a:t>Alternative to XML</a:t>
+            </a:r>
+            <a:endParaRPr lang="en-US" sz="3200" dirty="0" smtClean="0">
+              <a:solidFill>
+                <a:srgbClr val="23383A"/>
+              </a:solidFill>
+              <a:latin typeface="Arial" charset="0"/>
+              <a:ea typeface="ＭＳ Ｐゴシック" charset="0"/>
+            </a:endParaRPr>
+          </a:p>
+          <a:p>
+            <a:pPr lvl="1" indent="9525">
+              <a:lnSpc>
+                <a:spcPct val="90000"/>
+              </a:lnSpc>
+            </a:pPr>
+            <a:r>
+              <a:rPr lang="en-US" sz="2800" dirty="0" smtClean="0">
+                <a:solidFill>
+                  <a:srgbClr val="23383A"/>
+                </a:solidFill>
+                <a:latin typeface="Arial" charset="0"/>
+                <a:ea typeface="ＭＳ Ｐゴシック" charset="0"/>
+              </a:rPr>
+              <a:t>RPC (</a:t>
+            </a:r>
+            <a:r>
+              <a:rPr lang="en-US" sz="2800" dirty="0" smtClean="0">
+                <a:solidFill>
+                  <a:schemeClr val="tx1"/>
+                </a:solidFill>
+                <a:latin typeface="Arial" charset="0"/>
+                <a:ea typeface="ＭＳ Ｐゴシック" charset="0"/>
+                <a:cs typeface="ＭＳ Ｐゴシック" charset="0"/>
+              </a:rPr>
+              <a:t>Remote Procedure Call)</a:t>
+            </a:r>
+            <a:endParaRPr lang="en-US" sz="2800" dirty="0" smtClean="0">
+              <a:solidFill>
+                <a:srgbClr val="23383A"/>
+              </a:solidFill>
+              <a:latin typeface="Arial" charset="0"/>
+              <a:ea typeface="ＭＳ Ｐゴシック" charset="0"/>
+            </a:endParaRPr>
+          </a:p>
+          <a:p>
+            <a:pPr marL="1169988" lvl="1" indent="-396875">
+              <a:spcBef>
+                <a:spcPct val="15000"/>
+              </a:spcBef>
+              <a:spcAft>
+                <a:spcPct val="5000"/>
+              </a:spcAft>
+              <a:buFontTx/>
+              <a:buBlip>
+                <a:blip r:embed="rId3"/>
+              </a:buBlip>
+            </a:pPr>
+            <a:r>
+              <a:rPr lang="en-US" sz="2800" dirty="0" smtClean="0">
+                <a:solidFill>
+                  <a:schemeClr val="tx1"/>
+                </a:solidFill>
+                <a:latin typeface="Arial" charset="0"/>
+                <a:ea typeface="ＭＳ Ｐゴシック" charset="0"/>
+                <a:cs typeface="ＭＳ Ｐゴシック" charset="0"/>
+              </a:rPr>
+              <a:t>An </a:t>
+            </a:r>
+            <a:r>
+              <a:rPr lang="en-US" sz="2800" dirty="0">
+                <a:solidFill>
+                  <a:schemeClr val="tx1"/>
+                </a:solidFill>
+                <a:latin typeface="Arial" charset="0"/>
+                <a:ea typeface="ＭＳ Ｐゴシック" charset="0"/>
+                <a:cs typeface="ＭＳ Ｐゴシック" charset="0"/>
+              </a:rPr>
+              <a:t>inter-process communication</a:t>
+            </a:r>
+          </a:p>
+          <a:p>
+            <a:pPr marL="1169988" lvl="1" indent="-396875">
+              <a:spcBef>
+                <a:spcPct val="15000"/>
+              </a:spcBef>
+              <a:spcAft>
+                <a:spcPct val="5000"/>
+              </a:spcAft>
+              <a:buFontTx/>
+              <a:buBlip>
+                <a:blip r:embed="rId3"/>
+              </a:buBlip>
+            </a:pPr>
+            <a:r>
+              <a:rPr lang="en-US" sz="2800" dirty="0">
+                <a:solidFill>
+                  <a:schemeClr val="tx1"/>
+                </a:solidFill>
+                <a:latin typeface="Arial" charset="0"/>
+                <a:ea typeface="ＭＳ Ｐゴシック" charset="0"/>
+                <a:cs typeface="ＭＳ Ｐゴシック" charset="0"/>
+              </a:rPr>
+              <a:t>Allows a computer program to cause a subroutine or procedure to execute in another address space (commonly on another computer on a shared network)</a:t>
+            </a:r>
+          </a:p>
+          <a:p>
+            <a:pPr marL="1169988" lvl="1" indent="-396875">
+              <a:spcBef>
+                <a:spcPct val="15000"/>
+              </a:spcBef>
+              <a:spcAft>
+                <a:spcPct val="5000"/>
+              </a:spcAft>
+              <a:buFontTx/>
+              <a:buBlip>
+                <a:blip r:embed="rId3"/>
+              </a:buBlip>
+            </a:pPr>
+            <a:r>
+              <a:rPr lang="en-US" sz="2800" dirty="0">
+                <a:solidFill>
+                  <a:schemeClr val="tx1"/>
+                </a:solidFill>
+                <a:latin typeface="Arial" charset="0"/>
+                <a:ea typeface="ＭＳ Ｐゴシック" charset="0"/>
+                <a:cs typeface="ＭＳ Ｐゴシック" charset="0"/>
+              </a:rPr>
+              <a:t>A standard way of accessing data stored remotely over </a:t>
+            </a:r>
+            <a:r>
+              <a:rPr lang="en-US" sz="2800" dirty="0" smtClean="0">
+                <a:solidFill>
+                  <a:schemeClr val="tx1"/>
+                </a:solidFill>
+                <a:latin typeface="Arial" charset="0"/>
+                <a:ea typeface="ＭＳ Ｐゴシック" charset="0"/>
+                <a:cs typeface="ＭＳ Ｐゴシック" charset="0"/>
+              </a:rPr>
+              <a:t>HTTP</a:t>
+            </a:r>
+            <a:endParaRPr lang="en-US" sz="2800" b="1" dirty="0" smtClean="0">
+              <a:solidFill>
+                <a:schemeClr val="tx1"/>
+              </a:solidFill>
+              <a:latin typeface="Arial" charset="0"/>
+              <a:ea typeface="ＭＳ Ｐゴシック" charset="0"/>
+              <a:cs typeface="ＭＳ Ｐゴシック" charset="0"/>
+            </a:endParaRPr>
+          </a:p>
+          <a:p>
+            <a:pPr indent="9525">
+              <a:spcBef>
+                <a:spcPct val="50000"/>
+              </a:spcBef>
+              <a:buFontTx/>
+              <a:buBlip>
+                <a:blip r:embed="rId4"/>
+              </a:buBlip>
+            </a:pPr>
+            <a:r>
+              <a:rPr lang="en-US" sz="3200" dirty="0" smtClean="0">
+                <a:solidFill>
+                  <a:schemeClr val="tx1"/>
+                </a:solidFill>
+                <a:latin typeface="Arial" charset="0"/>
+                <a:ea typeface="ＭＳ Ｐゴシック" charset="0"/>
+                <a:cs typeface="ＭＳ Ｐゴシック" charset="0"/>
+              </a:rPr>
+              <a:t>Example Call</a:t>
+            </a:r>
+          </a:p>
+          <a:p>
+            <a:pPr marL="1169988" lvl="1" indent="-396875">
+              <a:spcBef>
+                <a:spcPct val="15000"/>
+              </a:spcBef>
+              <a:spcAft>
+                <a:spcPct val="5000"/>
+              </a:spcAft>
+              <a:buFontTx/>
+              <a:buBlip>
+                <a:blip r:embed="rId3"/>
+              </a:buBlip>
+            </a:pPr>
+            <a:r>
+              <a:rPr lang="en-US" sz="2800" dirty="0" smtClean="0">
+                <a:solidFill>
+                  <a:schemeClr val="accent2"/>
+                </a:solidFill>
+                <a:latin typeface="Source Code Pro"/>
+                <a:ea typeface="ＭＳ Ｐゴシック" charset="0"/>
+                <a:cs typeface="Source Code Pro"/>
+                <a:hlinkClick r:id="rId5"/>
+              </a:rPr>
+              <a:t>NEED THIS:</a:t>
+            </a:r>
+            <a:endParaRPr lang="en-US" sz="2800" dirty="0">
+              <a:solidFill>
+                <a:schemeClr val="accent2"/>
+              </a:solidFill>
+              <a:latin typeface="Source Code Pro"/>
+              <a:ea typeface="ＭＳ Ｐゴシック" charset="0"/>
+              <a:cs typeface="Source Code Pro"/>
+            </a:endParaRPr>
+          </a:p>
+          <a:p>
+            <a:pPr indent="9525"/>
+            <a:endParaRPr lang="en-US" dirty="0">
+              <a:latin typeface="Arial" charset="0"/>
+              <a:ea typeface="ＭＳ Ｐゴシック" charset="0"/>
+            </a:endParaRPr>
           </a:p>
         </p:txBody>
       </p:sp>
     </p:spTree>
     <p:extLst>
       <p:ext uri="{BB962C8B-B14F-4D97-AF65-F5344CB8AC3E}">
-        <p14:creationId xmlns:p14="http://schemas.microsoft.com/office/powerpoint/2010/main" val="2108713422"/>
+        <p14:creationId xmlns:p14="http://schemas.microsoft.com/office/powerpoint/2010/main" val="764835421"/>
       </p:ext>
     </p:extLst>
   </p:cSld>
   <p:clrMapOvr>
     <a:masterClrMapping/>
   </p:clrMapOvr>
+  <p:transition xmlns:p14="http://schemas.microsoft.com/office/powerpoint/2010/main">
+    <p:fade/>
+  </p:transition>
   <p:timing>
     <p:tnLst>
       <p:par>
@@ -5536,7 +7141,11 @@
           <a:p>
             <a:r>
               <a:rPr lang="en-US" dirty="0" smtClean="0"/>
-              <a:t>Title</a:t>
+              <a:t>why use the media </a:t>
+            </a:r>
+            <a:r>
+              <a:rPr lang="en-US" dirty="0" err="1" smtClean="0"/>
+              <a:t>api</a:t>
             </a:r>
             <a:endParaRPr lang="en-US" dirty="0"/>
           </a:p>
@@ -5561,7 +7170,26 @@
           <a:p>
             <a:r>
               <a:rPr lang="en-US" sz="3200" dirty="0" smtClean="0"/>
-              <a:t>Content</a:t>
+              <a:t>Many examples in the Developer Documentation</a:t>
+            </a:r>
+          </a:p>
+          <a:p>
+            <a:pPr lvl="1"/>
+            <a:r>
+              <a:rPr lang="en-US" sz="3200" dirty="0"/>
+              <a:t>http://</a:t>
+            </a:r>
+            <a:r>
+              <a:rPr lang="en-US" sz="3200" dirty="0" err="1"/>
+              <a:t>docs.brightcove.com</a:t>
+            </a:r>
+            <a:r>
+              <a:rPr lang="en-US" sz="3200" dirty="0"/>
+              <a:t>/en/video-cloud/media/</a:t>
+            </a:r>
+            <a:r>
+              <a:rPr lang="en-US" sz="3200" dirty="0" err="1"/>
+              <a:t>index.html</a:t>
             </a:r>
             <a:endParaRPr lang="en-US" sz="3200" dirty="0" smtClean="0"/>
           </a:p>
@@ -5573,7 +7201,7 @@
     </p:spTree>
     <p:extLst>
       <p:ext uri="{BB962C8B-B14F-4D97-AF65-F5344CB8AC3E}">
-        <p14:creationId xmlns:p14="http://schemas.microsoft.com/office/powerpoint/2010/main" val="2805855639"/>
+        <p14:creationId xmlns:p14="http://schemas.microsoft.com/office/powerpoint/2010/main" val="2108713422"/>
       </p:ext>
     </p:extLst>
   </p:cSld>
@@ -5609,7 +7237,7 @@
       </p:grpSpPr>
       <p:sp>
         <p:nvSpPr>
-          <p:cNvPr id="3" name="Title 2"/>
+          <p:cNvPr id="14337" name="Title 1"/>
           <p:cNvSpPr>
             <a:spLocks noGrp="1"/>
           </p:cNvSpPr>
@@ -5617,22 +7245,40 @@
             <p:ph type="title"/>
           </p:nvPr>
         </p:nvSpPr>
-        <p:spPr/>
+        <p:spPr>
+          <a:xfrm>
+            <a:off x="541338" y="300038"/>
+            <a:ext cx="14724062" cy="1449387"/>
+          </a:xfrm>
+        </p:spPr>
         <p:txBody>
           <a:bodyPr/>
           <a:lstStyle/>
           <a:p>
             <a:r>
-              <a:rPr lang="en-US" dirty="0" smtClean="0"/>
-              <a:t>Title</a:t>
-            </a:r>
-            <a:endParaRPr lang="en-US" dirty="0"/>
-          </a:p>
-        </p:txBody>
-      </p:sp>
-      <p:sp>
-        <p:nvSpPr>
-          <p:cNvPr id="4" name="Content Placeholder 3"/>
+              <a:rPr lang="en-US" dirty="0" smtClean="0">
+                <a:latin typeface="Arial" charset="0"/>
+                <a:ea typeface="ＭＳ Ｐゴシック" charset="0"/>
+              </a:rPr>
+              <a:t>who can use the media </a:t>
+            </a:r>
+            <a:r>
+              <a:rPr lang="en-US" dirty="0" err="1" smtClean="0">
+                <a:latin typeface="Arial" charset="0"/>
+                <a:ea typeface="ＭＳ Ｐゴシック" charset="0"/>
+              </a:rPr>
+              <a:t>api</a:t>
+            </a:r>
+            <a:endParaRPr lang="en-US" dirty="0">
+              <a:latin typeface="Arial" charset="0"/>
+              <a:ea typeface="ＭＳ Ｐゴシック" charset="0"/>
+            </a:endParaRPr>
+          </a:p>
+        </p:txBody>
+      </p:sp>
+      <p:sp>
+        <p:nvSpPr>
+          <p:cNvPr id="14338" name="Content Placeholder 2"/>
           <p:cNvSpPr>
             <a:spLocks noGrp="1"/>
           </p:cNvSpPr>
@@ -5640,28 +7286,132 @@
             <p:ph idx="1"/>
           </p:nvPr>
         </p:nvSpPr>
-        <p:spPr/>
-        <p:txBody>
-          <a:bodyPr>
-            <a:normAutofit/>
-          </a:bodyPr>
+        <p:spPr>
+          <a:xfrm>
+            <a:off x="541338" y="1911350"/>
+            <a:ext cx="15878175" cy="6202363"/>
+          </a:xfrm>
+        </p:spPr>
+        <p:txBody>
+          <a:bodyPr/>
           <a:lstStyle/>
           <a:p>
             <a:r>
-              <a:rPr lang="en-US" sz="3200" dirty="0" smtClean="0"/>
-              <a:t>Content</a:t>
-            </a:r>
-            <a:endParaRPr lang="en-US" sz="3200" dirty="0" smtClean="0"/>
-          </a:p>
-          <a:p>
-            <a:endParaRPr lang="en-US" sz="3200" dirty="0"/>
+              <a:rPr lang="en-US" sz="3200" dirty="0" smtClean="0">
+                <a:latin typeface="Arial" charset="0"/>
+                <a:ea typeface="ＭＳ Ｐゴシック" charset="0"/>
+              </a:rPr>
+              <a:t>The </a:t>
+            </a:r>
+            <a:r>
+              <a:rPr lang="en-US" sz="3200" dirty="0">
+                <a:latin typeface="Arial" charset="0"/>
+                <a:ea typeface="ＭＳ Ｐゴシック" charset="0"/>
+              </a:rPr>
+              <a:t>Media API Read methods are available in the following editions</a:t>
+            </a:r>
+          </a:p>
+          <a:p>
+            <a:pPr lvl="1"/>
+            <a:r>
+              <a:rPr lang="en-US" sz="3200" dirty="0">
+                <a:latin typeface="Arial" charset="0"/>
+                <a:ea typeface="ＭＳ Ｐゴシック" charset="0"/>
+              </a:rPr>
+              <a:t>Express 3</a:t>
+            </a:r>
+          </a:p>
+          <a:p>
+            <a:pPr lvl="1"/>
+            <a:r>
+              <a:rPr lang="en-US" sz="3200" dirty="0">
+                <a:latin typeface="Arial" charset="0"/>
+                <a:ea typeface="ＭＳ Ｐゴシック" charset="0"/>
+              </a:rPr>
+              <a:t>Professional</a:t>
+            </a:r>
+          </a:p>
+          <a:p>
+            <a:pPr lvl="1"/>
+            <a:r>
+              <a:rPr lang="en-US" sz="3200" dirty="0">
+                <a:latin typeface="Arial" charset="0"/>
+                <a:ea typeface="ＭＳ Ｐゴシック" charset="0"/>
+              </a:rPr>
+              <a:t>Enterprise</a:t>
+            </a:r>
+          </a:p>
+          <a:p>
+            <a:r>
+              <a:rPr lang="en-US" sz="3200" dirty="0">
+                <a:latin typeface="Arial" charset="0"/>
+                <a:ea typeface="ＭＳ Ｐゴシック" charset="0"/>
+              </a:rPr>
+              <a:t>The Media API Write methods are available in</a:t>
+            </a:r>
+          </a:p>
+          <a:p>
+            <a:pPr lvl="1"/>
+            <a:r>
+              <a:rPr lang="en-US" sz="3200" dirty="0">
+                <a:latin typeface="Arial" charset="0"/>
+                <a:ea typeface="ＭＳ Ｐゴシック" charset="0"/>
+              </a:rPr>
+              <a:t>Professional</a:t>
+            </a:r>
+          </a:p>
+          <a:p>
+            <a:pPr lvl="1"/>
+            <a:r>
+              <a:rPr lang="en-US" sz="3200" dirty="0" smtClean="0">
+                <a:latin typeface="Arial" charset="0"/>
+                <a:ea typeface="ＭＳ Ｐゴシック" charset="0"/>
+              </a:rPr>
+              <a:t>Enterprise</a:t>
+            </a:r>
+          </a:p>
+          <a:p>
+            <a:r>
+              <a:rPr lang="en-US" sz="3200" dirty="0">
+                <a:latin typeface="Arial" charset="0"/>
+                <a:ea typeface="ＭＳ Ｐゴシック" charset="0"/>
+              </a:rPr>
+              <a:t>You can use any programming language that than can make HTTP calls to work with the Media API</a:t>
+            </a:r>
+          </a:p>
+          <a:p>
+            <a:pPr lvl="1"/>
+            <a:r>
+              <a:rPr lang="en-US" sz="3200" dirty="0" smtClean="0">
+                <a:latin typeface="Arial" charset="0"/>
+                <a:ea typeface="ＭＳ Ｐゴシック" charset="0"/>
+              </a:rPr>
+              <a:t>JavaScript is used in this course</a:t>
+            </a:r>
+            <a:endParaRPr lang="en-US" sz="3200" dirty="0">
+              <a:latin typeface="Arial" charset="0"/>
+              <a:ea typeface="ＭＳ Ｐゴシック" charset="0"/>
+            </a:endParaRPr>
+          </a:p>
+          <a:p>
+            <a:pPr lvl="1"/>
+            <a:endParaRPr lang="en-US" sz="3000" dirty="0">
+              <a:latin typeface="Arial" charset="0"/>
+              <a:ea typeface="ＭＳ Ｐゴシック" charset="0"/>
+            </a:endParaRPr>
+          </a:p>
+          <a:p>
+            <a:endParaRPr lang="en-US" sz="3000" dirty="0">
+              <a:latin typeface="Arial" charset="0"/>
+              <a:ea typeface="ＭＳ Ｐゴシック" charset="0"/>
+            </a:endParaRPr>
           </a:p>
         </p:txBody>
       </p:sp>
     </p:spTree>
     <p:extLst>
       <p:ext uri="{BB962C8B-B14F-4D97-AF65-F5344CB8AC3E}">
-        <p14:creationId xmlns:p14="http://schemas.microsoft.com/office/powerpoint/2010/main" val="2514608167"/>
+        <p14:creationId xmlns:p14="http://schemas.microsoft.com/office/powerpoint/2010/main" val="4257424235"/>
       </p:ext>
     </p:extLst>
   </p:cSld>
@@ -5697,99 +7447,431 @@
       </p:grpSpPr>
       <p:sp>
         <p:nvSpPr>
-          <p:cNvPr id="3" name="Text Placeholder 2"/>
+          <p:cNvPr id="14337" name="Title 1"/>
           <p:cNvSpPr>
             <a:spLocks noGrp="1"/>
           </p:cNvSpPr>
           <p:nvPr>
-            <p:ph type="body" sz="quarter" idx="11"/>
-          </p:nvPr>
-        </p:nvSpPr>
-        <p:spPr/>
+            <p:ph type="title"/>
+          </p:nvPr>
+        </p:nvSpPr>
+        <p:spPr>
+          <a:xfrm>
+            <a:off x="541338" y="300038"/>
+            <a:ext cx="14724062" cy="1449387"/>
+          </a:xfrm>
+        </p:spPr>
         <p:txBody>
           <a:bodyPr/>
           <a:lstStyle/>
           <a:p>
             <a:r>
-              <a:rPr lang="en-US" sz="4700" dirty="0"/>
-              <a:t>Thank you</a:t>
-            </a:r>
-          </a:p>
-        </p:txBody>
-      </p:sp>
-      <p:sp>
-        <p:nvSpPr>
-          <p:cNvPr id="5" name="Text Placeholder 4"/>
+              <a:rPr lang="en-US" dirty="0" smtClean="0">
+                <a:latin typeface="Arial" charset="0"/>
+                <a:ea typeface="ＭＳ Ｐゴシック" charset="0"/>
+              </a:rPr>
+              <a:t>course Audience and Prerequisites</a:t>
+            </a:r>
+            <a:endParaRPr lang="en-US" dirty="0">
+              <a:latin typeface="Arial" charset="0"/>
+              <a:ea typeface="ＭＳ Ｐゴシック" charset="0"/>
+            </a:endParaRPr>
+          </a:p>
+        </p:txBody>
+      </p:sp>
+      <p:sp>
+        <p:nvSpPr>
+          <p:cNvPr id="14338" name="Content Placeholder 2"/>
           <p:cNvSpPr>
             <a:spLocks noGrp="1"/>
           </p:cNvSpPr>
           <p:nvPr>
-            <p:ph type="body" sz="quarter" idx="12"/>
-          </p:nvPr>
-        </p:nvSpPr>
-        <p:spPr/>
+            <p:ph idx="1"/>
+          </p:nvPr>
+        </p:nvSpPr>
+        <p:spPr>
+          <a:xfrm>
+            <a:off x="541338" y="1911350"/>
+            <a:ext cx="15878175" cy="6202363"/>
+          </a:xfrm>
+        </p:spPr>
         <p:txBody>
           <a:bodyPr/>
           <a:lstStyle/>
           <a:p>
             <a:r>
-              <a:rPr lang="en-US" dirty="0" smtClean="0"/>
-              <a:t>Brightcove Learning</a:t>
-            </a:r>
-            <a:endParaRPr lang="en-US" dirty="0"/>
-          </a:p>
-        </p:txBody>
-      </p:sp>
-      <p:sp>
-        <p:nvSpPr>
-          <p:cNvPr id="4" name="Slide Number Placeholder 3"/>
-          <p:cNvSpPr>
-            <a:spLocks noGrp="1"/>
-          </p:cNvSpPr>
-          <p:nvPr>
-            <p:ph type="sldNum" sz="quarter" idx="4294967295"/>
-          </p:nvPr>
-        </p:nvSpPr>
-        <p:spPr>
-          <a:xfrm>
-            <a:off x="1" y="9253119"/>
-            <a:ext cx="812230" cy="403878"/>
-          </a:xfrm>
-          <a:prstGeom prst="rect">
-            <a:avLst/>
-          </a:prstGeom>
-        </p:spPr>
-        <p:txBody>
-          <a:bodyPr/>
-          <a:lstStyle/>
-          <a:p>
-            <a:pPr>
-              <a:defRPr/>
-            </a:pPr>
-            <a:fld id="{E089BD15-BC77-46D6-86B9-64976AF1A8F1}" type="slidenum">
-              <a:rPr lang="en-US" smtClean="0"/>
-              <a:pPr>
-                <a:defRPr/>
-              </a:pPr>
-              <a:t>6</a:t>
-            </a:fld>
-            <a:endParaRPr lang="en-US" dirty="0"/>
+              <a:rPr lang="en-US" sz="3000" dirty="0" smtClean="0">
+                <a:latin typeface="Arial" charset="0"/>
+                <a:ea typeface="ＭＳ Ｐゴシック" charset="0"/>
+              </a:rPr>
+              <a:t>Designed </a:t>
+            </a:r>
+            <a:r>
+              <a:rPr lang="en-US" sz="3000" dirty="0">
+                <a:latin typeface="Arial" charset="0"/>
+                <a:ea typeface="ＭＳ Ｐゴシック" charset="0"/>
+              </a:rPr>
+              <a:t>for developers, or project managers who want to understand the capabilities of the Media </a:t>
+            </a:r>
+            <a:r>
+              <a:rPr lang="en-US" sz="3000" dirty="0" smtClean="0">
+                <a:latin typeface="Arial" charset="0"/>
+                <a:ea typeface="ＭＳ Ｐゴシック" charset="0"/>
+              </a:rPr>
+              <a:t>API</a:t>
+            </a:r>
+          </a:p>
+          <a:p>
+            <a:r>
+              <a:rPr lang="en-US" sz="3000" dirty="0" smtClean="0">
+                <a:latin typeface="Arial" charset="0"/>
+                <a:ea typeface="ＭＳ Ｐゴシック" charset="0"/>
+              </a:rPr>
+              <a:t>Some knowledge of HTML and some scripting/programming language will allow you to optimally benefit from the course</a:t>
+            </a:r>
+            <a:endParaRPr lang="en-US" sz="3000" dirty="0">
+              <a:latin typeface="Arial" charset="0"/>
+              <a:ea typeface="ＭＳ Ｐゴシック" charset="0"/>
+            </a:endParaRPr>
+          </a:p>
+          <a:p>
+            <a:endParaRPr lang="en-US" sz="3000" dirty="0">
+              <a:latin typeface="Arial" charset="0"/>
+              <a:ea typeface="ＭＳ Ｐゴシック" charset="0"/>
+            </a:endParaRPr>
           </a:p>
         </p:txBody>
       </p:sp>
     </p:spTree>
     <p:extLst>
       <p:ext uri="{BB962C8B-B14F-4D97-AF65-F5344CB8AC3E}">
-        <p14:creationId xmlns:p14="http://schemas.microsoft.com/office/powerpoint/2010/main" val="3700295984"/>
+        <p14:creationId xmlns:p14="http://schemas.microsoft.com/office/powerpoint/2010/main" val="544640343"/>
       </p:ext>
     </p:extLst>
   </p:cSld>
   <p:clrMapOvr>
     <a:masterClrMapping/>
   </p:clrMapOvr>
-  <p:transition xmlns:p14="http://schemas.microsoft.com/office/powerpoint/2010/main" spd="med">
-    <p:fade/>
-  </p:transition>
+  <p:timing>
+    <p:tnLst>
+      <p:par>
+        <p:cTn xmlns:p14="http://schemas.microsoft.com/office/powerpoint/2010/main" id="1" dur="indefinite" restart="never" nodeType="tmRoot"/>
+      </p:par>
+    </p:tnLst>
+  </p:timing>
+</p:sld>
+</file>
+
+<file path=ppt/slides/slide7.xml><?xml version="1.0" encoding="utf-8"?>
+<p:sld xmlns:a="http://schemas.openxmlformats.org/drawingml/2006/main" xmlns:r="http://schemas.openxmlformats.org/officeDocument/2006/relationships" xmlns:p="http://schemas.openxmlformats.org/presentationml/2006/main">
+  <p:cSld>
+    <p:spTree>
+      <p:nvGrpSpPr>
+        <p:cNvPr id="1" name=""/>
+        <p:cNvGrpSpPr/>
+        <p:nvPr/>
+      </p:nvGrpSpPr>
+      <p:grpSpPr>
+        <a:xfrm>
+          <a:off x="0" y="0"/>
+          <a:ext cx="0" cy="0"/>
+          <a:chOff x="0" y="0"/>
+          <a:chExt cx="0" cy="0"/>
+        </a:xfrm>
+      </p:grpSpPr>
+      <p:sp>
+        <p:nvSpPr>
+          <p:cNvPr id="11265" name="Title 1"/>
+          <p:cNvSpPr>
+            <a:spLocks noGrp="1"/>
+          </p:cNvSpPr>
+          <p:nvPr>
+            <p:ph type="title"/>
+          </p:nvPr>
+        </p:nvSpPr>
+        <p:spPr>
+          <a:xfrm>
+            <a:off x="541338" y="300038"/>
+            <a:ext cx="14724062" cy="1449387"/>
+          </a:xfrm>
+        </p:spPr>
+        <p:txBody>
+          <a:bodyPr/>
+          <a:lstStyle/>
+          <a:p>
+            <a:r>
+              <a:rPr lang="en-US">
+                <a:latin typeface="Arial" charset="0"/>
+                <a:ea typeface="ＭＳ Ｐゴシック" charset="0"/>
+              </a:rPr>
+              <a:t>Agenda</a:t>
+            </a:r>
+          </a:p>
+        </p:txBody>
+      </p:sp>
+      <p:sp>
+        <p:nvSpPr>
+          <p:cNvPr id="11266" name="Content Placeholder 5"/>
+          <p:cNvSpPr>
+            <a:spLocks noGrp="1"/>
+          </p:cNvSpPr>
+          <p:nvPr>
+            <p:ph idx="1"/>
+          </p:nvPr>
+        </p:nvSpPr>
+        <p:spPr>
+          <a:xfrm>
+            <a:off x="541338" y="1911350"/>
+            <a:ext cx="15878175" cy="6202363"/>
+          </a:xfrm>
+        </p:spPr>
+        <p:txBody>
+          <a:bodyPr/>
+          <a:lstStyle/>
+          <a:p>
+            <a:r>
+              <a:rPr lang="en-US" sz="3000" dirty="0" smtClean="0">
+                <a:latin typeface="Arial" charset="0"/>
+                <a:ea typeface="ＭＳ Ｐゴシック" charset="0"/>
+              </a:rPr>
+              <a:t>Introducing the Course</a:t>
+            </a:r>
+          </a:p>
+          <a:p>
+            <a:r>
+              <a:rPr lang="en-US" sz="3000" dirty="0" smtClean="0">
+                <a:latin typeface="Arial" charset="0"/>
+                <a:ea typeface="ＭＳ Ｐゴシック" charset="0"/>
+              </a:rPr>
+              <a:t>Setting Up</a:t>
+            </a:r>
+          </a:p>
+          <a:p>
+            <a:r>
+              <a:rPr lang="en-US" sz="3000" dirty="0" smtClean="0">
+                <a:latin typeface="Arial" charset="0"/>
+                <a:ea typeface="ＭＳ Ｐゴシック" charset="0"/>
+              </a:rPr>
+              <a:t>Understanding the Media API</a:t>
+            </a:r>
+          </a:p>
+          <a:p>
+            <a:r>
+              <a:rPr lang="en-US" sz="3000" dirty="0" smtClean="0">
+                <a:latin typeface="Arial" charset="0"/>
+                <a:ea typeface="ＭＳ Ｐゴシック" charset="0"/>
+              </a:rPr>
+              <a:t>Using Read Methods (Constructing requests, parsing returned data)</a:t>
+            </a:r>
+          </a:p>
+          <a:p>
+            <a:r>
+              <a:rPr lang="en-US" sz="3000" dirty="0" smtClean="0">
+                <a:latin typeface="Arial" charset="0"/>
+                <a:ea typeface="ＭＳ Ｐゴシック" charset="0"/>
+              </a:rPr>
+              <a:t>Controlling Responses (Limiting response size, sorting and paging)</a:t>
+            </a:r>
+          </a:p>
+          <a:p>
+            <a:r>
+              <a:rPr lang="en-US" sz="3000" dirty="0" smtClean="0">
+                <a:latin typeface="Arial" charset="0"/>
+                <a:ea typeface="ＭＳ Ｐゴシック" charset="0"/>
+              </a:rPr>
+              <a:t>Using Write Methods</a:t>
+            </a:r>
+            <a:endParaRPr lang="en-US" sz="3000" dirty="0">
+              <a:latin typeface="Arial" charset="0"/>
+              <a:ea typeface="ＭＳ Ｐゴシック" charset="0"/>
+            </a:endParaRPr>
+          </a:p>
+        </p:txBody>
+      </p:sp>
+    </p:spTree>
+    <p:extLst>
+      <p:ext uri="{BB962C8B-B14F-4D97-AF65-F5344CB8AC3E}">
+        <p14:creationId xmlns:p14="http://schemas.microsoft.com/office/powerpoint/2010/main" val="4226722249"/>
+      </p:ext>
+    </p:extLst>
+  </p:cSld>
+  <p:clrMapOvr>
+    <a:masterClrMapping/>
+  </p:clrMapOvr>
+  <p:timing>
+    <p:tnLst>
+      <p:par>
+        <p:cTn xmlns:p14="http://schemas.microsoft.com/office/powerpoint/2010/main" id="1" dur="indefinite" restart="never" nodeType="tmRoot"/>
+      </p:par>
+    </p:tnLst>
+  </p:timing>
+</p:sld>
+</file>
+
+<file path=ppt/slides/slide8.xml><?xml version="1.0" encoding="utf-8"?>
+<p:sld xmlns:a="http://schemas.openxmlformats.org/drawingml/2006/main" xmlns:r="http://schemas.openxmlformats.org/officeDocument/2006/relationships" xmlns:p="http://schemas.openxmlformats.org/presentationml/2006/main">
+  <p:cSld>
+    <p:spTree>
+      <p:nvGrpSpPr>
+        <p:cNvPr id="1" name=""/>
+        <p:cNvGrpSpPr/>
+        <p:nvPr/>
+      </p:nvGrpSpPr>
+      <p:grpSpPr>
+        <a:xfrm>
+          <a:off x="0" y="0"/>
+          <a:ext cx="0" cy="0"/>
+          <a:chOff x="0" y="0"/>
+          <a:chExt cx="0" cy="0"/>
+        </a:xfrm>
+      </p:grpSpPr>
+      <p:sp>
+        <p:nvSpPr>
+          <p:cNvPr id="3" name="Title 2"/>
+          <p:cNvSpPr>
+            <a:spLocks noGrp="1"/>
+          </p:cNvSpPr>
+          <p:nvPr>
+            <p:ph type="title"/>
+          </p:nvPr>
+        </p:nvSpPr>
+        <p:spPr/>
+        <p:txBody>
+          <a:bodyPr/>
+          <a:lstStyle/>
+          <a:p>
+            <a:r>
+              <a:rPr lang="en-US" dirty="0" smtClean="0"/>
+              <a:t>Title</a:t>
+            </a:r>
+            <a:endParaRPr lang="en-US" dirty="0"/>
+          </a:p>
+        </p:txBody>
+      </p:sp>
+      <p:sp>
+        <p:nvSpPr>
+          <p:cNvPr id="4" name="Content Placeholder 3"/>
+          <p:cNvSpPr>
+            <a:spLocks noGrp="1"/>
+          </p:cNvSpPr>
+          <p:nvPr>
+            <p:ph idx="1"/>
+          </p:nvPr>
+        </p:nvSpPr>
+        <p:spPr/>
+        <p:txBody>
+          <a:bodyPr>
+            <a:normAutofit/>
+          </a:bodyPr>
+          <a:lstStyle/>
+          <a:p>
+            <a:r>
+              <a:rPr lang="en-US" sz="3200" dirty="0" smtClean="0"/>
+              <a:t>Content</a:t>
+            </a:r>
+          </a:p>
+          <a:p>
+            <a:endParaRPr lang="en-US" sz="3200" dirty="0"/>
+          </a:p>
+        </p:txBody>
+      </p:sp>
+    </p:spTree>
+    <p:extLst>
+      <p:ext uri="{BB962C8B-B14F-4D97-AF65-F5344CB8AC3E}">
+        <p14:creationId xmlns:p14="http://schemas.microsoft.com/office/powerpoint/2010/main" val="2805855639"/>
+      </p:ext>
+    </p:extLst>
+  </p:cSld>
+  <p:clrMapOvr>
+    <a:masterClrMapping/>
+  </p:clrMapOvr>
+  <p:timing>
+    <p:tnLst>
+      <p:par>
+        <p:cTn xmlns:p14="http://schemas.microsoft.com/office/powerpoint/2010/main" id="1" dur="indefinite" restart="never" nodeType="tmRoot"/>
+      </p:par>
+    </p:tnLst>
+  </p:timing>
+</p:sld>
+</file>
+
+<file path=ppt/slides/slide9.xml><?xml version="1.0" encoding="utf-8"?>
+<p:sld xmlns:a="http://schemas.openxmlformats.org/drawingml/2006/main" xmlns:r="http://schemas.openxmlformats.org/officeDocument/2006/relationships" xmlns:p="http://schemas.openxmlformats.org/presentationml/2006/main">
+  <p:cSld>
+    <p:spTree>
+      <p:nvGrpSpPr>
+        <p:cNvPr id="1" name=""/>
+        <p:cNvGrpSpPr/>
+        <p:nvPr/>
+      </p:nvGrpSpPr>
+      <p:grpSpPr>
+        <a:xfrm>
+          <a:off x="0" y="0"/>
+          <a:ext cx="0" cy="0"/>
+          <a:chOff x="0" y="0"/>
+          <a:chExt cx="0" cy="0"/>
+        </a:xfrm>
+      </p:grpSpPr>
+      <p:sp>
+        <p:nvSpPr>
+          <p:cNvPr id="3" name="Title 2"/>
+          <p:cNvSpPr>
+            <a:spLocks noGrp="1"/>
+          </p:cNvSpPr>
+          <p:nvPr>
+            <p:ph type="title"/>
+          </p:nvPr>
+        </p:nvSpPr>
+        <p:spPr/>
+        <p:txBody>
+          <a:bodyPr/>
+          <a:lstStyle/>
+          <a:p>
+            <a:r>
+              <a:rPr lang="en-US" dirty="0" smtClean="0"/>
+              <a:t>Title</a:t>
+            </a:r>
+            <a:endParaRPr lang="en-US" dirty="0"/>
+          </a:p>
+        </p:txBody>
+      </p:sp>
+      <p:sp>
+        <p:nvSpPr>
+          <p:cNvPr id="4" name="Content Placeholder 3"/>
+          <p:cNvSpPr>
+            <a:spLocks noGrp="1"/>
+          </p:cNvSpPr>
+          <p:nvPr>
+            <p:ph idx="1"/>
+          </p:nvPr>
+        </p:nvSpPr>
+        <p:spPr/>
+        <p:txBody>
+          <a:bodyPr>
+            <a:normAutofit/>
+          </a:bodyPr>
+          <a:lstStyle/>
+          <a:p>
+            <a:r>
+              <a:rPr lang="en-US" sz="3200" dirty="0" smtClean="0"/>
+              <a:t>Content</a:t>
+            </a:r>
+          </a:p>
+          <a:p>
+            <a:endParaRPr lang="en-US" sz="3200" dirty="0"/>
+          </a:p>
+        </p:txBody>
+      </p:sp>
+    </p:spTree>
+    <p:extLst>
+      <p:ext uri="{BB962C8B-B14F-4D97-AF65-F5344CB8AC3E}">
+        <p14:creationId xmlns:p14="http://schemas.microsoft.com/office/powerpoint/2010/main" val="2514608167"/>
+      </p:ext>
+    </p:extLst>
+  </p:cSld>
+  <p:clrMapOvr>
+    <a:masterClrMapping/>
+  </p:clrMapOvr>
   <p:timing>
     <p:tnLst>
       <p:par>

</xml_diff>

<commit_message>
Review and update slides
</commit_message>
<xml_diff>
--- a/VideoSessionsMaterials/Introducing.pptx
+++ b/VideoSessionsMaterials/Introducing.pptx
@@ -12,7 +12,7 @@
     <p:sldId id="372" r:id="rId3"/>
     <p:sldId id="378" r:id="rId4"/>
     <p:sldId id="375" r:id="rId5"/>
-    <p:sldId id="367" r:id="rId6"/>
+    <p:sldId id="379" r:id="rId6"/>
     <p:sldId id="377" r:id="rId7"/>
     <p:sldId id="376" r:id="rId8"/>
     <p:sldId id="371" r:id="rId9"/>
@@ -401,7 +401,7 @@
     </p:spTree>
     <p:extLst>
       <p:ext uri="{BB962C8B-B14F-4D97-AF65-F5344CB8AC3E}">
-        <p14:creationId xmlns:p14="http://schemas.microsoft.com/office/powerpoint/2010/main" xmlns:p="http://schemas.openxmlformats.org/presentationml/2006/main" xmlns:r="http://schemas.openxmlformats.org/officeDocument/2006/relationships" xmlns:a="http://schemas.openxmlformats.org/drawingml/2006/main" xmlns="" val="4045051341"/>
+        <p14:creationId xmlns="" xmlns:a="http://schemas.openxmlformats.org/drawingml/2006/main" xmlns:r="http://schemas.openxmlformats.org/officeDocument/2006/relationships" xmlns:p="http://schemas.openxmlformats.org/presentationml/2006/main" xmlns:p14="http://schemas.microsoft.com/office/powerpoint/2010/main" xmlns:mv="urn:schemas-microsoft-com:mac:vml" xmlns:mc="http://schemas.openxmlformats.org/markup-compatibility/2006" val="4045051341"/>
       </p:ext>
     </p:extLst>
   </p:cSld>
@@ -576,7 +576,7 @@
     </p:spTree>
     <p:extLst>
       <p:ext uri="{BB962C8B-B14F-4D97-AF65-F5344CB8AC3E}">
-        <p14:creationId xmlns:p14="http://schemas.microsoft.com/office/powerpoint/2010/main" xmlns:p="http://schemas.openxmlformats.org/presentationml/2006/main" xmlns:r="http://schemas.openxmlformats.org/officeDocument/2006/relationships" xmlns:a="http://schemas.openxmlformats.org/drawingml/2006/main" xmlns="" val="3250658828"/>
+        <p14:creationId xmlns="" xmlns:a="http://schemas.openxmlformats.org/drawingml/2006/main" xmlns:r="http://schemas.openxmlformats.org/officeDocument/2006/relationships" xmlns:p="http://schemas.openxmlformats.org/presentationml/2006/main" xmlns:p14="http://schemas.microsoft.com/office/powerpoint/2010/main" xmlns:mv="urn:schemas-microsoft-com:mac:vml" xmlns:mc="http://schemas.openxmlformats.org/markup-compatibility/2006" val="3250658828"/>
       </p:ext>
     </p:extLst>
   </p:cSld>
@@ -625,14 +625,14 @@
           </a:ln>
           <a:extLst>
             <a:ext uri="{909E8E84-426E-40dd-AFC4-6F175D3DCCD1}">
-              <a14:hiddenFill xmlns:a14="http://schemas.microsoft.com/office/drawing/2010/main" xmlns:p="http://schemas.openxmlformats.org/presentationml/2006/main" xmlns:r="http://schemas.openxmlformats.org/officeDocument/2006/relationships" xmlns:a="http://schemas.openxmlformats.org/drawingml/2006/main" xmlns="">
+              <a14:hiddenFill xmlns="" xmlns:a="http://schemas.openxmlformats.org/drawingml/2006/main" xmlns:r="http://schemas.openxmlformats.org/officeDocument/2006/relationships" xmlns:p="http://schemas.openxmlformats.org/presentationml/2006/main" xmlns:a14="http://schemas.microsoft.com/office/drawing/2010/main" xmlns:mv="urn:schemas-microsoft-com:mac:vml" xmlns:mc="http://schemas.openxmlformats.org/markup-compatibility/2006">
                 <a:solidFill>
                   <a:srgbClr val="FFFFFF"/>
                 </a:solidFill>
               </a14:hiddenFill>
             </a:ext>
             <a:ext uri="{91240B29-F687-4f45-9708-019B960494DF}">
-              <a14:hiddenLine xmlns:a14="http://schemas.microsoft.com/office/drawing/2010/main" xmlns:p="http://schemas.openxmlformats.org/presentationml/2006/main" xmlns:r="http://schemas.openxmlformats.org/officeDocument/2006/relationships" xmlns:a="http://schemas.openxmlformats.org/drawingml/2006/main" xmlns="" w="9525">
+              <a14:hiddenLine xmlns="" xmlns:a="http://schemas.openxmlformats.org/drawingml/2006/main" xmlns:r="http://schemas.openxmlformats.org/officeDocument/2006/relationships" xmlns:p="http://schemas.openxmlformats.org/presentationml/2006/main" xmlns:a14="http://schemas.microsoft.com/office/drawing/2010/main" xmlns:mv="urn:schemas-microsoft-com:mac:vml" xmlns:mc="http://schemas.openxmlformats.org/markup-compatibility/2006" w="9525">
                 <a:solidFill>
                   <a:srgbClr val="000000"/>
                 </a:solidFill>
@@ -786,14 +786,14 @@
           </a:ln>
           <a:extLst>
             <a:ext uri="{909E8E84-426E-40dd-AFC4-6F175D3DCCD1}">
-              <a14:hiddenFill xmlns:a14="http://schemas.microsoft.com/office/drawing/2010/main" xmlns:p="http://schemas.openxmlformats.org/presentationml/2006/main" xmlns:r="http://schemas.openxmlformats.org/officeDocument/2006/relationships" xmlns:a="http://schemas.openxmlformats.org/drawingml/2006/main" xmlns="">
+              <a14:hiddenFill xmlns="" xmlns:a="http://schemas.openxmlformats.org/drawingml/2006/main" xmlns:r="http://schemas.openxmlformats.org/officeDocument/2006/relationships" xmlns:p="http://schemas.openxmlformats.org/presentationml/2006/main" xmlns:a14="http://schemas.microsoft.com/office/drawing/2010/main" xmlns:mv="urn:schemas-microsoft-com:mac:vml" xmlns:mc="http://schemas.openxmlformats.org/markup-compatibility/2006">
                 <a:solidFill>
                   <a:srgbClr val="FFFFFF"/>
                 </a:solidFill>
               </a14:hiddenFill>
             </a:ext>
             <a:ext uri="{FAA26D3D-D897-4be2-8F04-BA451C77F1D7}">
-              <ma14:placeholderFlag xmlns:ma14="http://schemas.microsoft.com/office/mac/drawingml/2011/main" xmlns:p="http://schemas.openxmlformats.org/presentationml/2006/main" xmlns:r="http://schemas.openxmlformats.org/officeDocument/2006/relationships" xmlns:a="http://schemas.openxmlformats.org/drawingml/2006/main" xmlns="" val="1"/>
+              <ma14:placeholderFlag xmlns="" xmlns:a="http://schemas.openxmlformats.org/drawingml/2006/main" xmlns:r="http://schemas.openxmlformats.org/officeDocument/2006/relationships" xmlns:p="http://schemas.openxmlformats.org/presentationml/2006/main" xmlns:ma14="http://schemas.microsoft.com/office/mac/drawingml/2011/main" xmlns:mv="urn:schemas-microsoft-com:mac:vml" xmlns:mc="http://schemas.openxmlformats.org/markup-compatibility/2006" val="1"/>
             </a:ext>
           </a:extLst>
         </p:spPr>
@@ -812,14 +812,14 @@
           <a:noFill/>
           <a:extLst>
             <a:ext uri="{909E8E84-426E-40dd-AFC4-6F175D3DCCD1}">
-              <a14:hiddenFill xmlns:a14="http://schemas.microsoft.com/office/drawing/2010/main" xmlns:p="http://schemas.openxmlformats.org/presentationml/2006/main" xmlns:r="http://schemas.openxmlformats.org/officeDocument/2006/relationships" xmlns:a="http://schemas.openxmlformats.org/drawingml/2006/main" xmlns="">
+              <a14:hiddenFill xmlns="" xmlns:a="http://schemas.openxmlformats.org/drawingml/2006/main" xmlns:r="http://schemas.openxmlformats.org/officeDocument/2006/relationships" xmlns:p="http://schemas.openxmlformats.org/presentationml/2006/main" xmlns:a14="http://schemas.microsoft.com/office/drawing/2010/main" xmlns:mv="urn:schemas-microsoft-com:mac:vml" xmlns:mc="http://schemas.openxmlformats.org/markup-compatibility/2006">
                 <a:solidFill>
                   <a:srgbClr val="FFFFFF"/>
                 </a:solidFill>
               </a14:hiddenFill>
             </a:ext>
             <a:ext uri="{91240B29-F687-4f45-9708-019B960494DF}">
-              <a14:hiddenLine xmlns:a14="http://schemas.microsoft.com/office/drawing/2010/main" xmlns:p="http://schemas.openxmlformats.org/presentationml/2006/main" xmlns:r="http://schemas.openxmlformats.org/officeDocument/2006/relationships" xmlns:a="http://schemas.openxmlformats.org/drawingml/2006/main" xmlns="" w="9525">
+              <a14:hiddenLine xmlns="" xmlns:a="http://schemas.openxmlformats.org/drawingml/2006/main" xmlns:r="http://schemas.openxmlformats.org/officeDocument/2006/relationships" xmlns:p="http://schemas.openxmlformats.org/presentationml/2006/main" xmlns:a14="http://schemas.microsoft.com/office/drawing/2010/main" xmlns:mv="urn:schemas-microsoft-com:mac:vml" xmlns:mc="http://schemas.openxmlformats.org/markup-compatibility/2006" w="9525">
                 <a:solidFill>
                   <a:srgbClr val="000000"/>
                 </a:solidFill>
@@ -895,14 +895,14 @@
           </a:ln>
           <a:extLst>
             <a:ext uri="{909E8E84-426E-40dd-AFC4-6F175D3DCCD1}">
-              <a14:hiddenFill xmlns:a14="http://schemas.microsoft.com/office/drawing/2010/main" xmlns:p="http://schemas.openxmlformats.org/presentationml/2006/main" xmlns:r="http://schemas.openxmlformats.org/officeDocument/2006/relationships" xmlns:a="http://schemas.openxmlformats.org/drawingml/2006/main" xmlns="">
+              <a14:hiddenFill xmlns="" xmlns:a="http://schemas.openxmlformats.org/drawingml/2006/main" xmlns:r="http://schemas.openxmlformats.org/officeDocument/2006/relationships" xmlns:p="http://schemas.openxmlformats.org/presentationml/2006/main" xmlns:a14="http://schemas.microsoft.com/office/drawing/2010/main" xmlns:mv="urn:schemas-microsoft-com:mac:vml" xmlns:mc="http://schemas.openxmlformats.org/markup-compatibility/2006">
                 <a:solidFill>
                   <a:srgbClr val="FFFFFF"/>
                 </a:solidFill>
               </a14:hiddenFill>
             </a:ext>
             <a:ext uri="{91240B29-F687-4f45-9708-019B960494DF}">
-              <a14:hiddenLine xmlns:a14="http://schemas.microsoft.com/office/drawing/2010/main" xmlns:p="http://schemas.openxmlformats.org/presentationml/2006/main" xmlns:r="http://schemas.openxmlformats.org/officeDocument/2006/relationships" xmlns:a="http://schemas.openxmlformats.org/drawingml/2006/main" xmlns="" w="9525">
+              <a14:hiddenLine xmlns="" xmlns:a="http://schemas.openxmlformats.org/drawingml/2006/main" xmlns:r="http://schemas.openxmlformats.org/officeDocument/2006/relationships" xmlns:p="http://schemas.openxmlformats.org/presentationml/2006/main" xmlns:a14="http://schemas.microsoft.com/office/drawing/2010/main" xmlns:mv="urn:schemas-microsoft-com:mac:vml" xmlns:mc="http://schemas.openxmlformats.org/markup-compatibility/2006" w="9525">
                 <a:solidFill>
                   <a:srgbClr val="000000"/>
                 </a:solidFill>
@@ -1056,14 +1056,14 @@
           </a:ln>
           <a:extLst>
             <a:ext uri="{909E8E84-426E-40dd-AFC4-6F175D3DCCD1}">
-              <a14:hiddenFill xmlns:a14="http://schemas.microsoft.com/office/drawing/2010/main" xmlns:p="http://schemas.openxmlformats.org/presentationml/2006/main" xmlns:r="http://schemas.openxmlformats.org/officeDocument/2006/relationships" xmlns:a="http://schemas.openxmlformats.org/drawingml/2006/main" xmlns="">
+              <a14:hiddenFill xmlns="" xmlns:a="http://schemas.openxmlformats.org/drawingml/2006/main" xmlns:r="http://schemas.openxmlformats.org/officeDocument/2006/relationships" xmlns:p="http://schemas.openxmlformats.org/presentationml/2006/main" xmlns:a14="http://schemas.microsoft.com/office/drawing/2010/main" xmlns:mv="urn:schemas-microsoft-com:mac:vml" xmlns:mc="http://schemas.openxmlformats.org/markup-compatibility/2006">
                 <a:solidFill>
                   <a:srgbClr val="FFFFFF"/>
                 </a:solidFill>
               </a14:hiddenFill>
             </a:ext>
             <a:ext uri="{FAA26D3D-D897-4be2-8F04-BA451C77F1D7}">
-              <ma14:placeholderFlag xmlns:ma14="http://schemas.microsoft.com/office/mac/drawingml/2011/main" xmlns:p="http://schemas.openxmlformats.org/presentationml/2006/main" xmlns:r="http://schemas.openxmlformats.org/officeDocument/2006/relationships" xmlns:a="http://schemas.openxmlformats.org/drawingml/2006/main" xmlns="" val="1"/>
+              <ma14:placeholderFlag xmlns="" xmlns:a="http://schemas.openxmlformats.org/drawingml/2006/main" xmlns:r="http://schemas.openxmlformats.org/officeDocument/2006/relationships" xmlns:p="http://schemas.openxmlformats.org/presentationml/2006/main" xmlns:ma14="http://schemas.microsoft.com/office/mac/drawingml/2011/main" xmlns:mv="urn:schemas-microsoft-com:mac:vml" xmlns:mc="http://schemas.openxmlformats.org/markup-compatibility/2006" val="1"/>
             </a:ext>
           </a:extLst>
         </p:spPr>
@@ -1082,14 +1082,14 @@
           <a:noFill/>
           <a:extLst>
             <a:ext uri="{909E8E84-426E-40dd-AFC4-6F175D3DCCD1}">
-              <a14:hiddenFill xmlns:a14="http://schemas.microsoft.com/office/drawing/2010/main" xmlns:p="http://schemas.openxmlformats.org/presentationml/2006/main" xmlns:r="http://schemas.openxmlformats.org/officeDocument/2006/relationships" xmlns:a="http://schemas.openxmlformats.org/drawingml/2006/main" xmlns="">
+              <a14:hiddenFill xmlns="" xmlns:a="http://schemas.openxmlformats.org/drawingml/2006/main" xmlns:r="http://schemas.openxmlformats.org/officeDocument/2006/relationships" xmlns:p="http://schemas.openxmlformats.org/presentationml/2006/main" xmlns:a14="http://schemas.microsoft.com/office/drawing/2010/main" xmlns:mv="urn:schemas-microsoft-com:mac:vml" xmlns:mc="http://schemas.openxmlformats.org/markup-compatibility/2006">
                 <a:solidFill>
                   <a:srgbClr val="FFFFFF"/>
                 </a:solidFill>
               </a14:hiddenFill>
             </a:ext>
             <a:ext uri="{91240B29-F687-4f45-9708-019B960494DF}">
-              <a14:hiddenLine xmlns:a14="http://schemas.microsoft.com/office/drawing/2010/main" xmlns:p="http://schemas.openxmlformats.org/presentationml/2006/main" xmlns:r="http://schemas.openxmlformats.org/officeDocument/2006/relationships" xmlns:a="http://schemas.openxmlformats.org/drawingml/2006/main" xmlns="" w="9525">
+              <a14:hiddenLine xmlns="" xmlns:a="http://schemas.openxmlformats.org/drawingml/2006/main" xmlns:r="http://schemas.openxmlformats.org/officeDocument/2006/relationships" xmlns:p="http://schemas.openxmlformats.org/presentationml/2006/main" xmlns:a14="http://schemas.microsoft.com/office/drawing/2010/main" xmlns:mv="urn:schemas-microsoft-com:mac:vml" xmlns:mc="http://schemas.openxmlformats.org/markup-compatibility/2006" w="9525">
                 <a:solidFill>
                   <a:srgbClr val="000000"/>
                 </a:solidFill>
@@ -1165,14 +1165,14 @@
           </a:ln>
           <a:extLst>
             <a:ext uri="{909E8E84-426E-40dd-AFC4-6F175D3DCCD1}">
-              <a14:hiddenFill xmlns:a14="http://schemas.microsoft.com/office/drawing/2010/main" xmlns:p="http://schemas.openxmlformats.org/presentationml/2006/main" xmlns:r="http://schemas.openxmlformats.org/officeDocument/2006/relationships" xmlns:a="http://schemas.openxmlformats.org/drawingml/2006/main" xmlns="">
+              <a14:hiddenFill xmlns="" xmlns:a="http://schemas.openxmlformats.org/drawingml/2006/main" xmlns:r="http://schemas.openxmlformats.org/officeDocument/2006/relationships" xmlns:p="http://schemas.openxmlformats.org/presentationml/2006/main" xmlns:a14="http://schemas.microsoft.com/office/drawing/2010/main" xmlns:mv="urn:schemas-microsoft-com:mac:vml" xmlns:mc="http://schemas.openxmlformats.org/markup-compatibility/2006">
                 <a:solidFill>
                   <a:srgbClr val="FFFFFF"/>
                 </a:solidFill>
               </a14:hiddenFill>
             </a:ext>
             <a:ext uri="{91240B29-F687-4f45-9708-019B960494DF}">
-              <a14:hiddenLine xmlns:a14="http://schemas.microsoft.com/office/drawing/2010/main" xmlns:p="http://schemas.openxmlformats.org/presentationml/2006/main" xmlns:r="http://schemas.openxmlformats.org/officeDocument/2006/relationships" xmlns:a="http://schemas.openxmlformats.org/drawingml/2006/main" xmlns="" w="9525">
+              <a14:hiddenLine xmlns="" xmlns:a="http://schemas.openxmlformats.org/drawingml/2006/main" xmlns:r="http://schemas.openxmlformats.org/officeDocument/2006/relationships" xmlns:p="http://schemas.openxmlformats.org/presentationml/2006/main" xmlns:a14="http://schemas.microsoft.com/office/drawing/2010/main" xmlns:mv="urn:schemas-microsoft-com:mac:vml" xmlns:mc="http://schemas.openxmlformats.org/markup-compatibility/2006" w="9525">
                 <a:solidFill>
                   <a:srgbClr val="000000"/>
                 </a:solidFill>
@@ -1326,14 +1326,14 @@
           </a:ln>
           <a:extLst>
             <a:ext uri="{909E8E84-426E-40dd-AFC4-6F175D3DCCD1}">
-              <a14:hiddenFill xmlns:a14="http://schemas.microsoft.com/office/drawing/2010/main" xmlns:p="http://schemas.openxmlformats.org/presentationml/2006/main" xmlns:r="http://schemas.openxmlformats.org/officeDocument/2006/relationships" xmlns:a="http://schemas.openxmlformats.org/drawingml/2006/main" xmlns="">
+              <a14:hiddenFill xmlns="" xmlns:a="http://schemas.openxmlformats.org/drawingml/2006/main" xmlns:r="http://schemas.openxmlformats.org/officeDocument/2006/relationships" xmlns:p="http://schemas.openxmlformats.org/presentationml/2006/main" xmlns:a14="http://schemas.microsoft.com/office/drawing/2010/main" xmlns:mv="urn:schemas-microsoft-com:mac:vml" xmlns:mc="http://schemas.openxmlformats.org/markup-compatibility/2006">
                 <a:solidFill>
                   <a:srgbClr val="FFFFFF"/>
                 </a:solidFill>
               </a14:hiddenFill>
             </a:ext>
             <a:ext uri="{FAA26D3D-D897-4be2-8F04-BA451C77F1D7}">
-              <ma14:placeholderFlag xmlns:ma14="http://schemas.microsoft.com/office/mac/drawingml/2011/main" xmlns:p="http://schemas.openxmlformats.org/presentationml/2006/main" xmlns:r="http://schemas.openxmlformats.org/officeDocument/2006/relationships" xmlns:a="http://schemas.openxmlformats.org/drawingml/2006/main" xmlns="" val="1"/>
+              <ma14:placeholderFlag xmlns="" xmlns:a="http://schemas.openxmlformats.org/drawingml/2006/main" xmlns:r="http://schemas.openxmlformats.org/officeDocument/2006/relationships" xmlns:p="http://schemas.openxmlformats.org/presentationml/2006/main" xmlns:ma14="http://schemas.microsoft.com/office/mac/drawingml/2011/main" xmlns:mv="urn:schemas-microsoft-com:mac:vml" xmlns:mc="http://schemas.openxmlformats.org/markup-compatibility/2006" val="1"/>
             </a:ext>
           </a:extLst>
         </p:spPr>
@@ -1352,14 +1352,14 @@
           <a:noFill/>
           <a:extLst>
             <a:ext uri="{909E8E84-426E-40dd-AFC4-6F175D3DCCD1}">
-              <a14:hiddenFill xmlns:a14="http://schemas.microsoft.com/office/drawing/2010/main" xmlns:p="http://schemas.openxmlformats.org/presentationml/2006/main" xmlns:r="http://schemas.openxmlformats.org/officeDocument/2006/relationships" xmlns:a="http://schemas.openxmlformats.org/drawingml/2006/main" xmlns="">
+              <a14:hiddenFill xmlns="" xmlns:a="http://schemas.openxmlformats.org/drawingml/2006/main" xmlns:r="http://schemas.openxmlformats.org/officeDocument/2006/relationships" xmlns:p="http://schemas.openxmlformats.org/presentationml/2006/main" xmlns:a14="http://schemas.microsoft.com/office/drawing/2010/main" xmlns:mv="urn:schemas-microsoft-com:mac:vml" xmlns:mc="http://schemas.openxmlformats.org/markup-compatibility/2006">
                 <a:solidFill>
                   <a:srgbClr val="FFFFFF"/>
                 </a:solidFill>
               </a14:hiddenFill>
             </a:ext>
             <a:ext uri="{91240B29-F687-4f45-9708-019B960494DF}">
-              <a14:hiddenLine xmlns:a14="http://schemas.microsoft.com/office/drawing/2010/main" xmlns:p="http://schemas.openxmlformats.org/presentationml/2006/main" xmlns:r="http://schemas.openxmlformats.org/officeDocument/2006/relationships" xmlns:a="http://schemas.openxmlformats.org/drawingml/2006/main" xmlns="" w="9525">
+              <a14:hiddenLine xmlns="" xmlns:a="http://schemas.openxmlformats.org/drawingml/2006/main" xmlns:r="http://schemas.openxmlformats.org/officeDocument/2006/relationships" xmlns:p="http://schemas.openxmlformats.org/presentationml/2006/main" xmlns:a14="http://schemas.microsoft.com/office/drawing/2010/main" xmlns:mv="urn:schemas-microsoft-com:mac:vml" xmlns:mc="http://schemas.openxmlformats.org/markup-compatibility/2006" w="9525">
                 <a:solidFill>
                   <a:srgbClr val="000000"/>
                 </a:solidFill>
@@ -1415,65 +1415,250 @@
       </p:grpSpPr>
       <p:sp>
         <p:nvSpPr>
-          <p:cNvPr id="2" name="Slide Image Placeholder 1"/>
+          <p:cNvPr id="16385" name="Rectangle 7"/>
+          <p:cNvSpPr txBox="1">
+            <a:spLocks noGrp="1" noChangeArrowheads="1"/>
+          </p:cNvSpPr>
+          <p:nvPr/>
+        </p:nvSpPr>
+        <p:spPr bwMode="auto">
+          <a:xfrm>
+            <a:off x="3886200" y="8686800"/>
+            <a:ext cx="2971800" cy="457200"/>
+          </a:xfrm>
+          <a:prstGeom prst="rect">
+            <a:avLst/>
+          </a:prstGeom>
+          <a:noFill/>
+          <a:ln>
+            <a:noFill/>
+          </a:ln>
+          <a:extLst>
+            <a:ext uri="{909E8E84-426E-40dd-AFC4-6F175D3DCCD1}">
+              <a14:hiddenFill xmlns="" xmlns:a="http://schemas.openxmlformats.org/drawingml/2006/main" xmlns:r="http://schemas.openxmlformats.org/officeDocument/2006/relationships" xmlns:p="http://schemas.openxmlformats.org/presentationml/2006/main" xmlns:a14="http://schemas.microsoft.com/office/drawing/2010/main" xmlns:mv="urn:schemas-microsoft-com:mac:vml" xmlns:mc="http://schemas.openxmlformats.org/markup-compatibility/2006">
+                <a:solidFill>
+                  <a:srgbClr val="FFFFFF"/>
+                </a:solidFill>
+              </a14:hiddenFill>
+            </a:ext>
+            <a:ext uri="{91240B29-F687-4f45-9708-019B960494DF}">
+              <a14:hiddenLine xmlns="" xmlns:a="http://schemas.openxmlformats.org/drawingml/2006/main" xmlns:r="http://schemas.openxmlformats.org/officeDocument/2006/relationships" xmlns:p="http://schemas.openxmlformats.org/presentationml/2006/main" xmlns:a14="http://schemas.microsoft.com/office/drawing/2010/main" xmlns:mv="urn:schemas-microsoft-com:mac:vml" xmlns:mc="http://schemas.openxmlformats.org/markup-compatibility/2006" w="9525">
+                <a:solidFill>
+                  <a:srgbClr val="000000"/>
+                </a:solidFill>
+                <a:miter lim="800000"/>
+                <a:headEnd/>
+                <a:tailEnd/>
+              </a14:hiddenLine>
+            </a:ext>
+          </a:extLst>
+        </p:spPr>
+        <p:txBody>
+          <a:bodyPr anchor="b"/>
+          <a:lstStyle>
+            <a:lvl1pPr eaLnBrk="0" hangingPunct="0">
+              <a:defRPr sz="3000">
+                <a:solidFill>
+                  <a:schemeClr val="tx1"/>
+                </a:solidFill>
+                <a:latin typeface="Arial" charset="0"/>
+                <a:ea typeface="ＭＳ Ｐゴシック" charset="0"/>
+                <a:cs typeface="ＭＳ Ｐゴシック" charset="0"/>
+              </a:defRPr>
+            </a:lvl1pPr>
+            <a:lvl2pPr marL="742950" indent="-285750" eaLnBrk="0" hangingPunct="0">
+              <a:defRPr sz="3000">
+                <a:solidFill>
+                  <a:schemeClr val="tx1"/>
+                </a:solidFill>
+                <a:latin typeface="Arial" charset="0"/>
+                <a:ea typeface="ＭＳ Ｐゴシック" charset="0"/>
+              </a:defRPr>
+            </a:lvl2pPr>
+            <a:lvl3pPr marL="1143000" indent="-228600" eaLnBrk="0" hangingPunct="0">
+              <a:defRPr sz="3000">
+                <a:solidFill>
+                  <a:schemeClr val="tx1"/>
+                </a:solidFill>
+                <a:latin typeface="Arial" charset="0"/>
+                <a:ea typeface="ＭＳ Ｐゴシック" charset="0"/>
+              </a:defRPr>
+            </a:lvl3pPr>
+            <a:lvl4pPr marL="1600200" indent="-228600" eaLnBrk="0" hangingPunct="0">
+              <a:defRPr sz="3000">
+                <a:solidFill>
+                  <a:schemeClr val="tx1"/>
+                </a:solidFill>
+                <a:latin typeface="Arial" charset="0"/>
+                <a:ea typeface="ＭＳ Ｐゴシック" charset="0"/>
+              </a:defRPr>
+            </a:lvl4pPr>
+            <a:lvl5pPr marL="2057400" indent="-228600" eaLnBrk="0" hangingPunct="0">
+              <a:defRPr sz="3000">
+                <a:solidFill>
+                  <a:schemeClr val="tx1"/>
+                </a:solidFill>
+                <a:latin typeface="Arial" charset="0"/>
+                <a:ea typeface="ＭＳ Ｐゴシック" charset="0"/>
+              </a:defRPr>
+            </a:lvl5pPr>
+            <a:lvl6pPr marL="2514600" indent="-228600" defTabSz="773113" eaLnBrk="0" fontAlgn="base" hangingPunct="0">
+              <a:spcBef>
+                <a:spcPct val="0"/>
+              </a:spcBef>
+              <a:spcAft>
+                <a:spcPct val="0"/>
+              </a:spcAft>
+              <a:defRPr sz="3000">
+                <a:solidFill>
+                  <a:schemeClr val="tx1"/>
+                </a:solidFill>
+                <a:latin typeface="Arial" charset="0"/>
+                <a:ea typeface="ＭＳ Ｐゴシック" charset="0"/>
+              </a:defRPr>
+            </a:lvl6pPr>
+            <a:lvl7pPr marL="2971800" indent="-228600" defTabSz="773113" eaLnBrk="0" fontAlgn="base" hangingPunct="0">
+              <a:spcBef>
+                <a:spcPct val="0"/>
+              </a:spcBef>
+              <a:spcAft>
+                <a:spcPct val="0"/>
+              </a:spcAft>
+              <a:defRPr sz="3000">
+                <a:solidFill>
+                  <a:schemeClr val="tx1"/>
+                </a:solidFill>
+                <a:latin typeface="Arial" charset="0"/>
+                <a:ea typeface="ＭＳ Ｐゴシック" charset="0"/>
+              </a:defRPr>
+            </a:lvl7pPr>
+            <a:lvl8pPr marL="3429000" indent="-228600" defTabSz="773113" eaLnBrk="0" fontAlgn="base" hangingPunct="0">
+              <a:spcBef>
+                <a:spcPct val="0"/>
+              </a:spcBef>
+              <a:spcAft>
+                <a:spcPct val="0"/>
+              </a:spcAft>
+              <a:defRPr sz="3000">
+                <a:solidFill>
+                  <a:schemeClr val="tx1"/>
+                </a:solidFill>
+                <a:latin typeface="Arial" charset="0"/>
+                <a:ea typeface="ＭＳ Ｐゴシック" charset="0"/>
+              </a:defRPr>
+            </a:lvl8pPr>
+            <a:lvl9pPr marL="3886200" indent="-228600" defTabSz="773113" eaLnBrk="0" fontAlgn="base" hangingPunct="0">
+              <a:spcBef>
+                <a:spcPct val="0"/>
+              </a:spcBef>
+              <a:spcAft>
+                <a:spcPct val="0"/>
+              </a:spcAft>
+              <a:defRPr sz="3000">
+                <a:solidFill>
+                  <a:schemeClr val="tx1"/>
+                </a:solidFill>
+                <a:latin typeface="Arial" charset="0"/>
+                <a:ea typeface="ＭＳ Ｐゴシック" charset="0"/>
+              </a:defRPr>
+            </a:lvl9pPr>
+          </a:lstStyle>
+          <a:p>
+            <a:pPr algn="r"/>
+            <a:fld id="{A62E8883-B2A8-7548-B813-4C5E55B686B7}" type="slidenum">
+              <a:rPr lang="en-US" sz="1200"/>
+              <a:pPr algn="r"/>
+              <a:t>5</a:t>
+            </a:fld>
+            <a:endParaRPr lang="en-US" sz="1200"/>
+          </a:p>
+        </p:txBody>
+      </p:sp>
+      <p:sp>
+        <p:nvSpPr>
+          <p:cNvPr id="16386" name="Rectangle 2"/>
           <p:cNvSpPr>
-            <a:spLocks noGrp="1" noRot="1" noChangeAspect="1"/>
+            <a:spLocks noGrp="1" noRot="1" noChangeAspect="1" noChangeArrowheads="1" noTextEdit="1"/>
           </p:cNvSpPr>
           <p:nvPr>
             <p:ph type="sldImg"/>
           </p:nvPr>
         </p:nvSpPr>
-        <p:spPr/>
-      </p:sp>
-      <p:sp>
-        <p:nvSpPr>
-          <p:cNvPr id="3" name="Notes Placeholder 2"/>
+        <p:spPr bwMode="auto">
+          <a:noFill/>
+          <a:ln>
+            <a:solidFill>
+              <a:srgbClr val="000000"/>
+            </a:solidFill>
+            <a:miter lim="800000"/>
+            <a:headEnd/>
+            <a:tailEnd/>
+          </a:ln>
+          <a:extLst>
+            <a:ext uri="{909E8E84-426E-40dd-AFC4-6F175D3DCCD1}">
+              <a14:hiddenFill xmlns="" xmlns:a="http://schemas.openxmlformats.org/drawingml/2006/main" xmlns:r="http://schemas.openxmlformats.org/officeDocument/2006/relationships" xmlns:p="http://schemas.openxmlformats.org/presentationml/2006/main" xmlns:a14="http://schemas.microsoft.com/office/drawing/2010/main" xmlns:mv="urn:schemas-microsoft-com:mac:vml" xmlns:mc="http://schemas.openxmlformats.org/markup-compatibility/2006">
+                <a:solidFill>
+                  <a:srgbClr val="FFFFFF"/>
+                </a:solidFill>
+              </a14:hiddenFill>
+            </a:ext>
+            <a:ext uri="{FAA26D3D-D897-4be2-8F04-BA451C77F1D7}">
+              <ma14:placeholderFlag xmlns="" xmlns:a="http://schemas.openxmlformats.org/drawingml/2006/main" xmlns:r="http://schemas.openxmlformats.org/officeDocument/2006/relationships" xmlns:p="http://schemas.openxmlformats.org/presentationml/2006/main" xmlns:ma14="http://schemas.microsoft.com/office/mac/drawingml/2011/main" xmlns:mv="urn:schemas-microsoft-com:mac:vml" xmlns:mc="http://schemas.openxmlformats.org/markup-compatibility/2006" val="1"/>
+            </a:ext>
+          </a:extLst>
+        </p:spPr>
+      </p:sp>
+      <p:sp>
+        <p:nvSpPr>
+          <p:cNvPr id="16387" name="Rectangle 3"/>
           <p:cNvSpPr>
-            <a:spLocks noGrp="1"/>
+            <a:spLocks noGrp="1" noChangeArrowheads="1"/>
           </p:cNvSpPr>
           <p:nvPr>
             <p:ph type="body" idx="1"/>
           </p:nvPr>
         </p:nvSpPr>
-        <p:spPr/>
-        <p:txBody>
-          <a:bodyPr/>
+        <p:spPr bwMode="auto">
+          <a:noFill/>
+          <a:extLst>
+            <a:ext uri="{909E8E84-426E-40dd-AFC4-6F175D3DCCD1}">
+              <a14:hiddenFill xmlns="" xmlns:a="http://schemas.openxmlformats.org/drawingml/2006/main" xmlns:r="http://schemas.openxmlformats.org/officeDocument/2006/relationships" xmlns:p="http://schemas.openxmlformats.org/presentationml/2006/main" xmlns:a14="http://schemas.microsoft.com/office/drawing/2010/main" xmlns:mv="urn:schemas-microsoft-com:mac:vml" xmlns:mc="http://schemas.openxmlformats.org/markup-compatibility/2006">
+                <a:solidFill>
+                  <a:srgbClr val="FFFFFF"/>
+                </a:solidFill>
+              </a14:hiddenFill>
+            </a:ext>
+            <a:ext uri="{91240B29-F687-4f45-9708-019B960494DF}">
+              <a14:hiddenLine xmlns="" xmlns:a="http://schemas.openxmlformats.org/drawingml/2006/main" xmlns:r="http://schemas.openxmlformats.org/officeDocument/2006/relationships" xmlns:p="http://schemas.openxmlformats.org/presentationml/2006/main" xmlns:a14="http://schemas.microsoft.com/office/drawing/2010/main" xmlns:mv="urn:schemas-microsoft-com:mac:vml" xmlns:mc="http://schemas.openxmlformats.org/markup-compatibility/2006" w="9525">
+                <a:solidFill>
+                  <a:srgbClr val="000000"/>
+                </a:solidFill>
+                <a:miter lim="800000"/>
+                <a:headEnd/>
+                <a:tailEnd/>
+              </a14:hiddenLine>
+            </a:ext>
+          </a:extLst>
+        </p:spPr>
+        <p:txBody>
+          <a:bodyPr wrap="square" numCol="1" anchor="t" anchorCtr="0" compatLnSpc="1">
+            <a:prstTxWarp prst="textNoShape">
+              <a:avLst/>
+            </a:prstTxWarp>
+          </a:bodyPr>
           <a:lstStyle/>
           <a:p>
-            <a:endParaRPr lang="en-US"/>
-          </a:p>
-        </p:txBody>
-      </p:sp>
-      <p:sp>
-        <p:nvSpPr>
-          <p:cNvPr id="4" name="Slide Number Placeholder 3"/>
-          <p:cNvSpPr>
-            <a:spLocks noGrp="1"/>
-          </p:cNvSpPr>
-          <p:nvPr>
-            <p:ph type="sldNum" sz="quarter" idx="10"/>
-          </p:nvPr>
-        </p:nvSpPr>
-        <p:spPr/>
-        <p:txBody>
-          <a:bodyPr/>
-          <a:lstStyle/>
-          <a:p>
-            <a:fld id="{3560C2FB-C494-1A46-A471-884A4E75440F}" type="slidenum">
-              <a:rPr lang="en-US" smtClean="0"/>
-              <a:pPr/>
-              <a:t>5</a:t>
-            </a:fld>
-            <a:endParaRPr lang="en-US" dirty="0"/>
+            <a:pPr eaLnBrk="1" hangingPunct="1"/>
+            <a:r>
+              <a:rPr lang="en-US">
+                <a:latin typeface="Calibri" charset="0"/>
+              </a:rPr>
+              <a:t>Started at 3:04 </a:t>
+            </a:r>
           </a:p>
         </p:txBody>
       </p:sp>
     </p:spTree>
-    <p:extLst>
-      <p:ext uri="{BB962C8B-B14F-4D97-AF65-F5344CB8AC3E}">
-        <p14:creationId xmlns:p14="http://schemas.microsoft.com/office/powerpoint/2010/main" xmlns:p="http://schemas.openxmlformats.org/presentationml/2006/main" xmlns:r="http://schemas.openxmlformats.org/officeDocument/2006/relationships" xmlns:a="http://schemas.openxmlformats.org/drawingml/2006/main" xmlns="" val="963676054"/>
-      </p:ext>
-    </p:extLst>
   </p:cSld>
   <p:clrMapOvr>
     <a:masterClrMapping/>
@@ -1556,7 +1741,7 @@
     </p:spTree>
     <p:extLst>
       <p:ext uri="{BB962C8B-B14F-4D97-AF65-F5344CB8AC3E}">
-        <p14:creationId xmlns:p14="http://schemas.microsoft.com/office/powerpoint/2010/main" xmlns:p="http://schemas.openxmlformats.org/presentationml/2006/main" xmlns:r="http://schemas.openxmlformats.org/officeDocument/2006/relationships" xmlns:a="http://schemas.openxmlformats.org/drawingml/2006/main" xmlns="" val="963676054"/>
+        <p14:creationId xmlns="" xmlns:a="http://schemas.openxmlformats.org/drawingml/2006/main" xmlns:r="http://schemas.openxmlformats.org/officeDocument/2006/relationships" xmlns:p="http://schemas.openxmlformats.org/presentationml/2006/main" xmlns:p14="http://schemas.microsoft.com/office/powerpoint/2010/main" xmlns:mv="urn:schemas-microsoft-com:mac:vml" xmlns:mc="http://schemas.openxmlformats.org/markup-compatibility/2006" val="963676054"/>
       </p:ext>
     </p:extLst>
   </p:cSld>
@@ -1641,7 +1826,7 @@
     </p:spTree>
     <p:extLst>
       <p:ext uri="{BB962C8B-B14F-4D97-AF65-F5344CB8AC3E}">
-        <p14:creationId xmlns:p14="http://schemas.microsoft.com/office/powerpoint/2010/main" xmlns:p="http://schemas.openxmlformats.org/presentationml/2006/main" xmlns:r="http://schemas.openxmlformats.org/officeDocument/2006/relationships" xmlns:a="http://schemas.openxmlformats.org/drawingml/2006/main" xmlns="" val="1443086944"/>
+        <p14:creationId xmlns="" xmlns:a="http://schemas.openxmlformats.org/drawingml/2006/main" xmlns:r="http://schemas.openxmlformats.org/officeDocument/2006/relationships" xmlns:p="http://schemas.openxmlformats.org/presentationml/2006/main" xmlns:p14="http://schemas.microsoft.com/office/powerpoint/2010/main" xmlns:mv="urn:schemas-microsoft-com:mac:vml" xmlns:mc="http://schemas.openxmlformats.org/markup-compatibility/2006" val="1443086944"/>
       </p:ext>
     </p:extLst>
   </p:cSld>
@@ -5950,7 +6135,7 @@
     </p:spTree>
     <p:extLst>
       <p:ext uri="{BB962C8B-B14F-4D97-AF65-F5344CB8AC3E}">
-        <p14:creationId xmlns:p14="http://schemas.microsoft.com/office/powerpoint/2010/main" xmlns:p="http://schemas.openxmlformats.org/presentationml/2006/main" xmlns:r="http://schemas.openxmlformats.org/officeDocument/2006/relationships" xmlns:a="http://schemas.openxmlformats.org/drawingml/2006/main" xmlns="" val="2352184382"/>
+        <p14:creationId xmlns="" xmlns:a="http://schemas.openxmlformats.org/drawingml/2006/main" xmlns:r="http://schemas.openxmlformats.org/officeDocument/2006/relationships" xmlns:p="http://schemas.openxmlformats.org/presentationml/2006/main" xmlns:p14="http://schemas.microsoft.com/office/powerpoint/2010/main" xmlns:mv="urn:schemas-microsoft-com:mac:vml" xmlns:mc="http://schemas.openxmlformats.org/markup-compatibility/2006" val="2352184382"/>
       </p:ext>
     </p:extLst>
   </p:cSld>
@@ -6072,7 +6257,7 @@
     </p:spTree>
     <p:extLst>
       <p:ext uri="{BB962C8B-B14F-4D97-AF65-F5344CB8AC3E}">
-        <p14:creationId xmlns:p14="http://schemas.microsoft.com/office/powerpoint/2010/main" xmlns:p="http://schemas.openxmlformats.org/presentationml/2006/main" xmlns:r="http://schemas.openxmlformats.org/officeDocument/2006/relationships" xmlns:a="http://schemas.openxmlformats.org/drawingml/2006/main" xmlns="" val="3700295984"/>
+        <p14:creationId xmlns="" xmlns:a="http://schemas.openxmlformats.org/drawingml/2006/main" xmlns:r="http://schemas.openxmlformats.org/officeDocument/2006/relationships" xmlns:p="http://schemas.openxmlformats.org/presentationml/2006/main" xmlns:p14="http://schemas.microsoft.com/office/powerpoint/2010/main" xmlns:mv="urn:schemas-microsoft-com:mac:vml" xmlns:mc="http://schemas.openxmlformats.org/markup-compatibility/2006" val="3700295984"/>
       </p:ext>
     </p:extLst>
   </p:cSld>
@@ -6131,14 +6316,14 @@
           </a:ln>
           <a:extLst>
             <a:ext uri="{909E8E84-426E-40dd-AFC4-6F175D3DCCD1}">
-              <a14:hiddenFill xmlns:a14="http://schemas.microsoft.com/office/drawing/2010/main" xmlns:p="http://schemas.openxmlformats.org/presentationml/2006/main" xmlns:r="http://schemas.openxmlformats.org/officeDocument/2006/relationships" xmlns:a="http://schemas.openxmlformats.org/drawingml/2006/main" xmlns="">
+              <a14:hiddenFill xmlns="" xmlns:a="http://schemas.openxmlformats.org/drawingml/2006/main" xmlns:r="http://schemas.openxmlformats.org/officeDocument/2006/relationships" xmlns:p="http://schemas.openxmlformats.org/presentationml/2006/main" xmlns:a14="http://schemas.microsoft.com/office/drawing/2010/main" xmlns:mv="urn:schemas-microsoft-com:mac:vml" xmlns:mc="http://schemas.openxmlformats.org/markup-compatibility/2006">
                 <a:solidFill>
                   <a:srgbClr val="FFFFFF"/>
                 </a:solidFill>
               </a14:hiddenFill>
             </a:ext>
             <a:ext uri="{91240B29-F687-4f45-9708-019B960494DF}">
-              <a14:hiddenLine xmlns:a14="http://schemas.microsoft.com/office/drawing/2010/main" xmlns:p="http://schemas.openxmlformats.org/presentationml/2006/main" xmlns:r="http://schemas.openxmlformats.org/officeDocument/2006/relationships" xmlns:a="http://schemas.openxmlformats.org/drawingml/2006/main" xmlns="" w="9525">
+              <a14:hiddenLine xmlns="" xmlns:a="http://schemas.openxmlformats.org/drawingml/2006/main" xmlns:r="http://schemas.openxmlformats.org/officeDocument/2006/relationships" xmlns:p="http://schemas.openxmlformats.org/presentationml/2006/main" xmlns:a14="http://schemas.microsoft.com/office/drawing/2010/main" xmlns:mv="urn:schemas-microsoft-com:mac:vml" xmlns:mc="http://schemas.openxmlformats.org/markup-compatibility/2006" w="9525">
                 <a:solidFill>
                   <a:srgbClr val="000000"/>
                 </a:solidFill>
@@ -6341,47 +6526,7 @@
                 <a:latin typeface="Arial" charset="0"/>
                 <a:ea typeface="ＭＳ Ｐゴシック" charset="0"/>
               </a:rPr>
-              <a:t>An </a:t>
-            </a:r>
-            <a:r>
-              <a:rPr lang="en-US" sz="3200" dirty="0" smtClean="0">
-                <a:solidFill>
-                  <a:srgbClr val="23383A"/>
-                </a:solidFill>
-                <a:latin typeface="Arial" charset="0"/>
-                <a:ea typeface="ＭＳ Ｐゴシック" charset="0"/>
-              </a:rPr>
-              <a:t>API</a:t>
-            </a:r>
-            <a:r>
-              <a:rPr lang="en-US" sz="3200" dirty="0" smtClean="0">
-                <a:solidFill>
-                  <a:srgbClr val="23383A"/>
-                </a:solidFill>
-                <a:latin typeface="Arial" charset="0"/>
-                <a:ea typeface="ＭＳ Ｐゴシック" charset="0"/>
-              </a:rPr>
-              <a:t> </a:t>
-            </a:r>
-            <a:r>
-              <a:rPr lang="en-US" sz="3200" dirty="0" smtClean="0">
-                <a:solidFill>
-                  <a:srgbClr val="23383A"/>
-                </a:solidFill>
-                <a:latin typeface="Arial" charset="0"/>
-                <a:ea typeface="ＭＳ Ｐゴシック" charset="0"/>
-              </a:rPr>
-              <a:t>for </a:t>
-            </a:r>
-            <a:r>
-              <a:rPr lang="en-US" sz="3200" dirty="0" smtClean="0">
-                <a:solidFill>
-                  <a:srgbClr val="23383A"/>
-                </a:solidFill>
-                <a:latin typeface="Arial" charset="0"/>
-                <a:ea typeface="ＭＳ Ｐゴシック" charset="0"/>
-              </a:rPr>
-              <a:t>accessing the content and metadata in your </a:t>
+              <a:t>An API for accessing the content and metadata in your </a:t>
             </a:r>
             <a:r>
               <a:rPr lang="en-US" sz="3200" dirty="0" err="1" smtClean="0">
@@ -6401,17 +6546,7 @@
                 <a:latin typeface="Arial" charset="0"/>
                 <a:ea typeface="ＭＳ Ｐゴシック" charset="0"/>
               </a:rPr>
-              <a:t> </a:t>
-            </a:r>
-            <a:r>
-              <a:rPr lang="en-US" sz="3200" dirty="0" smtClean="0">
-                <a:solidFill>
-                  <a:srgbClr val="23383A"/>
-                </a:solidFill>
-                <a:latin typeface="Arial" charset="0"/>
-                <a:ea typeface="ＭＳ Ｐゴシック" charset="0"/>
-              </a:rPr>
-              <a:t>account</a:t>
+              <a:t> account</a:t>
             </a:r>
           </a:p>
           <a:p>
@@ -6430,13 +6565,6 @@
               </a:rPr>
               <a:t>API (Application Programming Interface)</a:t>
             </a:r>
-            <a:endParaRPr lang="en-US" sz="2800" dirty="0" smtClean="0">
-              <a:solidFill>
-                <a:srgbClr val="23383A"/>
-              </a:solidFill>
-              <a:latin typeface="Arial" charset="0"/>
-              <a:ea typeface="ＭＳ Ｐゴシック" charset="0"/>
-            </a:endParaRPr>
           </a:p>
           <a:p>
             <a:pPr indent="9525">
@@ -6452,18 +6580,23 @@
                 <a:latin typeface="Arial" charset="0"/>
                 <a:ea typeface="ＭＳ Ｐゴシック" charset="0"/>
               </a:rPr>
-              <a:t>Read requests</a:t>
+              <a:t>Read requests </a:t>
             </a:r>
             <a:r>
               <a:rPr lang="en-US" sz="3200" dirty="0" smtClean="0">
                 <a:solidFill>
-                  <a:srgbClr val="23383A"/>
-                </a:solidFill>
-                <a:latin typeface="Arial" charset="0"/>
-                <a:ea typeface="ＭＳ Ｐゴシック" charset="0"/>
+                  <a:srgbClr val="292929"/>
+                </a:solidFill>
               </a:rPr>
-              <a:t> </a:t>
-            </a:r>
+              <a:t>allow you to search for videos or playlists</a:t>
+            </a:r>
+            <a:endParaRPr lang="en-US" sz="3200" dirty="0" smtClean="0">
+              <a:solidFill>
+                <a:srgbClr val="292929"/>
+              </a:solidFill>
+              <a:latin typeface="Arial" charset="0"/>
+              <a:ea typeface="ＭＳ Ｐゴシック" charset="0"/>
+            </a:endParaRPr>
           </a:p>
           <a:p>
             <a:pPr indent="9525">
@@ -6479,11 +6612,19 @@
                 <a:latin typeface="Arial" charset="0"/>
                 <a:ea typeface="ＭＳ Ｐゴシック" charset="0"/>
               </a:rPr>
-              <a:t>Write requests</a:t>
-            </a:r>
-            <a:endParaRPr lang="en-US" sz="2800" dirty="0" smtClean="0">
+              <a:t>Write requests </a:t>
+            </a:r>
+            <a:r>
+              <a:rPr lang="en-US" sz="3200" dirty="0" smtClean="0">
+                <a:solidFill>
+                  <a:srgbClr val="292929"/>
+                </a:solidFill>
+              </a:rPr>
+              <a:t>allow you to add, update, and delete videos and playlists</a:t>
+            </a:r>
+            <a:endParaRPr lang="en-US" sz="3200" dirty="0" smtClean="0">
               <a:solidFill>
-                <a:schemeClr val="tx1"/>
+                <a:srgbClr val="292929"/>
               </a:solidFill>
               <a:latin typeface="Arial" charset="0"/>
               <a:ea typeface="ＭＳ Ｐゴシック" charset="0"/>
@@ -6495,7 +6636,7 @@
     </p:spTree>
     <p:extLst>
       <p:ext uri="{BB962C8B-B14F-4D97-AF65-F5344CB8AC3E}">
-        <p14:creationId xmlns:p14="http://schemas.microsoft.com/office/powerpoint/2010/main" xmlns:p="http://schemas.openxmlformats.org/presentationml/2006/main" xmlns:r="http://schemas.openxmlformats.org/officeDocument/2006/relationships" xmlns:a="http://schemas.openxmlformats.org/drawingml/2006/main" xmlns="" val="1087471781"/>
+        <p14:creationId xmlns="" xmlns:a="http://schemas.openxmlformats.org/drawingml/2006/main" xmlns:r="http://schemas.openxmlformats.org/officeDocument/2006/relationships" xmlns:p="http://schemas.openxmlformats.org/presentationml/2006/main" xmlns:p14="http://schemas.microsoft.com/office/powerpoint/2010/main" xmlns:mv="urn:schemas-microsoft-com:mac:vml" xmlns:mc="http://schemas.openxmlformats.org/markup-compatibility/2006" val="1087471781"/>
       </p:ext>
     </p:extLst>
   </p:cSld>
@@ -6554,14 +6695,14 @@
           </a:ln>
           <a:extLst>
             <a:ext uri="{909E8E84-426E-40dd-AFC4-6F175D3DCCD1}">
-              <a14:hiddenFill xmlns:a14="http://schemas.microsoft.com/office/drawing/2010/main" xmlns:p="http://schemas.openxmlformats.org/presentationml/2006/main" xmlns:r="http://schemas.openxmlformats.org/officeDocument/2006/relationships" xmlns:a="http://schemas.openxmlformats.org/drawingml/2006/main" xmlns="">
+              <a14:hiddenFill xmlns="" xmlns:a="http://schemas.openxmlformats.org/drawingml/2006/main" xmlns:r="http://schemas.openxmlformats.org/officeDocument/2006/relationships" xmlns:p="http://schemas.openxmlformats.org/presentationml/2006/main" xmlns:a14="http://schemas.microsoft.com/office/drawing/2010/main" xmlns:mv="urn:schemas-microsoft-com:mac:vml" xmlns:mc="http://schemas.openxmlformats.org/markup-compatibility/2006">
                 <a:solidFill>
                   <a:srgbClr val="FFFFFF"/>
                 </a:solidFill>
               </a14:hiddenFill>
             </a:ext>
             <a:ext uri="{91240B29-F687-4f45-9708-019B960494DF}">
-              <a14:hiddenLine xmlns:a14="http://schemas.microsoft.com/office/drawing/2010/main" xmlns:p="http://schemas.openxmlformats.org/presentationml/2006/main" xmlns:r="http://schemas.openxmlformats.org/officeDocument/2006/relationships" xmlns:a="http://schemas.openxmlformats.org/drawingml/2006/main" xmlns="" w="9525">
+              <a14:hiddenLine xmlns="" xmlns:a="http://schemas.openxmlformats.org/drawingml/2006/main" xmlns:r="http://schemas.openxmlformats.org/officeDocument/2006/relationships" xmlns:p="http://schemas.openxmlformats.org/presentationml/2006/main" xmlns:a14="http://schemas.microsoft.com/office/drawing/2010/main" xmlns:mv="urn:schemas-microsoft-com:mac:vml" xmlns:mc="http://schemas.openxmlformats.org/markup-compatibility/2006" w="9525">
                 <a:solidFill>
                   <a:srgbClr val="000000"/>
                 </a:solidFill>
@@ -6858,29 +6999,7 @@
                 <a:ea typeface="ＭＳ Ｐゴシック" charset="0"/>
                 <a:cs typeface="ＭＳ Ｐゴシック" charset="0"/>
               </a:rPr>
-              <a:t>A </a:t>
-            </a:r>
-            <a:r>
-              <a:rPr lang="en-US" sz="2800" dirty="0" smtClean="0">
-                <a:solidFill>
-                  <a:schemeClr val="tx1"/>
-                </a:solidFill>
-                <a:latin typeface="Arial" charset="0"/>
-                <a:ea typeface="ＭＳ Ｐゴシック" charset="0"/>
-                <a:cs typeface="ＭＳ Ｐゴシック" charset="0"/>
-              </a:rPr>
-              <a:t>standard way of accessing data stored remotely over </a:t>
-            </a:r>
-            <a:r>
-              <a:rPr lang="en-US" sz="2800" dirty="0" smtClean="0">
-                <a:solidFill>
-                  <a:schemeClr val="tx1"/>
-                </a:solidFill>
-                <a:latin typeface="Arial" charset="0"/>
-                <a:ea typeface="ＭＳ Ｐゴシック" charset="0"/>
-                <a:cs typeface="ＭＳ Ｐゴシック" charset="0"/>
-              </a:rPr>
-              <a:t>HTTP</a:t>
+              <a:t>A standard way of accessing data stored remotely over HTTP</a:t>
             </a:r>
           </a:p>
           <a:p>
@@ -6898,18 +7017,7 @@
                 <a:ea typeface="ＭＳ Ｐゴシック" charset="0"/>
                 <a:cs typeface="ＭＳ Ｐゴシック" charset="0"/>
               </a:rPr>
-              <a:t>A </a:t>
-            </a:r>
-            <a:r>
-              <a:rPr lang="en-US" sz="2800" dirty="0" smtClean="0">
-                <a:solidFill>
-                  <a:schemeClr val="tx1"/>
-                </a:solidFill>
-                <a:latin typeface="Arial" charset="0"/>
-                <a:ea typeface="ＭＳ Ｐゴシック" charset="0"/>
-                <a:cs typeface="ＭＳ Ｐゴシック" charset="0"/>
-              </a:rPr>
-              <a:t>cousin of SOAP = technology that powers </a:t>
+              <a:t>A cousin of SOAP = technology that powers </a:t>
             </a:r>
             <a:r>
               <a:rPr lang="ja-JP" altLang="en-US" sz="2800" dirty="0" smtClean="0">
@@ -6968,29 +7076,7 @@
                 <a:ea typeface="ＭＳ Ｐゴシック" charset="0"/>
                 <a:cs typeface="ＭＳ Ｐゴシック" charset="0"/>
               </a:rPr>
-              <a:t>Abstracts </a:t>
-            </a:r>
-            <a:r>
-              <a:rPr lang="en-US" sz="2800" dirty="0" smtClean="0">
-                <a:solidFill>
-                  <a:schemeClr val="tx1"/>
-                </a:solidFill>
-                <a:latin typeface="Arial" charset="0"/>
-                <a:ea typeface="ＭＳ Ｐゴシック" charset="0"/>
-                <a:cs typeface="ＭＳ Ｐゴシック" charset="0"/>
-              </a:rPr>
-              <a:t>the workings of the remote system</a:t>
-            </a:r>
-            <a:r>
-              <a:rPr lang="en-US" sz="2800" dirty="0" smtClean="0">
-                <a:solidFill>
-                  <a:schemeClr val="tx1"/>
-                </a:solidFill>
-                <a:latin typeface="Arial" charset="0"/>
-                <a:ea typeface="ＭＳ Ｐゴシック" charset="0"/>
-                <a:cs typeface="ＭＳ Ｐゴシック" charset="0"/>
-              </a:rPr>
-              <a:t> </a:t>
+              <a:t>Abstracts the workings of the remote system </a:t>
             </a:r>
           </a:p>
           <a:p>
@@ -7008,18 +7094,7 @@
                 <a:ea typeface="ＭＳ Ｐゴシック" charset="0"/>
                 <a:cs typeface="ＭＳ Ｐゴシック" charset="0"/>
               </a:rPr>
-              <a:t>All </a:t>
-            </a:r>
-            <a:r>
-              <a:rPr lang="en-US" sz="2800" dirty="0" smtClean="0">
-                <a:solidFill>
-                  <a:schemeClr val="tx1"/>
-                </a:solidFill>
-                <a:latin typeface="Arial" charset="0"/>
-                <a:ea typeface="ＭＳ Ｐゴシック" charset="0"/>
-                <a:cs typeface="ＭＳ Ｐゴシック" charset="0"/>
-              </a:rPr>
-              <a:t>your code needs to understand is the format of the returned data</a:t>
+              <a:t>All your code needs to understand is the format of the returned data</a:t>
             </a:r>
           </a:p>
           <a:p>
@@ -7131,7 +7206,7 @@
     </p:spTree>
     <p:extLst>
       <p:ext uri="{BB962C8B-B14F-4D97-AF65-F5344CB8AC3E}">
-        <p14:creationId xmlns:p14="http://schemas.microsoft.com/office/powerpoint/2010/main" xmlns:p="http://schemas.openxmlformats.org/presentationml/2006/main" xmlns:r="http://schemas.openxmlformats.org/officeDocument/2006/relationships" xmlns:a="http://schemas.openxmlformats.org/drawingml/2006/main" xmlns="" val="1087471781"/>
+        <p14:creationId xmlns="" xmlns:a="http://schemas.openxmlformats.org/drawingml/2006/main" xmlns:r="http://schemas.openxmlformats.org/officeDocument/2006/relationships" xmlns:p="http://schemas.openxmlformats.org/presentationml/2006/main" xmlns:p14="http://schemas.microsoft.com/office/powerpoint/2010/main" xmlns:mv="urn:schemas-microsoft-com:mac:vml" xmlns:mc="http://schemas.openxmlformats.org/markup-compatibility/2006" val="1087471781"/>
       </p:ext>
     </p:extLst>
   </p:cSld>
@@ -7190,14 +7265,14 @@
           </a:ln>
           <a:extLst>
             <a:ext uri="{909E8E84-426E-40dd-AFC4-6F175D3DCCD1}">
-              <a14:hiddenFill xmlns:a14="http://schemas.microsoft.com/office/drawing/2010/main" xmlns:p="http://schemas.openxmlformats.org/presentationml/2006/main" xmlns:r="http://schemas.openxmlformats.org/officeDocument/2006/relationships" xmlns:a="http://schemas.openxmlformats.org/drawingml/2006/main" xmlns="">
+              <a14:hiddenFill xmlns="" xmlns:a="http://schemas.openxmlformats.org/drawingml/2006/main" xmlns:r="http://schemas.openxmlformats.org/officeDocument/2006/relationships" xmlns:p="http://schemas.openxmlformats.org/presentationml/2006/main" xmlns:a14="http://schemas.microsoft.com/office/drawing/2010/main" xmlns:mv="urn:schemas-microsoft-com:mac:vml" xmlns:mc="http://schemas.openxmlformats.org/markup-compatibility/2006">
                 <a:solidFill>
                   <a:srgbClr val="FFFFFF"/>
                 </a:solidFill>
               </a14:hiddenFill>
             </a:ext>
             <a:ext uri="{91240B29-F687-4f45-9708-019B960494DF}">
-              <a14:hiddenLine xmlns:a14="http://schemas.microsoft.com/office/drawing/2010/main" xmlns:p="http://schemas.openxmlformats.org/presentationml/2006/main" xmlns:r="http://schemas.openxmlformats.org/officeDocument/2006/relationships" xmlns:a="http://schemas.openxmlformats.org/drawingml/2006/main" xmlns="" w="9525">
+              <a14:hiddenLine xmlns="" xmlns:a="http://schemas.openxmlformats.org/drawingml/2006/main" xmlns:r="http://schemas.openxmlformats.org/officeDocument/2006/relationships" xmlns:p="http://schemas.openxmlformats.org/presentationml/2006/main" xmlns:a14="http://schemas.microsoft.com/office/drawing/2010/main" xmlns:mv="urn:schemas-microsoft-com:mac:vml" xmlns:mc="http://schemas.openxmlformats.org/markup-compatibility/2006" w="9525">
                 <a:solidFill>
                   <a:srgbClr val="000000"/>
                 </a:solidFill>
@@ -7361,14 +7436,7 @@
                 <a:latin typeface="Arial" charset="0"/>
                 <a:ea typeface="ＭＳ Ｐゴシック" charset="0"/>
               </a:rPr>
-              <a:t>Media API</a:t>
-            </a:r>
-            <a:r>
-              <a:rPr lang="en-US" dirty="0" smtClean="0">
-                <a:latin typeface="Arial" charset="0"/>
-                <a:ea typeface="ＭＳ Ｐゴシック" charset="0"/>
-              </a:rPr>
-              <a:t> write requests</a:t>
+              <a:t>Media API write requests</a:t>
             </a:r>
             <a:endParaRPr lang="en-US" dirty="0">
               <a:latin typeface="Arial" charset="0"/>
@@ -7410,75 +7478,8 @@
                 <a:latin typeface="Arial" charset="0"/>
                 <a:ea typeface="ＭＳ Ｐゴシック" charset="0"/>
               </a:rPr>
-              <a:t>Write requests</a:t>
-            </a:r>
-            <a:r>
-              <a:rPr lang="en-US" sz="3200" dirty="0" smtClean="0">
-                <a:solidFill>
-                  <a:srgbClr val="23383A"/>
-                </a:solidFill>
-                <a:latin typeface="Arial" charset="0"/>
-                <a:ea typeface="ＭＳ Ｐゴシック" charset="0"/>
-              </a:rPr>
-              <a:t> </a:t>
-            </a:r>
-            <a:r>
-              <a:rPr lang="en-US" sz="3200" dirty="0" smtClean="0">
-                <a:solidFill>
-                  <a:srgbClr val="23383A"/>
-                </a:solidFill>
-                <a:latin typeface="Arial" charset="0"/>
-                <a:ea typeface="ＭＳ Ｐゴシック" charset="0"/>
-              </a:rPr>
-              <a:t>use the</a:t>
-            </a:r>
-            <a:r>
-              <a:rPr lang="en-US" sz="3200" dirty="0" smtClean="0">
-                <a:solidFill>
-                  <a:srgbClr val="23383A"/>
-                </a:solidFill>
-                <a:latin typeface="Arial" charset="0"/>
-                <a:ea typeface="ＭＳ Ｐゴシック" charset="0"/>
-              </a:rPr>
-              <a:t> </a:t>
-            </a:r>
-            <a:r>
-              <a:rPr lang="en-US" sz="3200" dirty="0" smtClean="0">
-                <a:solidFill>
-                  <a:srgbClr val="23383A"/>
-                </a:solidFill>
-                <a:latin typeface="Arial" charset="0"/>
-                <a:ea typeface="ＭＳ Ｐゴシック" charset="0"/>
-              </a:rPr>
-              <a:t>JSON </a:t>
-            </a:r>
-            <a:r>
-              <a:rPr lang="en-US" sz="3200" dirty="0" smtClean="0">
-                <a:solidFill>
-                  <a:srgbClr val="23383A"/>
-                </a:solidFill>
-                <a:latin typeface="Arial" charset="0"/>
-                <a:ea typeface="ＭＳ Ｐゴシック" charset="0"/>
-              </a:rPr>
-              <a:t>RPC </a:t>
-            </a:r>
-            <a:r>
-              <a:rPr lang="en-US" sz="3200" dirty="0" smtClean="0">
-                <a:solidFill>
-                  <a:srgbClr val="23383A"/>
-                </a:solidFill>
-                <a:latin typeface="Arial" charset="0"/>
-                <a:ea typeface="ＭＳ Ｐゴシック" charset="0"/>
-              </a:rPr>
-              <a:t>protocol</a:t>
-            </a:r>
-            <a:endParaRPr lang="en-US" sz="3200" dirty="0" smtClean="0">
-              <a:solidFill>
-                <a:srgbClr val="23383A"/>
-              </a:solidFill>
-              <a:latin typeface="Arial" charset="0"/>
-              <a:ea typeface="ＭＳ Ｐゴシック" charset="0"/>
-            </a:endParaRPr>
+              <a:t>Write requests use the JSON RPC protocol</a:t>
+            </a:r>
           </a:p>
           <a:p>
             <a:pPr lvl="1" indent="9525">
@@ -7574,187 +7575,12 @@
             </a:pPr>
             <a:r>
               <a:rPr lang="en-US" sz="2800" dirty="0"/>
-              <a:t>Alternative to XML</a:t>
-            </a:r>
-            <a:endParaRPr lang="en-US" sz="3200" dirty="0" smtClean="0">
-              <a:solidFill>
-                <a:srgbClr val="23383A"/>
-              </a:solidFill>
-              <a:latin typeface="Arial" charset="0"/>
-              <a:ea typeface="ＭＳ Ｐゴシック" charset="0"/>
-            </a:endParaRPr>
-          </a:p>
-          <a:p>
-            <a:pPr lvl="1" indent="9525">
-              <a:lnSpc>
-                <a:spcPct val="90000"/>
-              </a:lnSpc>
-            </a:pPr>
-            <a:r>
-              <a:rPr lang="en-US" sz="2800" dirty="0" smtClean="0">
-                <a:solidFill>
-                  <a:srgbClr val="23383A"/>
-                </a:solidFill>
-                <a:latin typeface="Arial" charset="0"/>
-                <a:ea typeface="ＭＳ Ｐゴシック" charset="0"/>
-              </a:rPr>
-              <a:t>RPC (</a:t>
-            </a:r>
-            <a:r>
-              <a:rPr lang="en-US" sz="2800" dirty="0" smtClean="0">
-                <a:solidFill>
-                  <a:schemeClr val="tx1"/>
-                </a:solidFill>
-                <a:latin typeface="Arial" charset="0"/>
-                <a:ea typeface="ＭＳ Ｐゴシック" charset="0"/>
-                <a:cs typeface="ＭＳ Ｐゴシック" charset="0"/>
-              </a:rPr>
-              <a:t>Remote Procedure Call)</a:t>
-            </a:r>
-            <a:endParaRPr lang="en-US" sz="2800" dirty="0" smtClean="0">
-              <a:solidFill>
-                <a:srgbClr val="23383A"/>
-              </a:solidFill>
-              <a:latin typeface="Arial" charset="0"/>
-              <a:ea typeface="ＭＳ Ｐゴシック" charset="0"/>
-            </a:endParaRPr>
-          </a:p>
-          <a:p>
-            <a:pPr marL="1169988" lvl="1" indent="-396875">
-              <a:spcBef>
-                <a:spcPct val="15000"/>
-              </a:spcBef>
-              <a:spcAft>
-                <a:spcPct val="5000"/>
-              </a:spcAft>
-              <a:buFontTx/>
-              <a:buBlip>
-                <a:blip r:embed="rId3"/>
-              </a:buBlip>
-            </a:pPr>
-            <a:r>
-              <a:rPr lang="en-US" sz="2800" dirty="0" smtClean="0">
-                <a:solidFill>
-                  <a:schemeClr val="tx1"/>
-                </a:solidFill>
-                <a:latin typeface="Arial" charset="0"/>
-                <a:ea typeface="ＭＳ Ｐゴシック" charset="0"/>
-                <a:cs typeface="ＭＳ Ｐゴシック" charset="0"/>
-              </a:rPr>
-              <a:t>An </a:t>
-            </a:r>
-            <a:r>
-              <a:rPr lang="en-US" sz="2800" dirty="0">
-                <a:solidFill>
-                  <a:schemeClr val="tx1"/>
-                </a:solidFill>
-                <a:latin typeface="Arial" charset="0"/>
-                <a:ea typeface="ＭＳ Ｐゴシック" charset="0"/>
-                <a:cs typeface="ＭＳ Ｐゴシック" charset="0"/>
-              </a:rPr>
-              <a:t>inter-process communication</a:t>
-            </a:r>
-          </a:p>
-          <a:p>
-            <a:pPr marL="1169988" lvl="1" indent="-396875">
-              <a:spcBef>
-                <a:spcPct val="15000"/>
-              </a:spcBef>
-              <a:spcAft>
-                <a:spcPct val="5000"/>
-              </a:spcAft>
-              <a:buFontTx/>
-              <a:buBlip>
-                <a:blip r:embed="rId3"/>
-              </a:buBlip>
-            </a:pPr>
-            <a:r>
-              <a:rPr lang="en-US" sz="2800" dirty="0">
-                <a:solidFill>
-                  <a:schemeClr val="tx1"/>
-                </a:solidFill>
-                <a:latin typeface="Arial" charset="0"/>
-                <a:ea typeface="ＭＳ Ｐゴシック" charset="0"/>
-                <a:cs typeface="ＭＳ Ｐゴシック" charset="0"/>
-              </a:rPr>
-              <a:t>Allows a computer program to cause a subroutine or procedure to execute in another address space (commonly on another computer on a shared network)</a:t>
-            </a:r>
-          </a:p>
-          <a:p>
-            <a:pPr marL="1169988" lvl="1" indent="-396875">
-              <a:spcBef>
-                <a:spcPct val="15000"/>
-              </a:spcBef>
-              <a:spcAft>
-                <a:spcPct val="5000"/>
-              </a:spcAft>
-              <a:buFontTx/>
-              <a:buBlip>
-                <a:blip r:embed="rId3"/>
-              </a:buBlip>
-            </a:pPr>
-            <a:r>
-              <a:rPr lang="en-US" sz="2800" dirty="0">
-                <a:solidFill>
-                  <a:schemeClr val="tx1"/>
-                </a:solidFill>
-                <a:latin typeface="Arial" charset="0"/>
-                <a:ea typeface="ＭＳ Ｐゴシック" charset="0"/>
-                <a:cs typeface="ＭＳ Ｐゴシック" charset="0"/>
-              </a:rPr>
-              <a:t>A standard way of accessing data stored remotely over </a:t>
-            </a:r>
-            <a:r>
-              <a:rPr lang="en-US" sz="2800" dirty="0" smtClean="0">
-                <a:solidFill>
-                  <a:schemeClr val="tx1"/>
-                </a:solidFill>
-                <a:latin typeface="Arial" charset="0"/>
-                <a:ea typeface="ＭＳ Ｐゴシック" charset="0"/>
-                <a:cs typeface="ＭＳ Ｐゴシック" charset="0"/>
-              </a:rPr>
-              <a:t>HTTP</a:t>
-            </a:r>
-          </a:p>
-          <a:p>
-            <a:pPr marL="1169988" lvl="1" indent="-396875">
-              <a:spcBef>
-                <a:spcPct val="15000"/>
-              </a:spcBef>
-              <a:spcAft>
-                <a:spcPct val="5000"/>
-              </a:spcAft>
-              <a:buFontTx/>
-              <a:buBlip>
-                <a:blip r:embed="rId3"/>
-              </a:buBlip>
-            </a:pPr>
-            <a:r>
-              <a:rPr lang="en-US" sz="2800" dirty="0" smtClean="0">
-                <a:solidFill>
-                  <a:schemeClr val="tx1"/>
-                </a:solidFill>
-                <a:latin typeface="Arial" charset="0"/>
-                <a:ea typeface="ＭＳ Ｐゴシック" charset="0"/>
-                <a:cs typeface="ＭＳ Ｐゴシック" charset="0"/>
-              </a:rPr>
-              <a:t>Format includes the name of the method to be invoked, a parameter object and your write token</a:t>
-            </a:r>
-            <a:endParaRPr lang="en-US" sz="2800" dirty="0" smtClean="0"/>
-          </a:p>
-          <a:p>
-            <a:pPr marL="1169988" lvl="1" indent="-396875">
-              <a:spcBef>
-                <a:spcPct val="15000"/>
-              </a:spcBef>
-              <a:spcAft>
-                <a:spcPct val="5000"/>
-              </a:spcAft>
-              <a:buFontTx/>
-              <a:buBlip>
-                <a:blip r:embed="rId3"/>
-              </a:buBlip>
-            </a:pPr>
+              <a:t>Alternative to </a:t>
+            </a:r>
+            <a:r>
+              <a:rPr lang="en-US" sz="2800" dirty="0" smtClean="0"/>
+              <a:t>XML</a:t>
+            </a:r>
             <a:endParaRPr lang="en-US" sz="2800" dirty="0" smtClean="0">
               <a:solidFill>
                 <a:schemeClr val="accent2"/>
@@ -7776,7 +7602,7 @@
     </p:spTree>
     <p:extLst>
       <p:ext uri="{BB962C8B-B14F-4D97-AF65-F5344CB8AC3E}">
-        <p14:creationId xmlns:p14="http://schemas.microsoft.com/office/powerpoint/2010/main" xmlns:p="http://schemas.openxmlformats.org/presentationml/2006/main" xmlns:r="http://schemas.openxmlformats.org/officeDocument/2006/relationships" xmlns:a="http://schemas.openxmlformats.org/drawingml/2006/main" xmlns="" val="764835421"/>
+        <p14:creationId xmlns="" xmlns:a="http://schemas.openxmlformats.org/drawingml/2006/main" xmlns:r="http://schemas.openxmlformats.org/officeDocument/2006/relationships" xmlns:p="http://schemas.openxmlformats.org/presentationml/2006/main" xmlns:p14="http://schemas.microsoft.com/office/powerpoint/2010/main" xmlns:mv="urn:schemas-microsoft-com:mac:vml" xmlns:mc="http://schemas.openxmlformats.org/markup-compatibility/2006" val="764835421"/>
       </p:ext>
     </p:extLst>
   </p:cSld>
@@ -7815,15 +7641,188 @@
       </p:grpSpPr>
       <p:sp>
         <p:nvSpPr>
-          <p:cNvPr id="3" name="Title 2"/>
+          <p:cNvPr id="15361" name="Slide Number Placeholder 4"/>
+          <p:cNvSpPr txBox="1">
+            <a:spLocks noGrp="1"/>
+          </p:cNvSpPr>
+          <p:nvPr/>
+        </p:nvSpPr>
+        <p:spPr bwMode="auto">
+          <a:xfrm>
+            <a:off x="315913" y="9190038"/>
+            <a:ext cx="866775" cy="541337"/>
+          </a:xfrm>
+          <a:prstGeom prst="rect">
+            <a:avLst/>
+          </a:prstGeom>
+          <a:noFill/>
+          <a:ln>
+            <a:noFill/>
+          </a:ln>
+          <a:extLst>
+            <a:ext uri="{909E8E84-426E-40dd-AFC4-6F175D3DCCD1}">
+              <a14:hiddenFill xmlns="" xmlns:a="http://schemas.openxmlformats.org/drawingml/2006/main" xmlns:r="http://schemas.openxmlformats.org/officeDocument/2006/relationships" xmlns:p="http://schemas.openxmlformats.org/presentationml/2006/main" xmlns:a14="http://schemas.microsoft.com/office/drawing/2010/main" xmlns:mv="urn:schemas-microsoft-com:mac:vml" xmlns:mc="http://schemas.openxmlformats.org/markup-compatibility/2006">
+                <a:solidFill>
+                  <a:srgbClr val="FFFFFF"/>
+                </a:solidFill>
+              </a14:hiddenFill>
+            </a:ext>
+            <a:ext uri="{91240B29-F687-4f45-9708-019B960494DF}">
+              <a14:hiddenLine xmlns="" xmlns:a="http://schemas.openxmlformats.org/drawingml/2006/main" xmlns:r="http://schemas.openxmlformats.org/officeDocument/2006/relationships" xmlns:p="http://schemas.openxmlformats.org/presentationml/2006/main" xmlns:a14="http://schemas.microsoft.com/office/drawing/2010/main" xmlns:mv="urn:schemas-microsoft-com:mac:vml" xmlns:mc="http://schemas.openxmlformats.org/markup-compatibility/2006" w="9525">
+                <a:solidFill>
+                  <a:srgbClr val="000000"/>
+                </a:solidFill>
+                <a:miter lim="800000"/>
+                <a:headEnd/>
+                <a:tailEnd/>
+              </a14:hiddenLine>
+            </a:ext>
+          </a:extLst>
+        </p:spPr>
+        <p:txBody>
+          <a:bodyPr lIns="154707" tIns="77354" rIns="154707" bIns="77354"/>
+          <a:lstStyle>
+            <a:lvl1pPr eaLnBrk="0" hangingPunct="0">
+              <a:defRPr sz="3000">
+                <a:solidFill>
+                  <a:schemeClr val="tx1"/>
+                </a:solidFill>
+                <a:latin typeface="Arial" charset="0"/>
+                <a:ea typeface="ＭＳ Ｐゴシック" charset="0"/>
+                <a:cs typeface="ＭＳ Ｐゴシック" charset="0"/>
+              </a:defRPr>
+            </a:lvl1pPr>
+            <a:lvl2pPr marL="742950" indent="-285750" eaLnBrk="0" hangingPunct="0">
+              <a:defRPr sz="3000">
+                <a:solidFill>
+                  <a:schemeClr val="tx1"/>
+                </a:solidFill>
+                <a:latin typeface="Arial" charset="0"/>
+                <a:ea typeface="ＭＳ Ｐゴシック" charset="0"/>
+              </a:defRPr>
+            </a:lvl2pPr>
+            <a:lvl3pPr marL="1143000" indent="-228600" eaLnBrk="0" hangingPunct="0">
+              <a:defRPr sz="3000">
+                <a:solidFill>
+                  <a:schemeClr val="tx1"/>
+                </a:solidFill>
+                <a:latin typeface="Arial" charset="0"/>
+                <a:ea typeface="ＭＳ Ｐゴシック" charset="0"/>
+              </a:defRPr>
+            </a:lvl3pPr>
+            <a:lvl4pPr marL="1600200" indent="-228600" eaLnBrk="0" hangingPunct="0">
+              <a:defRPr sz="3000">
+                <a:solidFill>
+                  <a:schemeClr val="tx1"/>
+                </a:solidFill>
+                <a:latin typeface="Arial" charset="0"/>
+                <a:ea typeface="ＭＳ Ｐゴシック" charset="0"/>
+              </a:defRPr>
+            </a:lvl4pPr>
+            <a:lvl5pPr marL="2057400" indent="-228600" eaLnBrk="0" hangingPunct="0">
+              <a:defRPr sz="3000">
+                <a:solidFill>
+                  <a:schemeClr val="tx1"/>
+                </a:solidFill>
+                <a:latin typeface="Arial" charset="0"/>
+                <a:ea typeface="ＭＳ Ｐゴシック" charset="0"/>
+              </a:defRPr>
+            </a:lvl5pPr>
+            <a:lvl6pPr marL="2514600" indent="-228600" defTabSz="773113" eaLnBrk="0" fontAlgn="base" hangingPunct="0">
+              <a:spcBef>
+                <a:spcPct val="0"/>
+              </a:spcBef>
+              <a:spcAft>
+                <a:spcPct val="0"/>
+              </a:spcAft>
+              <a:defRPr sz="3000">
+                <a:solidFill>
+                  <a:schemeClr val="tx1"/>
+                </a:solidFill>
+                <a:latin typeface="Arial" charset="0"/>
+                <a:ea typeface="ＭＳ Ｐゴシック" charset="0"/>
+              </a:defRPr>
+            </a:lvl6pPr>
+            <a:lvl7pPr marL="2971800" indent="-228600" defTabSz="773113" eaLnBrk="0" fontAlgn="base" hangingPunct="0">
+              <a:spcBef>
+                <a:spcPct val="0"/>
+              </a:spcBef>
+              <a:spcAft>
+                <a:spcPct val="0"/>
+              </a:spcAft>
+              <a:defRPr sz="3000">
+                <a:solidFill>
+                  <a:schemeClr val="tx1"/>
+                </a:solidFill>
+                <a:latin typeface="Arial" charset="0"/>
+                <a:ea typeface="ＭＳ Ｐゴシック" charset="0"/>
+              </a:defRPr>
+            </a:lvl7pPr>
+            <a:lvl8pPr marL="3429000" indent="-228600" defTabSz="773113" eaLnBrk="0" fontAlgn="base" hangingPunct="0">
+              <a:spcBef>
+                <a:spcPct val="0"/>
+              </a:spcBef>
+              <a:spcAft>
+                <a:spcPct val="0"/>
+              </a:spcAft>
+              <a:defRPr sz="3000">
+                <a:solidFill>
+                  <a:schemeClr val="tx1"/>
+                </a:solidFill>
+                <a:latin typeface="Arial" charset="0"/>
+                <a:ea typeface="ＭＳ Ｐゴシック" charset="0"/>
+              </a:defRPr>
+            </a:lvl8pPr>
+            <a:lvl9pPr marL="3886200" indent="-228600" defTabSz="773113" eaLnBrk="0" fontAlgn="base" hangingPunct="0">
+              <a:spcBef>
+                <a:spcPct val="0"/>
+              </a:spcBef>
+              <a:spcAft>
+                <a:spcPct val="0"/>
+              </a:spcAft>
+              <a:defRPr sz="3000">
+                <a:solidFill>
+                  <a:schemeClr val="tx1"/>
+                </a:solidFill>
+                <a:latin typeface="Arial" charset="0"/>
+                <a:ea typeface="ＭＳ Ｐゴシック" charset="0"/>
+              </a:defRPr>
+            </a:lvl9pPr>
+          </a:lstStyle>
+          <a:p>
+            <a:fld id="{6503B87E-2812-EF44-8908-AEC923A4DD58}" type="slidenum">
+              <a:rPr lang="en-US" sz="1500" b="1">
+                <a:solidFill>
+                  <a:srgbClr val="7B7B7B"/>
+                </a:solidFill>
+              </a:rPr>
+              <a:pPr/>
+              <a:t>5</a:t>
+            </a:fld>
+            <a:endParaRPr lang="en-US" sz="1500" b="1">
+              <a:solidFill>
+                <a:srgbClr val="7B7B7B"/>
+              </a:solidFill>
+            </a:endParaRPr>
+          </a:p>
+        </p:txBody>
+      </p:sp>
+      <p:sp>
+        <p:nvSpPr>
+          <p:cNvPr id="15362" name="Rectangle 2"/>
           <p:cNvSpPr>
-            <a:spLocks noGrp="1"/>
+            <a:spLocks noGrp="1" noChangeArrowheads="1"/>
           </p:cNvSpPr>
           <p:nvPr>
             <p:ph type="title"/>
           </p:nvPr>
         </p:nvSpPr>
-        <p:spPr/>
+        <p:spPr>
+          <a:xfrm>
+            <a:off x="541338" y="300038"/>
+            <a:ext cx="14724062" cy="1449387"/>
+          </a:xfrm>
+        </p:spPr>
         <p:txBody>
           <a:bodyPr/>
           <a:lstStyle/>
@@ -7833,26 +7832,18 @@
                 <a:latin typeface="Arial" charset="0"/>
                 <a:ea typeface="ＭＳ Ｐゴシック" charset="0"/>
               </a:rPr>
-              <a:t>Media API write </a:t>
-            </a:r>
-            <a:r>
-              <a:rPr lang="en-US" dirty="0" smtClean="0">
-                <a:latin typeface="Arial" charset="0"/>
-                <a:ea typeface="ＭＳ Ｐゴシック" charset="0"/>
-              </a:rPr>
-              <a:t>request</a:t>
-            </a:r>
-            <a:r>
-              <a:rPr lang="en-US" dirty="0" smtClean="0"/>
-              <a:t>s (cont)</a:t>
-            </a:r>
-            <a:endParaRPr lang="en-US" dirty="0"/>
-          </a:p>
-        </p:txBody>
-      </p:sp>
-      <p:sp>
-        <p:nvSpPr>
-          <p:cNvPr id="4" name="Content Placeholder 3"/>
+              <a:t>Media API write requests (cont)</a:t>
+            </a:r>
+            <a:endParaRPr lang="en-US" dirty="0">
+              <a:latin typeface="Arial" charset="0"/>
+              <a:ea typeface="ＭＳ Ｐゴシック" charset="0"/>
+            </a:endParaRPr>
+          </a:p>
+        </p:txBody>
+      </p:sp>
+      <p:sp>
+        <p:nvSpPr>
+          <p:cNvPr id="15363" name="Content Placeholder 4"/>
           <p:cNvSpPr>
             <a:spLocks noGrp="1"/>
           </p:cNvSpPr>
@@ -7860,18 +7851,181 @@
             <p:ph idx="1"/>
           </p:nvPr>
         </p:nvSpPr>
-        <p:spPr/>
-        <p:txBody>
-          <a:bodyPr>
-            <a:normAutofit/>
-          </a:bodyPr>
+        <p:spPr>
+          <a:xfrm>
+            <a:off x="541338" y="1911350"/>
+            <a:ext cx="15878175" cy="6667915"/>
+          </a:xfrm>
+        </p:spPr>
+        <p:txBody>
+          <a:bodyPr/>
           <a:lstStyle/>
+          <a:p>
+            <a:pPr indent="9525">
+              <a:lnSpc>
+                <a:spcPct val="90000"/>
+              </a:lnSpc>
+            </a:pPr>
+            <a:r>
+              <a:rPr lang="en-US" sz="3200" dirty="0" smtClean="0">
+                <a:solidFill>
+                  <a:srgbClr val="23383A"/>
+                </a:solidFill>
+                <a:latin typeface="Arial" charset="0"/>
+                <a:ea typeface="ＭＳ Ｐゴシック" charset="0"/>
+              </a:rPr>
+              <a:t>RPC (Remote Procedure Call) </a:t>
+            </a:r>
+            <a:endParaRPr lang="en-US" sz="2800" dirty="0" smtClean="0">
+              <a:solidFill>
+                <a:srgbClr val="23383A"/>
+              </a:solidFill>
+              <a:latin typeface="Arial" charset="0"/>
+              <a:ea typeface="ＭＳ Ｐゴシック" charset="0"/>
+            </a:endParaRPr>
+          </a:p>
+          <a:p>
+            <a:pPr lvl="1" indent="9525">
+              <a:lnSpc>
+                <a:spcPct val="90000"/>
+              </a:lnSpc>
+            </a:pPr>
+            <a:r>
+              <a:rPr lang="en-US" sz="2800" dirty="0" smtClean="0">
+                <a:solidFill>
+                  <a:schemeClr val="tx1"/>
+                </a:solidFill>
+                <a:latin typeface="Arial" charset="0"/>
+                <a:ea typeface="ＭＳ Ｐゴシック" charset="0"/>
+                <a:cs typeface="ＭＳ Ｐゴシック" charset="0"/>
+              </a:rPr>
+              <a:t>An </a:t>
+            </a:r>
+            <a:r>
+              <a:rPr lang="en-US" sz="2800" dirty="0">
+                <a:solidFill>
+                  <a:schemeClr val="tx1"/>
+                </a:solidFill>
+                <a:latin typeface="Arial" charset="0"/>
+                <a:ea typeface="ＭＳ Ｐゴシック" charset="0"/>
+                <a:cs typeface="ＭＳ Ｐゴシック" charset="0"/>
+              </a:rPr>
+              <a:t>inter-process communication</a:t>
+            </a:r>
+          </a:p>
+          <a:p>
+            <a:pPr marL="1169988" lvl="1" indent="-396875">
+              <a:spcBef>
+                <a:spcPct val="15000"/>
+              </a:spcBef>
+              <a:spcAft>
+                <a:spcPct val="5000"/>
+              </a:spcAft>
+              <a:buFontTx/>
+              <a:buBlip>
+                <a:blip r:embed="rId3"/>
+              </a:buBlip>
+            </a:pPr>
+            <a:r>
+              <a:rPr lang="en-US" sz="2800" dirty="0">
+                <a:solidFill>
+                  <a:schemeClr val="tx1"/>
+                </a:solidFill>
+                <a:latin typeface="Arial" charset="0"/>
+                <a:ea typeface="ＭＳ Ｐゴシック" charset="0"/>
+                <a:cs typeface="ＭＳ Ｐゴシック" charset="0"/>
+              </a:rPr>
+              <a:t>Allows a computer program to cause a subroutine or procedure to execute in another address space (commonly on another computer on a shared network)</a:t>
+            </a:r>
+          </a:p>
+          <a:p>
+            <a:pPr marL="1169988" lvl="1" indent="-396875">
+              <a:spcBef>
+                <a:spcPct val="15000"/>
+              </a:spcBef>
+              <a:spcAft>
+                <a:spcPct val="5000"/>
+              </a:spcAft>
+              <a:buFontTx/>
+              <a:buBlip>
+                <a:blip r:embed="rId3"/>
+              </a:buBlip>
+            </a:pPr>
+            <a:r>
+              <a:rPr lang="en-US" sz="2800" dirty="0">
+                <a:solidFill>
+                  <a:schemeClr val="tx1"/>
+                </a:solidFill>
+                <a:latin typeface="Arial" charset="0"/>
+                <a:ea typeface="ＭＳ Ｐゴシック" charset="0"/>
+                <a:cs typeface="ＭＳ Ｐゴシック" charset="0"/>
+              </a:rPr>
+              <a:t>A standard way of accessing data stored remotely over </a:t>
+            </a:r>
+            <a:r>
+              <a:rPr lang="en-US" sz="2800" dirty="0" smtClean="0">
+                <a:solidFill>
+                  <a:schemeClr val="tx1"/>
+                </a:solidFill>
+                <a:latin typeface="Arial" charset="0"/>
+                <a:ea typeface="ＭＳ Ｐゴシック" charset="0"/>
+                <a:cs typeface="ＭＳ Ｐゴシック" charset="0"/>
+              </a:rPr>
+              <a:t>HTTP</a:t>
+            </a:r>
+          </a:p>
+          <a:p>
+            <a:pPr marL="1169988" lvl="1" indent="-396875">
+              <a:spcBef>
+                <a:spcPct val="15000"/>
+              </a:spcBef>
+              <a:spcAft>
+                <a:spcPct val="5000"/>
+              </a:spcAft>
+              <a:buFontTx/>
+              <a:buBlip>
+                <a:blip r:embed="rId3"/>
+              </a:buBlip>
+            </a:pPr>
+            <a:r>
+              <a:rPr lang="en-US" sz="2800" dirty="0" smtClean="0">
+                <a:solidFill>
+                  <a:schemeClr val="tx1"/>
+                </a:solidFill>
+                <a:latin typeface="Arial" charset="0"/>
+                <a:ea typeface="ＭＳ Ｐゴシック" charset="0"/>
+                <a:cs typeface="ＭＳ Ｐゴシック" charset="0"/>
+              </a:rPr>
+              <a:t>Format includes the name of the method to be invoked, a parameter object and your write token</a:t>
+            </a:r>
+          </a:p>
+          <a:p>
+            <a:pPr marL="1169988" lvl="1" indent="-396875">
+              <a:spcBef>
+                <a:spcPct val="15000"/>
+              </a:spcBef>
+              <a:spcAft>
+                <a:spcPct val="5000"/>
+              </a:spcAft>
+              <a:buFontTx/>
+              <a:buBlip>
+                <a:blip r:embed="rId3"/>
+              </a:buBlip>
+            </a:pPr>
+            <a:endParaRPr lang="en-US" sz="2800" dirty="0" smtClean="0">
+              <a:solidFill>
+                <a:schemeClr val="tx1"/>
+              </a:solidFill>
+              <a:latin typeface="Arial" charset="0"/>
+              <a:ea typeface="ＭＳ Ｐゴシック" charset="0"/>
+              <a:cs typeface="ＭＳ Ｐゴシック" charset="0"/>
+            </a:endParaRPr>
+          </a:p>
           <a:p>
             <a:r>
               <a:rPr lang="en-US" sz="3200" dirty="0" smtClean="0"/>
               <a:t>Example Call</a:t>
             </a:r>
-            <a:endParaRPr lang="en-US" sz="3200" dirty="0" smtClean="0"/>
           </a:p>
           <a:p>
             <a:pPr lvl="1"/>
@@ -7883,74 +8037,51 @@
                 <a:latin typeface="Source Code Pro"/>
                 <a:cs typeface="Source Code Pro"/>
               </a:rPr>
-              <a:t>{</a:t>
-            </a:r>
-            <a:r>
-              <a:rPr lang="en-US" sz="3200" dirty="0" smtClean="0">
-                <a:solidFill>
-                  <a:srgbClr val="292929"/>
-                </a:solidFill>
-                <a:latin typeface="Source Code Pro"/>
-                <a:cs typeface="Source Code Pro"/>
-              </a:rPr>
-              <a:t>"method":"update_video","params":{"video":{"id":"</a:t>
-            </a:r>
-            <a:r>
-              <a:rPr lang="en-US" sz="3200" dirty="0" smtClean="0">
-                <a:solidFill>
-                  <a:srgbClr val="292929"/>
-                </a:solidFill>
-                <a:latin typeface="Source Code Pro"/>
-                <a:cs typeface="Source Code Pro"/>
-              </a:rPr>
-              <a:t>2790007957001”,</a:t>
-            </a:r>
-            <a:r>
-              <a:rPr lang="en-US" sz="3200" dirty="0" smtClean="0">
-                <a:solidFill>
-                  <a:srgbClr val="292929"/>
-                </a:solidFill>
-                <a:latin typeface="Source Code Pro"/>
-                <a:cs typeface="Source Code Pro"/>
-              </a:rPr>
-              <a:t>"Name":"Sea-</a:t>
-            </a:r>
-            <a:r>
-              <a:rPr lang="en-US" sz="3200" dirty="0" smtClean="0">
-                <a:solidFill>
-                  <a:srgbClr val="292929"/>
-                </a:solidFill>
-                <a:latin typeface="Source Code Pro"/>
-                <a:cs typeface="Source Code Pro"/>
-              </a:rPr>
-              <a:t>Crab”,}, "</a:t>
-            </a:r>
-            <a:r>
-              <a:rPr lang="en-US" sz="3200" dirty="0" smtClean="0">
-                <a:solidFill>
-                  <a:srgbClr val="292929"/>
-                </a:solidFill>
-                <a:latin typeface="Source Code Pro"/>
-                <a:cs typeface="Source Code Pro"/>
-              </a:rPr>
-              <a:t>token":"ZY4Ls9Hq6LCBgleGDTaFRDLWWBC8uoXQHkhGuDebKvjFPjHb3iT-4g.."}}</a:t>
-            </a:r>
-            <a:r>
-              <a:rPr lang="en-US" sz="3200" dirty="0" smtClean="0">
-                <a:solidFill>
-                  <a:srgbClr val="292929"/>
-                </a:solidFill>
-                <a:latin typeface="Source Code Pro"/>
-                <a:cs typeface="Source Code Pro"/>
-              </a:rPr>
-              <a:t> </a:t>
-            </a:r>
-            <a:endParaRPr lang="en-US" sz="3200" dirty="0" smtClean="0">
+              <a:t>{"method":"update_video","params":{"video":{"id":"2790007957001”,"Name":"Sea-Crab”,}, "token":"ZY4Ls9Hq6LCBgleGDTaFRDLWWBC8uoXQHkhGuDebKvjFPjHb3iT-4g.."}} </a:t>
+            </a:r>
+          </a:p>
+          <a:p>
+            <a:pPr marL="1169988" lvl="1" indent="-396875">
+              <a:spcBef>
+                <a:spcPct val="15000"/>
+              </a:spcBef>
+              <a:spcAft>
+                <a:spcPct val="5000"/>
+              </a:spcAft>
+              <a:buFontTx/>
+              <a:buBlip>
+                <a:blip r:embed="rId3"/>
+              </a:buBlip>
+            </a:pPr>
+            <a:endParaRPr lang="en-US" sz="2800" dirty="0" smtClean="0"/>
+          </a:p>
+          <a:p>
+            <a:pPr marL="1169988" lvl="1" indent="-396875">
+              <a:spcBef>
+                <a:spcPct val="15000"/>
+              </a:spcBef>
+              <a:spcAft>
+                <a:spcPct val="5000"/>
+              </a:spcAft>
+              <a:buFontTx/>
+              <a:buBlip>
+                <a:blip r:embed="rId3"/>
+              </a:buBlip>
+            </a:pPr>
+            <a:endParaRPr lang="en-US" sz="2800" dirty="0" smtClean="0">
               <a:solidFill>
-                <a:srgbClr val="292929"/>
+                <a:schemeClr val="accent2"/>
               </a:solidFill>
               <a:latin typeface="Source Code Pro"/>
+              <a:ea typeface="ＭＳ Ｐゴシック" charset="0"/>
               <a:cs typeface="Source Code Pro"/>
+            </a:endParaRPr>
+          </a:p>
+          <a:p>
+            <a:pPr indent="9525"/>
+            <a:endParaRPr lang="en-US" dirty="0">
+              <a:latin typeface="Arial" charset="0"/>
+              <a:ea typeface="ＭＳ Ｐゴシック" charset="0"/>
             </a:endParaRPr>
           </a:p>
         </p:txBody>
@@ -7958,13 +8089,16 @@
     </p:spTree>
     <p:extLst>
       <p:ext uri="{BB962C8B-B14F-4D97-AF65-F5344CB8AC3E}">
-        <p14:creationId xmlns:p14="http://schemas.microsoft.com/office/powerpoint/2010/main" xmlns:p="http://schemas.openxmlformats.org/presentationml/2006/main" xmlns:r="http://schemas.openxmlformats.org/officeDocument/2006/relationships" xmlns:a="http://schemas.openxmlformats.org/drawingml/2006/main" xmlns="" val="2108713422"/>
+        <p14:creationId xmlns="" xmlns:a="http://schemas.openxmlformats.org/drawingml/2006/main" xmlns:r="http://schemas.openxmlformats.org/officeDocument/2006/relationships" xmlns:p="http://schemas.openxmlformats.org/presentationml/2006/main" xmlns:p14="http://schemas.microsoft.com/office/powerpoint/2010/main" xmlns:mv="urn:schemas-microsoft-com:mac:vml" xmlns:mc="http://schemas.openxmlformats.org/markup-compatibility/2006" val="764835421"/>
       </p:ext>
     </p:extLst>
   </p:cSld>
   <p:clrMapOvr>
     <a:masterClrMapping/>
   </p:clrMapOvr>
+  <p:transition>
+    <p:fade/>
+  </p:transition>
   <p:timing>
     <p:tnLst>
       <p:par>
@@ -8069,7 +8203,7 @@
     </p:spTree>
     <p:extLst>
       <p:ext uri="{BB962C8B-B14F-4D97-AF65-F5344CB8AC3E}">
-        <p14:creationId xmlns:p14="http://schemas.microsoft.com/office/powerpoint/2010/main" xmlns:p="http://schemas.openxmlformats.org/presentationml/2006/main" xmlns:r="http://schemas.openxmlformats.org/officeDocument/2006/relationships" xmlns:a="http://schemas.openxmlformats.org/drawingml/2006/main" xmlns="" val="2108713422"/>
+        <p14:creationId xmlns="" xmlns:a="http://schemas.openxmlformats.org/drawingml/2006/main" xmlns:r="http://schemas.openxmlformats.org/officeDocument/2006/relationships" xmlns:p="http://schemas.openxmlformats.org/presentationml/2006/main" xmlns:p14="http://schemas.microsoft.com/office/powerpoint/2010/main" xmlns:mv="urn:schemas-microsoft-com:mac:vml" xmlns:mc="http://schemas.openxmlformats.org/markup-compatibility/2006" val="2108713422"/>
       </p:ext>
     </p:extLst>
   </p:cSld>
@@ -8279,7 +8413,7 @@
     </p:spTree>
     <p:extLst>
       <p:ext uri="{BB962C8B-B14F-4D97-AF65-F5344CB8AC3E}">
-        <p14:creationId xmlns:p14="http://schemas.microsoft.com/office/powerpoint/2010/main" xmlns:p="http://schemas.openxmlformats.org/presentationml/2006/main" xmlns:r="http://schemas.openxmlformats.org/officeDocument/2006/relationships" xmlns:a="http://schemas.openxmlformats.org/drawingml/2006/main" xmlns="" val="4257424235"/>
+        <p14:creationId xmlns="" xmlns:a="http://schemas.openxmlformats.org/drawingml/2006/main" xmlns:r="http://schemas.openxmlformats.org/officeDocument/2006/relationships" xmlns:p="http://schemas.openxmlformats.org/presentationml/2006/main" xmlns:p14="http://schemas.microsoft.com/office/powerpoint/2010/main" xmlns:mv="urn:schemas-microsoft-com:mac:vml" xmlns:mc="http://schemas.openxmlformats.org/markup-compatibility/2006" val="4257424235"/>
       </p:ext>
     </p:extLst>
   </p:cSld>
@@ -8413,7 +8547,7 @@
     </p:spTree>
     <p:extLst>
       <p:ext uri="{BB962C8B-B14F-4D97-AF65-F5344CB8AC3E}">
-        <p14:creationId xmlns:p14="http://schemas.microsoft.com/office/powerpoint/2010/main" xmlns:p="http://schemas.openxmlformats.org/presentationml/2006/main" xmlns:r="http://schemas.openxmlformats.org/officeDocument/2006/relationships" xmlns:a="http://schemas.openxmlformats.org/drawingml/2006/main" xmlns="" val="544640343"/>
+        <p14:creationId xmlns="" xmlns:a="http://schemas.openxmlformats.org/drawingml/2006/main" xmlns:r="http://schemas.openxmlformats.org/officeDocument/2006/relationships" xmlns:p="http://schemas.openxmlformats.org/presentationml/2006/main" xmlns:p14="http://schemas.microsoft.com/office/powerpoint/2010/main" xmlns:mv="urn:schemas-microsoft-com:mac:vml" xmlns:mc="http://schemas.openxmlformats.org/markup-compatibility/2006" val="544640343"/>
       </p:ext>
     </p:extLst>
   </p:cSld>
@@ -8559,7 +8693,7 @@
     </p:spTree>
     <p:extLst>
       <p:ext uri="{BB962C8B-B14F-4D97-AF65-F5344CB8AC3E}">
-        <p14:creationId xmlns:p14="http://schemas.microsoft.com/office/powerpoint/2010/main" xmlns:p="http://schemas.openxmlformats.org/presentationml/2006/main" xmlns:r="http://schemas.openxmlformats.org/officeDocument/2006/relationships" xmlns:a="http://schemas.openxmlformats.org/drawingml/2006/main" xmlns="" val="4226722249"/>
+        <p14:creationId xmlns="" xmlns:a="http://schemas.openxmlformats.org/drawingml/2006/main" xmlns:r="http://schemas.openxmlformats.org/officeDocument/2006/relationships" xmlns:p="http://schemas.openxmlformats.org/presentationml/2006/main" xmlns:p14="http://schemas.microsoft.com/office/powerpoint/2010/main" xmlns:mv="urn:schemas-microsoft-com:mac:vml" xmlns:mc="http://schemas.openxmlformats.org/markup-compatibility/2006" val="4226722249"/>
       </p:ext>
     </p:extLst>
   </p:cSld>

</xml_diff>